<commit_message>
correction erreur graph COMSOL
</commit_message>
<xml_diff>
--- a/Devoir_2.pptx
+++ b/Devoir_2.pptx
@@ -135,7 +135,7 @@
 <file path=ppt/charts/chart1.xml><?xml version="1.0" encoding="utf-8"?>
 <c:chartSpace xmlns:c="http://schemas.openxmlformats.org/drawingml/2006/chart" xmlns:a="http://schemas.openxmlformats.org/drawingml/2006/main" xmlns:r="http://schemas.openxmlformats.org/officeDocument/2006/relationships" xmlns:c16r2="http://schemas.microsoft.com/office/drawing/2015/06/chart">
   <c:date1904 val="0"/>
-  <c:lang val="en-US"/>
+  <c:lang val="fr-FR"/>
   <c:roundedCorners val="0"/>
   <mc:AlternateContent xmlns:mc="http://schemas.openxmlformats.org/markup-compatibility/2006">
     <mc:Choice xmlns:c14="http://schemas.microsoft.com/office/drawing/2007/8/2/chart" Requires="c14">
@@ -166,8 +166,1864 @@
               </a:defRPr>
             </a:pPr>
             <a:r>
-              <a:rPr lang="fr-CA"/>
-              <a:t>Evolution de la concentration en fonction de r à 1e7s</a:t>
+              <a:rPr lang="fr-CA" sz="1100" b="0" i="0" u="none" strike="noStrike" kern="1200" spc="0" baseline="0">
+                <a:solidFill>
+                  <a:sysClr val="windowText" lastClr="000000">
+                    <a:lumMod val="65000"/>
+                    <a:lumOff val="35000"/>
+                  </a:sysClr>
+                </a:solidFill>
+                <a:latin typeface="+mn-lt"/>
+                <a:ea typeface="+mn-ea"/>
+                <a:cs typeface="+mn-cs"/>
+              </a:rPr>
+              <a:t>Evolution de la concentration en fonction de r </a:t>
+            </a:r>
+            <a:r>
+              <a:rPr lang="fr-CA" sz="1100" b="0" i="0" u="none" strike="noStrike" kern="1200" spc="0" baseline="0" dirty="0">
+                <a:solidFill>
+                  <a:sysClr val="windowText" lastClr="000000">
+                    <a:lumMod val="65000"/>
+                    <a:lumOff val="35000"/>
+                  </a:sysClr>
+                </a:solidFill>
+              </a:rPr>
+              <a:t>à 1e7s</a:t>
+            </a:r>
+            <a:r>
+              <a:rPr lang="fr-CA" baseline="0"/>
+              <a:t> </a:t>
+            </a:r>
+            <a:endParaRPr lang="fr-CA"/>
+          </a:p>
+        </c:rich>
+      </c:tx>
+      <c:overlay val="0"/>
+      <c:spPr>
+        <a:noFill/>
+        <a:ln>
+          <a:noFill/>
+        </a:ln>
+        <a:effectLst/>
+      </c:spPr>
+      <c:txPr>
+        <a:bodyPr rot="0" spcFirstLastPara="1" vertOverflow="ellipsis" vert="horz" wrap="square" anchor="ctr" anchorCtr="1"/>
+        <a:lstStyle/>
+        <a:p>
+          <a:pPr>
+            <a:defRPr sz="1400" b="0" i="0" u="none" strike="noStrike" kern="1200" spc="0" baseline="0">
+              <a:solidFill>
+                <a:schemeClr val="tx1">
+                  <a:lumMod val="65000"/>
+                  <a:lumOff val="35000"/>
+                </a:schemeClr>
+              </a:solidFill>
+              <a:latin typeface="+mn-lt"/>
+              <a:ea typeface="+mn-ea"/>
+              <a:cs typeface="+mn-cs"/>
+            </a:defRPr>
+          </a:pPr>
+          <a:endParaRPr lang="fr-FR"/>
+        </a:p>
+      </c:txPr>
+    </c:title>
+    <c:autoTitleDeleted val="0"/>
+    <c:plotArea>
+      <c:layout/>
+      <c:scatterChart>
+        <c:scatterStyle val="lineMarker"/>
+        <c:varyColors val="0"/>
+        <c:ser>
+          <c:idx val="0"/>
+          <c:order val="0"/>
+          <c:tx>
+            <c:strRef>
+              <c:f>'1e7_D'!$B$1</c:f>
+              <c:strCache>
+                <c:ptCount val="1"/>
+                <c:pt idx="0">
+                  <c:v>MDF</c:v>
+                </c:pt>
+              </c:strCache>
+            </c:strRef>
+          </c:tx>
+          <c:spPr>
+            <a:ln w="25400" cap="rnd">
+              <a:solidFill>
+                <a:schemeClr val="accent1"/>
+              </a:solidFill>
+              <a:round/>
+            </a:ln>
+            <a:effectLst/>
+          </c:spPr>
+          <c:marker>
+            <c:symbol val="circle"/>
+            <c:size val="6"/>
+            <c:spPr>
+              <a:solidFill>
+                <a:schemeClr val="accent1"/>
+              </a:solidFill>
+              <a:ln w="9525">
+                <a:solidFill>
+                  <a:schemeClr val="accent1"/>
+                </a:solidFill>
+              </a:ln>
+              <a:effectLst/>
+            </c:spPr>
+          </c:marker>
+          <c:xVal>
+            <c:numRef>
+              <c:f>'1e7_D'!$A$2:$A$102</c:f>
+              <c:numCache>
+                <c:formatCode>General</c:formatCode>
+                <c:ptCount val="101"/>
+                <c:pt idx="0">
+                  <c:v>0</c:v>
+                </c:pt>
+                <c:pt idx="1">
+                  <c:v>5.0000000000000001E-3</c:v>
+                </c:pt>
+                <c:pt idx="2">
+                  <c:v>0.01</c:v>
+                </c:pt>
+                <c:pt idx="3">
+                  <c:v>1.4999999999999999E-2</c:v>
+                </c:pt>
+                <c:pt idx="4">
+                  <c:v>0.02</c:v>
+                </c:pt>
+                <c:pt idx="5">
+                  <c:v>2.5000000000000001E-2</c:v>
+                </c:pt>
+                <c:pt idx="6">
+                  <c:v>0.03</c:v>
+                </c:pt>
+                <c:pt idx="7">
+                  <c:v>3.5000000000000003E-2</c:v>
+                </c:pt>
+                <c:pt idx="8">
+                  <c:v>0.04</c:v>
+                </c:pt>
+                <c:pt idx="9">
+                  <c:v>4.4999999999999998E-2</c:v>
+                </c:pt>
+                <c:pt idx="10">
+                  <c:v>0.05</c:v>
+                </c:pt>
+                <c:pt idx="11">
+                  <c:v>5.5E-2</c:v>
+                </c:pt>
+                <c:pt idx="12">
+                  <c:v>0.06</c:v>
+                </c:pt>
+                <c:pt idx="13">
+                  <c:v>6.5000000000000002E-2</c:v>
+                </c:pt>
+                <c:pt idx="14">
+                  <c:v>7.0000000000000007E-2</c:v>
+                </c:pt>
+                <c:pt idx="15">
+                  <c:v>7.4999999999999997E-2</c:v>
+                </c:pt>
+                <c:pt idx="16">
+                  <c:v>0.08</c:v>
+                </c:pt>
+                <c:pt idx="17">
+                  <c:v>8.5000000000000006E-2</c:v>
+                </c:pt>
+                <c:pt idx="18">
+                  <c:v>0.09</c:v>
+                </c:pt>
+                <c:pt idx="19">
+                  <c:v>9.5000000000000001E-2</c:v>
+                </c:pt>
+                <c:pt idx="20">
+                  <c:v>0.1</c:v>
+                </c:pt>
+                <c:pt idx="21">
+                  <c:v>0.105</c:v>
+                </c:pt>
+                <c:pt idx="22">
+                  <c:v>0.11</c:v>
+                </c:pt>
+                <c:pt idx="23">
+                  <c:v>0.115</c:v>
+                </c:pt>
+                <c:pt idx="24">
+                  <c:v>0.12</c:v>
+                </c:pt>
+                <c:pt idx="25">
+                  <c:v>0.125</c:v>
+                </c:pt>
+                <c:pt idx="26">
+                  <c:v>0.13</c:v>
+                </c:pt>
+                <c:pt idx="27">
+                  <c:v>0.13500000000000001</c:v>
+                </c:pt>
+                <c:pt idx="28">
+                  <c:v>0.14000000000000001</c:v>
+                </c:pt>
+                <c:pt idx="29">
+                  <c:v>0.14499999999999999</c:v>
+                </c:pt>
+                <c:pt idx="30">
+                  <c:v>0.15</c:v>
+                </c:pt>
+                <c:pt idx="31">
+                  <c:v>0.155</c:v>
+                </c:pt>
+                <c:pt idx="32">
+                  <c:v>0.16</c:v>
+                </c:pt>
+                <c:pt idx="33">
+                  <c:v>0.16500000000000001</c:v>
+                </c:pt>
+                <c:pt idx="34">
+                  <c:v>0.17</c:v>
+                </c:pt>
+                <c:pt idx="35">
+                  <c:v>0.17499999999999999</c:v>
+                </c:pt>
+                <c:pt idx="36">
+                  <c:v>0.18</c:v>
+                </c:pt>
+                <c:pt idx="37">
+                  <c:v>0.185</c:v>
+                </c:pt>
+                <c:pt idx="38">
+                  <c:v>0.19</c:v>
+                </c:pt>
+                <c:pt idx="39">
+                  <c:v>0.19500000000000001</c:v>
+                </c:pt>
+                <c:pt idx="40">
+                  <c:v>0.2</c:v>
+                </c:pt>
+                <c:pt idx="41">
+                  <c:v>0.20499999999999999</c:v>
+                </c:pt>
+                <c:pt idx="42">
+                  <c:v>0.21</c:v>
+                </c:pt>
+                <c:pt idx="43">
+                  <c:v>0.215</c:v>
+                </c:pt>
+                <c:pt idx="44">
+                  <c:v>0.22</c:v>
+                </c:pt>
+                <c:pt idx="45">
+                  <c:v>0.22500000000000001</c:v>
+                </c:pt>
+                <c:pt idx="46">
+                  <c:v>0.23</c:v>
+                </c:pt>
+                <c:pt idx="47">
+                  <c:v>0.23499999999999999</c:v>
+                </c:pt>
+                <c:pt idx="48">
+                  <c:v>0.24</c:v>
+                </c:pt>
+                <c:pt idx="49">
+                  <c:v>0.245</c:v>
+                </c:pt>
+                <c:pt idx="50">
+                  <c:v>0.25</c:v>
+                </c:pt>
+                <c:pt idx="51">
+                  <c:v>0.255</c:v>
+                </c:pt>
+                <c:pt idx="52">
+                  <c:v>0.26</c:v>
+                </c:pt>
+                <c:pt idx="53">
+                  <c:v>0.26500000000000001</c:v>
+                </c:pt>
+                <c:pt idx="54">
+                  <c:v>0.27</c:v>
+                </c:pt>
+                <c:pt idx="55">
+                  <c:v>0.27500000000000002</c:v>
+                </c:pt>
+                <c:pt idx="56">
+                  <c:v>0.28000000000000003</c:v>
+                </c:pt>
+                <c:pt idx="57">
+                  <c:v>0.28499999999999998</c:v>
+                </c:pt>
+                <c:pt idx="58">
+                  <c:v>0.28999999999999998</c:v>
+                </c:pt>
+                <c:pt idx="59">
+                  <c:v>0.29499999999999998</c:v>
+                </c:pt>
+                <c:pt idx="60">
+                  <c:v>0.3</c:v>
+                </c:pt>
+                <c:pt idx="61">
+                  <c:v>0.30499999999999999</c:v>
+                </c:pt>
+                <c:pt idx="62">
+                  <c:v>0.31</c:v>
+                </c:pt>
+                <c:pt idx="63">
+                  <c:v>0.315</c:v>
+                </c:pt>
+                <c:pt idx="64">
+                  <c:v>0.32</c:v>
+                </c:pt>
+                <c:pt idx="65">
+                  <c:v>0.32500000000000001</c:v>
+                </c:pt>
+                <c:pt idx="66">
+                  <c:v>0.33</c:v>
+                </c:pt>
+                <c:pt idx="67">
+                  <c:v>0.33500000000000002</c:v>
+                </c:pt>
+                <c:pt idx="68">
+                  <c:v>0.34</c:v>
+                </c:pt>
+                <c:pt idx="69">
+                  <c:v>0.34499999999999997</c:v>
+                </c:pt>
+                <c:pt idx="70">
+                  <c:v>0.35</c:v>
+                </c:pt>
+                <c:pt idx="71">
+                  <c:v>0.35499999999999998</c:v>
+                </c:pt>
+                <c:pt idx="72">
+                  <c:v>0.36</c:v>
+                </c:pt>
+                <c:pt idx="73">
+                  <c:v>0.36499999999999999</c:v>
+                </c:pt>
+                <c:pt idx="74">
+                  <c:v>0.37</c:v>
+                </c:pt>
+                <c:pt idx="75">
+                  <c:v>0.375</c:v>
+                </c:pt>
+                <c:pt idx="76">
+                  <c:v>0.38</c:v>
+                </c:pt>
+                <c:pt idx="77">
+                  <c:v>0.38500000000000001</c:v>
+                </c:pt>
+                <c:pt idx="78">
+                  <c:v>0.39</c:v>
+                </c:pt>
+                <c:pt idx="79">
+                  <c:v>0.39500000000000002</c:v>
+                </c:pt>
+                <c:pt idx="80">
+                  <c:v>0.4</c:v>
+                </c:pt>
+                <c:pt idx="81">
+                  <c:v>0.40500000000000003</c:v>
+                </c:pt>
+                <c:pt idx="82">
+                  <c:v>0.41</c:v>
+                </c:pt>
+                <c:pt idx="83">
+                  <c:v>0.41499999999999998</c:v>
+                </c:pt>
+                <c:pt idx="84">
+                  <c:v>0.42</c:v>
+                </c:pt>
+                <c:pt idx="85">
+                  <c:v>0.42499999999999999</c:v>
+                </c:pt>
+                <c:pt idx="86">
+                  <c:v>0.43</c:v>
+                </c:pt>
+                <c:pt idx="87">
+                  <c:v>0.435</c:v>
+                </c:pt>
+                <c:pt idx="88">
+                  <c:v>0.44</c:v>
+                </c:pt>
+                <c:pt idx="89">
+                  <c:v>0.44500000000000001</c:v>
+                </c:pt>
+                <c:pt idx="90">
+                  <c:v>0.45</c:v>
+                </c:pt>
+                <c:pt idx="91">
+                  <c:v>0.45500000000000002</c:v>
+                </c:pt>
+                <c:pt idx="92">
+                  <c:v>0.46</c:v>
+                </c:pt>
+                <c:pt idx="93">
+                  <c:v>0.46500000000000002</c:v>
+                </c:pt>
+                <c:pt idx="94">
+                  <c:v>0.47</c:v>
+                </c:pt>
+                <c:pt idx="95">
+                  <c:v>0.47499999999999998</c:v>
+                </c:pt>
+                <c:pt idx="96">
+                  <c:v>0.48</c:v>
+                </c:pt>
+                <c:pt idx="97">
+                  <c:v>0.48499999999999999</c:v>
+                </c:pt>
+                <c:pt idx="98">
+                  <c:v>0.49</c:v>
+                </c:pt>
+                <c:pt idx="99">
+                  <c:v>0.495</c:v>
+                </c:pt>
+                <c:pt idx="100">
+                  <c:v>0.5</c:v>
+                </c:pt>
+              </c:numCache>
+            </c:numRef>
+          </c:xVal>
+          <c:yVal>
+            <c:numRef>
+              <c:f>'1e7_D'!$B$2:$B$102</c:f>
+              <c:numCache>
+                <c:formatCode>0.00E+00</c:formatCode>
+                <c:ptCount val="101"/>
+                <c:pt idx="0">
+                  <c:v>1.7184614246203801E-23</c:v>
+                </c:pt>
+                <c:pt idx="1">
+                  <c:v>2.3639489345602199E-23</c:v>
+                </c:pt>
+                <c:pt idx="2">
+                  <c:v>4.3004114643797201E-23</c:v>
+                </c:pt>
+                <c:pt idx="3">
+                  <c:v>9.1648246845245106E-23</c:v>
+                </c:pt>
+                <c:pt idx="4">
+                  <c:v>2.0961243810267099E-22</c:v>
+                </c:pt>
+                <c:pt idx="5">
+                  <c:v>4.9563876812102202E-22</c:v>
+                </c:pt>
+                <c:pt idx="6">
+                  <c:v>1.19205335153374E-21</c:v>
+                </c:pt>
+                <c:pt idx="7">
+                  <c:v>2.8925251540456399E-21</c:v>
+                </c:pt>
+                <c:pt idx="8">
+                  <c:v>7.0485753939290793E-21</c:v>
+                </c:pt>
+                <c:pt idx="9">
+                  <c:v>1.7199225653291699E-20</c:v>
+                </c:pt>
+                <c:pt idx="10">
+                  <c:v>4.1942290021617102E-20</c:v>
+                </c:pt>
+                <c:pt idx="11">
+                  <c:v>1.02077389050117E-19</c:v>
+                </c:pt>
+                <c:pt idx="12">
+                  <c:v>2.4768296311141901E-19</c:v>
+                </c:pt>
+                <c:pt idx="13">
+                  <c:v>5.9870283381477496E-19</c:v>
+                </c:pt>
+                <c:pt idx="14">
+                  <c:v>1.4408106260385E-18</c:v>
+                </c:pt>
+                <c:pt idx="15">
+                  <c:v>3.4503763748408399E-18</c:v>
+                </c:pt>
+                <c:pt idx="16">
+                  <c:v>8.2188598779921806E-18</c:v>
+                </c:pt>
+                <c:pt idx="17">
+                  <c:v>1.94666973056333E-17</c:v>
+                </c:pt>
+                <c:pt idx="18">
+                  <c:v>4.5833225871303497E-17</c:v>
+                </c:pt>
+                <c:pt idx="19">
+                  <c:v>1.07241979947906E-16</c:v>
+                </c:pt>
+                <c:pt idx="20">
+                  <c:v>2.49314556017237E-16</c:v>
+                </c:pt>
+                <c:pt idx="21">
+                  <c:v>5.7576027985265297E-16</c:v>
+                </c:pt>
+                <c:pt idx="22">
+                  <c:v>1.3205914683764201E-15</c:v>
+                </c:pt>
+                <c:pt idx="23">
+                  <c:v>3.0078522694896099E-15</c:v>
+                </c:pt>
+                <c:pt idx="24">
+                  <c:v>6.8020536454659299E-15</c:v>
+                </c:pt>
+                <c:pt idx="25">
+                  <c:v>1.52706760335075E-14</c:v>
+                </c:pt>
+                <c:pt idx="26">
+                  <c:v>3.4029399972789002E-14</c:v>
+                </c:pt>
+                <c:pt idx="27">
+                  <c:v>7.5261815527433999E-14</c:v>
+                </c:pt>
+                <c:pt idx="28">
+                  <c:v>1.6518435003891199E-13</c:v>
+                </c:pt>
+                <c:pt idx="29">
+                  <c:v>3.5974007049012601E-13</c:v>
+                </c:pt>
+                <c:pt idx="30">
+                  <c:v>7.7729961554912497E-13</c:v>
+                </c:pt>
+                <c:pt idx="31">
+                  <c:v>1.6661866457947899E-12</c:v>
+                </c:pt>
+                <c:pt idx="32">
+                  <c:v>3.54284235752689E-12</c:v>
+                </c:pt>
+                <c:pt idx="33">
+                  <c:v>7.4719128646630093E-12</c:v>
+                </c:pt>
+                <c:pt idx="34">
+                  <c:v>1.56287263031263E-11</c:v>
+                </c:pt>
+                <c:pt idx="35">
+                  <c:v>3.2418154731898101E-11</c:v>
+                </c:pt>
+                <c:pt idx="36">
+                  <c:v>6.6678830216164298E-11</c:v>
+                </c:pt>
+                <c:pt idx="37">
+                  <c:v>1.35983290157945E-10</c:v>
+                </c:pt>
+                <c:pt idx="38">
+                  <c:v>2.7494428522273399E-10</c:v>
+                </c:pt>
+                <c:pt idx="39">
+                  <c:v>5.5109925057493505E-10</c:v>
+                </c:pt>
+                <c:pt idx="40">
+                  <c:v>1.0949794038898599E-9</c:v>
+                </c:pt>
+                <c:pt idx="41">
+                  <c:v>2.15644665424792E-9</c:v>
+                </c:pt>
+                <c:pt idx="42">
+                  <c:v>4.2091491593440401E-9</c:v>
+                </c:pt>
+                <c:pt idx="43">
+                  <c:v>8.1421567006762199E-9</c:v>
+                </c:pt>
+                <c:pt idx="44">
+                  <c:v>1.56077879711971E-8</c:v>
+                </c:pt>
+                <c:pt idx="45">
+                  <c:v>2.96461100778723E-8</c:v>
+                </c:pt>
+                <c:pt idx="46">
+                  <c:v>5.5793898516745397E-8</c:v>
+                </c:pt>
+                <c:pt idx="47">
+                  <c:v>1.04032004273755E-7</c:v>
+                </c:pt>
+                <c:pt idx="48">
+                  <c:v>1.92166458318481E-7</c:v>
+                </c:pt>
+                <c:pt idx="49">
+                  <c:v>3.51631788700497E-7</c:v>
+                </c:pt>
+                <c:pt idx="50">
+                  <c:v>6.37336260540359E-7</c:v>
+                </c:pt>
+                <c:pt idx="51">
+                  <c:v>1.1441674580768499E-6</c:v>
+                </c:pt>
+                <c:pt idx="52">
+                  <c:v>2.0343329222316198E-6</c:v>
+                </c:pt>
+                <c:pt idx="53">
+                  <c:v>3.58209793392179E-6</c:v>
+                </c:pt>
+                <c:pt idx="54">
+                  <c:v>6.2460855665504001E-6</c:v>
+                </c:pt>
+                <c:pt idx="55">
+                  <c:v>1.07846502481396E-5</c:v>
+                </c:pt>
+                <c:pt idx="56">
+                  <c:v>1.8437628812909199E-5</c:v>
+                </c:pt>
+                <c:pt idx="57">
+                  <c:v>3.1208921687184701E-5</c:v>
+                </c:pt>
+                <c:pt idx="58">
+                  <c:v>5.2299994066751998E-5</c:v>
+                </c:pt>
+                <c:pt idx="59">
+                  <c:v>8.6765861295850206E-5</c:v>
+                </c:pt>
+                <c:pt idx="60" formatCode="General">
+                  <c:v>1.42493948791978E-4</c:v>
+                </c:pt>
+                <c:pt idx="61" formatCode="General">
+                  <c:v>2.31643960504254E-4</c:v>
+                </c:pt>
+                <c:pt idx="62" formatCode="General">
+                  <c:v>3.7273496198045103E-4</c:v>
+                </c:pt>
+                <c:pt idx="63" formatCode="General">
+                  <c:v>5.9362521777982398E-4</c:v>
+                </c:pt>
+                <c:pt idx="64" formatCode="General">
+                  <c:v>9.3570091239242401E-4</c:v>
+                </c:pt>
+                <c:pt idx="65" formatCode="General">
+                  <c:v>1.45967017737777E-3</c:v>
+                </c:pt>
+                <c:pt idx="66" formatCode="General">
+                  <c:v>2.25344501163328E-3</c:v>
+                </c:pt>
+                <c:pt idx="67" formatCode="General">
+                  <c:v>3.4426787892322501E-3</c:v>
+                </c:pt>
+                <c:pt idx="68" formatCode="General">
+                  <c:v>5.2046002930282399E-3</c:v>
+                </c:pt>
+                <c:pt idx="69" formatCode="General">
+                  <c:v>7.7858313047153103E-3</c:v>
+                </c:pt>
+                <c:pt idx="70" formatCode="General">
+                  <c:v>1.15248737576461E-2</c:v>
+                </c:pt>
+                <c:pt idx="71" formatCode="General">
+                  <c:v>1.6879880142349001E-2</c:v>
+                </c:pt>
+                <c:pt idx="72" formatCode="General">
+                  <c:v>2.4462150276670501E-2</c:v>
+                </c:pt>
+                <c:pt idx="73" formatCode="General">
+                  <c:v>3.5075501555650701E-2</c:v>
+                </c:pt>
+                <c:pt idx="74" formatCode="General">
+                  <c:v>4.9761214977334899E-2</c:v>
+                </c:pt>
+                <c:pt idx="75" formatCode="General">
+                  <c:v>6.9847651180495005E-2</c:v>
+                </c:pt>
+                <c:pt idx="76" formatCode="General">
+                  <c:v>9.7002860194950705E-2</c:v>
+                </c:pt>
+                <c:pt idx="77" formatCode="General">
+                  <c:v>0.13328759806562701</c:v>
+                </c:pt>
+                <c:pt idx="78" formatCode="General">
+                  <c:v>0.18120516296778799</c:v>
+                </c:pt>
+                <c:pt idx="79" formatCode="General">
+                  <c:v>0.24374345422378699</c:v>
+                </c:pt>
+                <c:pt idx="80" formatCode="General">
+                  <c:v>0.32440375275156802</c:v>
+                </c:pt>
+                <c:pt idx="81" formatCode="General">
+                  <c:v>0.42721006094673403</c:v>
+                </c:pt>
+                <c:pt idx="82" formatCode="General">
+                  <c:v>0.55669258030284896</c:v>
+                </c:pt>
+                <c:pt idx="83" formatCode="General">
+                  <c:v>0.71783920229865705</c:v>
+                </c:pt>
+                <c:pt idx="84" formatCode="General">
+                  <c:v>0.91600987558105296</c:v>
+                </c:pt>
+                <c:pt idx="85" formatCode="General">
+                  <c:v>1.15681047506733</c:v>
+                </c:pt>
+                <c:pt idx="86" formatCode="General">
+                  <c:v>1.44592534663577</c:v>
+                </c:pt>
+                <c:pt idx="87" formatCode="General">
+                  <c:v>1.7889109487738999</c:v>
+                </c:pt>
+                <c:pt idx="88" formatCode="General">
+                  <c:v>2.1909567653291901</c:v>
+                </c:pt>
+                <c:pt idx="89" formatCode="General">
+                  <c:v>2.6566236188879602</c:v>
+                </c:pt>
+                <c:pt idx="90" formatCode="General">
+                  <c:v>3.18957327949084</c:v>
+                </c:pt>
+                <c:pt idx="91" formatCode="General">
+                  <c:v>3.7923063903355501</c:v>
+                </c:pt>
+                <c:pt idx="92" formatCode="General">
+                  <c:v>4.4659277680838896</c:v>
+                </c:pt>
+                <c:pt idx="93" formatCode="General">
+                  <c:v>5.2099586836794698</c:v>
+                </c:pt>
+                <c:pt idx="94" formatCode="General">
+                  <c:v>6.0222145123664799</c:v>
+                </c:pt>
+                <c:pt idx="95" formatCode="General">
+                  <c:v>6.8987630549908401</c:v>
+                </c:pt>
+                <c:pt idx="96" formatCode="General">
+                  <c:v>7.8339739839789901</c:v>
+                </c:pt>
+                <c:pt idx="97" formatCode="General">
+                  <c:v>8.8206635861692302</c:v>
+                </c:pt>
+                <c:pt idx="98" formatCode="General">
+                  <c:v>9.8503317925484506</c:v>
+                </c:pt>
+                <c:pt idx="99" formatCode="General">
+                  <c:v>10.913481084214901</c:v>
+                </c:pt>
+                <c:pt idx="100" formatCode="General">
+                  <c:v>12</c:v>
+                </c:pt>
+              </c:numCache>
+            </c:numRef>
+          </c:yVal>
+          <c:smooth val="0"/>
+          <c:extLst>
+            <c:ext xmlns:c16="http://schemas.microsoft.com/office/drawing/2014/chart" uri="{C3380CC4-5D6E-409C-BE32-E72D297353CC}">
+              <c16:uniqueId val="{00000000-DF0D-4345-93B5-6FF58968DCA5}"/>
+            </c:ext>
+          </c:extLst>
+        </c:ser>
+        <c:ser>
+          <c:idx val="1"/>
+          <c:order val="1"/>
+          <c:tx>
+            <c:strRef>
+              <c:f>'1e7_C'!$B$1</c:f>
+              <c:strCache>
+                <c:ptCount val="1"/>
+                <c:pt idx="0">
+                  <c:v>Comsol</c:v>
+                </c:pt>
+              </c:strCache>
+            </c:strRef>
+          </c:tx>
+          <c:spPr>
+            <a:ln w="25400" cap="rnd">
+              <a:noFill/>
+              <a:round/>
+            </a:ln>
+            <a:effectLst/>
+          </c:spPr>
+          <c:marker>
+            <c:symbol val="triangle"/>
+            <c:size val="5"/>
+            <c:spPr>
+              <a:solidFill>
+                <a:schemeClr val="accent2"/>
+              </a:solidFill>
+              <a:ln w="9525">
+                <a:solidFill>
+                  <a:schemeClr val="accent2"/>
+                </a:solidFill>
+              </a:ln>
+              <a:effectLst/>
+            </c:spPr>
+          </c:marker>
+          <c:dPt>
+            <c:idx val="48"/>
+            <c:marker>
+              <c:symbol val="triangle"/>
+              <c:size val="5"/>
+              <c:spPr>
+                <a:solidFill>
+                  <a:schemeClr val="accent2"/>
+                </a:solidFill>
+                <a:ln w="9525">
+                  <a:solidFill>
+                    <a:schemeClr val="accent2"/>
+                  </a:solidFill>
+                </a:ln>
+                <a:effectLst/>
+              </c:spPr>
+            </c:marker>
+            <c:bubble3D val="0"/>
+            <c:spPr>
+              <a:ln w="25400" cap="rnd">
+                <a:solidFill>
+                  <a:schemeClr val="accent1"/>
+                </a:solidFill>
+                <a:round/>
+              </a:ln>
+              <a:effectLst/>
+            </c:spPr>
+            <c:extLst>
+              <c:ext xmlns:c16="http://schemas.microsoft.com/office/drawing/2014/chart" uri="{C3380CC4-5D6E-409C-BE32-E72D297353CC}">
+                <c16:uniqueId val="{00000002-DF0D-4345-93B5-6FF58968DCA5}"/>
+              </c:ext>
+            </c:extLst>
+          </c:dPt>
+          <c:xVal>
+            <c:numRef>
+              <c:f>'1e7_C'!$A$2:$A$102</c:f>
+              <c:numCache>
+                <c:formatCode>General</c:formatCode>
+                <c:ptCount val="101"/>
+                <c:pt idx="0">
+                  <c:v>0</c:v>
+                </c:pt>
+                <c:pt idx="1">
+                  <c:v>5.0000000000000001E-3</c:v>
+                </c:pt>
+                <c:pt idx="2">
+                  <c:v>0.01</c:v>
+                </c:pt>
+                <c:pt idx="3">
+                  <c:v>1.4999999999999999E-2</c:v>
+                </c:pt>
+                <c:pt idx="4">
+                  <c:v>0.02</c:v>
+                </c:pt>
+                <c:pt idx="5">
+                  <c:v>2.5000000000000001E-2</c:v>
+                </c:pt>
+                <c:pt idx="6">
+                  <c:v>0.03</c:v>
+                </c:pt>
+                <c:pt idx="7">
+                  <c:v>3.5000000000000003E-2</c:v>
+                </c:pt>
+                <c:pt idx="8">
+                  <c:v>0.04</c:v>
+                </c:pt>
+                <c:pt idx="9">
+                  <c:v>4.4999999999999998E-2</c:v>
+                </c:pt>
+                <c:pt idx="10">
+                  <c:v>0.05</c:v>
+                </c:pt>
+                <c:pt idx="11">
+                  <c:v>5.5E-2</c:v>
+                </c:pt>
+                <c:pt idx="12">
+                  <c:v>0.06</c:v>
+                </c:pt>
+                <c:pt idx="13">
+                  <c:v>6.5000000000000002E-2</c:v>
+                </c:pt>
+                <c:pt idx="14">
+                  <c:v>7.0000000000000007E-2</c:v>
+                </c:pt>
+                <c:pt idx="15">
+                  <c:v>7.4999999999999997E-2</c:v>
+                </c:pt>
+                <c:pt idx="16">
+                  <c:v>0.08</c:v>
+                </c:pt>
+                <c:pt idx="17">
+                  <c:v>8.5000000000000006E-2</c:v>
+                </c:pt>
+                <c:pt idx="18">
+                  <c:v>0.09</c:v>
+                </c:pt>
+                <c:pt idx="19">
+                  <c:v>9.5000000000000001E-2</c:v>
+                </c:pt>
+                <c:pt idx="20">
+                  <c:v>0.1</c:v>
+                </c:pt>
+                <c:pt idx="21">
+                  <c:v>0.105</c:v>
+                </c:pt>
+                <c:pt idx="22">
+                  <c:v>0.11</c:v>
+                </c:pt>
+                <c:pt idx="23">
+                  <c:v>0.115</c:v>
+                </c:pt>
+                <c:pt idx="24">
+                  <c:v>0.12</c:v>
+                </c:pt>
+                <c:pt idx="25">
+                  <c:v>0.125</c:v>
+                </c:pt>
+                <c:pt idx="26">
+                  <c:v>0.13</c:v>
+                </c:pt>
+                <c:pt idx="27">
+                  <c:v>0.13500000000000001</c:v>
+                </c:pt>
+                <c:pt idx="28">
+                  <c:v>0.14000000000000001</c:v>
+                </c:pt>
+                <c:pt idx="29">
+                  <c:v>0.14499999999999999</c:v>
+                </c:pt>
+                <c:pt idx="30">
+                  <c:v>0.15</c:v>
+                </c:pt>
+                <c:pt idx="31">
+                  <c:v>0.155</c:v>
+                </c:pt>
+                <c:pt idx="32">
+                  <c:v>0.16</c:v>
+                </c:pt>
+                <c:pt idx="33">
+                  <c:v>0.16500000000000001</c:v>
+                </c:pt>
+                <c:pt idx="34">
+                  <c:v>0.17</c:v>
+                </c:pt>
+                <c:pt idx="35">
+                  <c:v>0.17499999999999999</c:v>
+                </c:pt>
+                <c:pt idx="36">
+                  <c:v>0.18</c:v>
+                </c:pt>
+                <c:pt idx="37">
+                  <c:v>0.185</c:v>
+                </c:pt>
+                <c:pt idx="38">
+                  <c:v>0.19</c:v>
+                </c:pt>
+                <c:pt idx="39">
+                  <c:v>0.19500000000000001</c:v>
+                </c:pt>
+                <c:pt idx="40">
+                  <c:v>0.2</c:v>
+                </c:pt>
+                <c:pt idx="41">
+                  <c:v>0.20499999999999999</c:v>
+                </c:pt>
+                <c:pt idx="42">
+                  <c:v>0.21</c:v>
+                </c:pt>
+                <c:pt idx="43">
+                  <c:v>0.215</c:v>
+                </c:pt>
+                <c:pt idx="44">
+                  <c:v>0.22</c:v>
+                </c:pt>
+                <c:pt idx="45">
+                  <c:v>0.22500000000000001</c:v>
+                </c:pt>
+                <c:pt idx="46">
+                  <c:v>0.23</c:v>
+                </c:pt>
+                <c:pt idx="47">
+                  <c:v>0.23499999999999999</c:v>
+                </c:pt>
+                <c:pt idx="48">
+                  <c:v>0.24</c:v>
+                </c:pt>
+                <c:pt idx="49">
+                  <c:v>0.245</c:v>
+                </c:pt>
+                <c:pt idx="50">
+                  <c:v>0.25</c:v>
+                </c:pt>
+                <c:pt idx="51">
+                  <c:v>0.255</c:v>
+                </c:pt>
+                <c:pt idx="52">
+                  <c:v>0.26</c:v>
+                </c:pt>
+                <c:pt idx="53">
+                  <c:v>0.26500000000000001</c:v>
+                </c:pt>
+                <c:pt idx="54">
+                  <c:v>0.27</c:v>
+                </c:pt>
+                <c:pt idx="55">
+                  <c:v>0.27500000000000002</c:v>
+                </c:pt>
+                <c:pt idx="56">
+                  <c:v>0.28000000000000003</c:v>
+                </c:pt>
+                <c:pt idx="57">
+                  <c:v>0.28499999999999998</c:v>
+                </c:pt>
+                <c:pt idx="58">
+                  <c:v>0.28999999999999998</c:v>
+                </c:pt>
+                <c:pt idx="59">
+                  <c:v>0.29499999999999998</c:v>
+                </c:pt>
+                <c:pt idx="60">
+                  <c:v>0.3</c:v>
+                </c:pt>
+                <c:pt idx="61">
+                  <c:v>0.30499999999999999</c:v>
+                </c:pt>
+                <c:pt idx="62">
+                  <c:v>0.31</c:v>
+                </c:pt>
+                <c:pt idx="63">
+                  <c:v>0.315</c:v>
+                </c:pt>
+                <c:pt idx="64">
+                  <c:v>0.32</c:v>
+                </c:pt>
+                <c:pt idx="65">
+                  <c:v>0.32500000000000001</c:v>
+                </c:pt>
+                <c:pt idx="66">
+                  <c:v>0.33</c:v>
+                </c:pt>
+                <c:pt idx="67">
+                  <c:v>0.33500000000000002</c:v>
+                </c:pt>
+                <c:pt idx="68">
+                  <c:v>0.34</c:v>
+                </c:pt>
+                <c:pt idx="69">
+                  <c:v>0.34499999999999997</c:v>
+                </c:pt>
+                <c:pt idx="70">
+                  <c:v>0.35</c:v>
+                </c:pt>
+                <c:pt idx="71">
+                  <c:v>0.35499999999999998</c:v>
+                </c:pt>
+                <c:pt idx="72">
+                  <c:v>0.36</c:v>
+                </c:pt>
+                <c:pt idx="73">
+                  <c:v>0.36499999999999999</c:v>
+                </c:pt>
+                <c:pt idx="74">
+                  <c:v>0.37</c:v>
+                </c:pt>
+                <c:pt idx="75">
+                  <c:v>0.375</c:v>
+                </c:pt>
+                <c:pt idx="76">
+                  <c:v>0.38</c:v>
+                </c:pt>
+                <c:pt idx="77">
+                  <c:v>0.38500000000000001</c:v>
+                </c:pt>
+                <c:pt idx="78">
+                  <c:v>0.39</c:v>
+                </c:pt>
+                <c:pt idx="79">
+                  <c:v>0.39500000000000002</c:v>
+                </c:pt>
+                <c:pt idx="80">
+                  <c:v>0.4</c:v>
+                </c:pt>
+                <c:pt idx="81">
+                  <c:v>0.40500000000000003</c:v>
+                </c:pt>
+                <c:pt idx="82">
+                  <c:v>0.41</c:v>
+                </c:pt>
+                <c:pt idx="83">
+                  <c:v>0.41499999999999998</c:v>
+                </c:pt>
+                <c:pt idx="84">
+                  <c:v>0.42</c:v>
+                </c:pt>
+                <c:pt idx="85">
+                  <c:v>0.42499999999999999</c:v>
+                </c:pt>
+                <c:pt idx="86">
+                  <c:v>0.43</c:v>
+                </c:pt>
+                <c:pt idx="87">
+                  <c:v>0.435</c:v>
+                </c:pt>
+                <c:pt idx="88">
+                  <c:v>0.44</c:v>
+                </c:pt>
+                <c:pt idx="89">
+                  <c:v>0.44500000000000001</c:v>
+                </c:pt>
+                <c:pt idx="90">
+                  <c:v>0.45</c:v>
+                </c:pt>
+                <c:pt idx="91">
+                  <c:v>0.45500000000000002</c:v>
+                </c:pt>
+                <c:pt idx="92">
+                  <c:v>0.46</c:v>
+                </c:pt>
+                <c:pt idx="93">
+                  <c:v>0.46500000000000002</c:v>
+                </c:pt>
+                <c:pt idx="94">
+                  <c:v>0.47</c:v>
+                </c:pt>
+                <c:pt idx="95">
+                  <c:v>0.47499999999999998</c:v>
+                </c:pt>
+                <c:pt idx="96">
+                  <c:v>0.48</c:v>
+                </c:pt>
+                <c:pt idx="97">
+                  <c:v>0.48499999999999999</c:v>
+                </c:pt>
+                <c:pt idx="98">
+                  <c:v>0.49</c:v>
+                </c:pt>
+                <c:pt idx="99">
+                  <c:v>0.495</c:v>
+                </c:pt>
+                <c:pt idx="100">
+                  <c:v>0.5</c:v>
+                </c:pt>
+              </c:numCache>
+            </c:numRef>
+          </c:xVal>
+          <c:yVal>
+            <c:numRef>
+              <c:f>'1e7_C'!$B$2:$B$102</c:f>
+              <c:numCache>
+                <c:formatCode>0.00E+00</c:formatCode>
+                <c:ptCount val="101"/>
+                <c:pt idx="0">
+                  <c:v>1.52621043656057E-17</c:v>
+                </c:pt>
+                <c:pt idx="1">
+                  <c:v>1.6604600040011101E-17</c:v>
+                </c:pt>
+                <c:pt idx="2">
+                  <c:v>2.1003753689289399E-17</c:v>
+                </c:pt>
+                <c:pt idx="3">
+                  <c:v>2.96281246131571E-17</c:v>
+                </c:pt>
+                <c:pt idx="4">
+                  <c:v>4.4809087703812401E-17</c:v>
+                </c:pt>
+                <c:pt idx="5">
+                  <c:v>7.0723436579277805E-17</c:v>
+                </c:pt>
+                <c:pt idx="6">
+                  <c:v>1.1463098654742099E-16</c:v>
+                </c:pt>
+                <c:pt idx="7">
+                  <c:v>1.8904182847589699E-16</c:v>
+                </c:pt>
+                <c:pt idx="8">
+                  <c:v>3.1547638027053098E-16</c:v>
+                </c:pt>
+                <c:pt idx="9">
+                  <c:v>5.3097178379962004E-16</c:v>
+                </c:pt>
+                <c:pt idx="10">
+                  <c:v>8.9933462294042708E-16</c:v>
+                </c:pt>
+                <c:pt idx="11">
+                  <c:v>1.5306034872571699E-15</c:v>
+                </c:pt>
+                <c:pt idx="12">
+                  <c:v>2.61471624332294E-15</c:v>
+                </c:pt>
+                <c:pt idx="13">
+                  <c:v>4.4797539330269101E-15</c:v>
+                </c:pt>
+                <c:pt idx="14">
+                  <c:v>7.6926979401759398E-15</c:v>
+                </c:pt>
+                <c:pt idx="15">
+                  <c:v>1.3233702190872501E-14</c:v>
+                </c:pt>
+                <c:pt idx="16">
+                  <c:v>2.2797429212987301E-14</c:v>
+                </c:pt>
+                <c:pt idx="17">
+                  <c:v>3.9313874150974398E-14</c:v>
+                </c:pt>
+                <c:pt idx="18">
+                  <c:v>6.7848061142049803E-14</c:v>
+                </c:pt>
+                <c:pt idx="19">
+                  <c:v>1.17153202733983E-13</c:v>
+                </c:pt>
+                <c:pt idx="20">
+                  <c:v>2.02349885022673E-13</c:v>
+                </c:pt>
+                <c:pt idx="21">
+                  <c:v>3.4954358728297701E-13</c:v>
+                </c:pt>
+                <c:pt idx="22">
+                  <c:v>6.03775057898653E-13</c:v>
+                </c:pt>
+                <c:pt idx="23">
+                  <c:v>1.0426942513292501E-12</c:v>
+                </c:pt>
+                <c:pt idx="24">
+                  <c:v>1.8000502115900001E-12</c:v>
+                </c:pt>
+                <c:pt idx="25">
+                  <c:v>3.1059909700163498E-12</c:v>
+                </c:pt>
+                <c:pt idx="26">
+                  <c:v>5.3561061277385099E-12</c:v>
+                </c:pt>
+                <c:pt idx="27">
+                  <c:v>9.2295333816743908E-12</c:v>
+                </c:pt>
+                <c:pt idx="28">
+                  <c:v>1.5890668649704001E-11</c:v>
+                </c:pt>
+                <c:pt idx="29">
+                  <c:v>2.7333064945810499E-11</c:v>
+                </c:pt>
+                <c:pt idx="30">
+                  <c:v>4.69646728522176E-11</c:v>
+                </c:pt>
+                <c:pt idx="31">
+                  <c:v>8.0601845485244501E-11</c:v>
+                </c:pt>
+                <c:pt idx="32">
+                  <c:v>1.3815411389132901E-10</c:v>
+                </c:pt>
+                <c:pt idx="33">
+                  <c:v>2.3647351058629898E-10</c:v>
+                </c:pt>
+                <c:pt idx="34">
+                  <c:v>4.0416222187357401E-10</c:v>
+                </c:pt>
+                <c:pt idx="35">
+                  <c:v>6.8966464792477105E-10</c:v>
+                </c:pt>
+                <c:pt idx="36">
+                  <c:v>1.1748524425056501E-9</c:v>
+                </c:pt>
+                <c:pt idx="37">
+                  <c:v>1.9977690482425298E-9</c:v>
+                </c:pt>
+                <c:pt idx="38">
+                  <c:v>3.3905999477037398E-9</c:v>
+                </c:pt>
+                <c:pt idx="39">
+                  <c:v>5.7428691763349601E-9</c:v>
+                </c:pt>
+                <c:pt idx="40">
+                  <c:v>9.7062862816217107E-9</c:v>
+                </c:pt>
+                <c:pt idx="41">
+                  <c:v>1.6368109969663899E-8</c:v>
+                </c:pt>
+                <c:pt idx="42">
+                  <c:v>2.7536790297018201E-8</c:v>
+                </c:pt>
+                <c:pt idx="43">
+                  <c:v>4.6210854835922703E-8</c:v>
+                </c:pt>
+                <c:pt idx="44">
+                  <c:v>7.7345576851538296E-8</c:v>
+                </c:pt>
+                <c:pt idx="45">
+                  <c:v>1.2910136986434699E-7</c:v>
+                </c:pt>
+                <c:pt idx="46">
+                  <c:v>2.1486776201135101E-7</c:v>
+                </c:pt>
+                <c:pt idx="47">
+                  <c:v>3.5652976729943603E-7</c:v>
+                </c:pt>
+                <c:pt idx="48">
+                  <c:v>5.8971385912853696E-7</c:v>
+                </c:pt>
+                <c:pt idx="49">
+                  <c:v>9.7217045288522498E-7</c:v>
+                </c:pt>
+                <c:pt idx="50">
+                  <c:v>1.5970963547810701E-6</c:v>
+                </c:pt>
+                <c:pt idx="51">
+                  <c:v>2.6141886004221799E-6</c:v>
+                </c:pt>
+                <c:pt idx="52">
+                  <c:v>4.2627176990281298E-6</c:v>
+                </c:pt>
+                <c:pt idx="53">
+                  <c:v>6.9231542561457703E-6</c:v>
+                </c:pt>
+                <c:pt idx="54">
+                  <c:v>1.11972196408237E-5</c:v>
+                </c:pt>
+                <c:pt idx="55">
+                  <c:v>1.8031134650944001E-5</c:v>
+                </c:pt>
+                <c:pt idx="56">
+                  <c:v>2.8903960523546E-5</c:v>
+                </c:pt>
+                <c:pt idx="57">
+                  <c:v>4.6113133525381301E-5</c:v>
+                </c:pt>
+                <c:pt idx="58">
+                  <c:v>7.3203718999393305E-5</c:v>
+                </c:pt>
+                <c:pt idx="59">
+                  <c:v>1.15607978008964E-4</c:v>
+                </c:pt>
+                <c:pt idx="60">
+                  <c:v>1.81589271912381E-4</c:v>
+                </c:pt>
+                <c:pt idx="61">
+                  <c:v>2.8362109739201E-4</c:v>
+                </c:pt>
+                <c:pt idx="62">
+                  <c:v>4.4038022544192401E-4</c:v>
+                </c:pt>
+                <c:pt idx="63">
+                  <c:v>6.7959442499584402E-4</c:v>
+                </c:pt>
+                <c:pt idx="64" formatCode="General">
+                  <c:v>1.0420613658444699E-3</c:v>
+                </c:pt>
+                <c:pt idx="65" formatCode="General">
+                  <c:v>1.58724595511126E-3</c:v>
+                </c:pt>
+                <c:pt idx="66" formatCode="General">
+                  <c:v>2.40096617134648E-3</c:v>
+                </c:pt>
+                <c:pt idx="67" formatCode="General">
+                  <c:v>3.6057864178819202E-3</c:v>
+                </c:pt>
+                <c:pt idx="68" formatCode="General">
+                  <c:v>5.3748414397186304E-3</c:v>
+                </c:pt>
+                <c:pt idx="69" formatCode="General">
+                  <c:v>7.9498952957393707E-3</c:v>
+                </c:pt>
+                <c:pt idx="70" formatCode="General">
+                  <c:v>1.16644734276284E-2</c:v>
+                </c:pt>
+                <c:pt idx="71" formatCode="General">
+                  <c:v>1.6972858273465698E-2</c:v>
+                </c:pt>
+                <c:pt idx="72" formatCode="General">
+                  <c:v>2.4485570303917001E-2</c:v>
+                </c:pt>
+                <c:pt idx="73" formatCode="General">
+                  <c:v>3.5011624039207399E-2</c:v>
+                </c:pt>
+                <c:pt idx="74" formatCode="General">
+                  <c:v>4.9607313385134702E-2</c:v>
+                </c:pt>
+                <c:pt idx="75" formatCode="General">
+                  <c:v>6.9630516606184495E-2</c:v>
+                </c:pt>
+                <c:pt idx="76" formatCode="General">
+                  <c:v>9.6798517829139702E-2</c:v>
+                </c:pt>
+                <c:pt idx="77" formatCode="General">
+                  <c:v>0.13324615654004199</c:v>
+                </c:pt>
+                <c:pt idx="78" formatCode="General">
+                  <c:v>0.18157982492110999</c:v>
+                </c:pt>
+                <c:pt idx="79" formatCode="General">
+                  <c:v>0.24492157362684999</c:v>
+                </c:pt>
+                <c:pt idx="80" formatCode="General">
+                  <c:v>0.326936545388615</c:v>
+                </c:pt>
+                <c:pt idx="81" formatCode="General">
+                  <c:v>0.43183634738010002</c:v>
+                </c:pt>
+                <c:pt idx="82" formatCode="General">
+                  <c:v>0.56435101105635999</c:v>
+                </c:pt>
+                <c:pt idx="83" formatCode="General">
+                  <c:v>0.72966304586292796</c:v>
+                </c:pt>
+                <c:pt idx="84" formatCode="General">
+                  <c:v>0.933298865107827</c:v>
+                </c:pt>
+                <c:pt idx="85" formatCode="General">
+                  <c:v>1.1809755319452</c:v>
+                </c:pt>
+                <c:pt idx="86" formatCode="General">
+                  <c:v>1.4784041984605401</c:v>
+                </c:pt>
+                <c:pt idx="87" formatCode="General">
+                  <c:v>1.83105552847393</c:v>
+                </c:pt>
+                <c:pt idx="88" formatCode="General">
+                  <c:v>2.2438964472020699</c:v>
+                </c:pt>
+                <c:pt idx="89" formatCode="General">
+                  <c:v>2.72111133632762</c:v>
+                </c:pt>
+                <c:pt idx="90" formatCode="General">
+                  <c:v>3.2658238732341802</c:v>
+                </c:pt>
+                <c:pt idx="91" formatCode="General">
+                  <c:v>3.8798377226558198</c:v>
+                </c:pt>
+                <c:pt idx="92" formatCode="General">
+                  <c:v>4.5634149379381199</c:v>
+                </c:pt>
+                <c:pt idx="93" formatCode="General">
+                  <c:v>5.3151100469461303</c:v>
+                </c:pt>
+                <c:pt idx="94" formatCode="General">
+                  <c:v>6.1316753544968003</c:v>
+                </c:pt>
+                <c:pt idx="95" formatCode="General">
+                  <c:v>7.0080491076588602</c:v>
+                </c:pt>
+                <c:pt idx="96" formatCode="General">
+                  <c:v>7.9374331030796101</c:v>
+                </c:pt>
+                <c:pt idx="97" formatCode="General">
+                  <c:v>8.9114604491379197</c:v>
+                </c:pt>
+                <c:pt idx="98" formatCode="General">
+                  <c:v>9.92044800129589</c:v>
+                </c:pt>
+                <c:pt idx="99" formatCode="General">
+                  <c:v>10.9537219830476</c:v>
+                </c:pt>
+                <c:pt idx="100" formatCode="General">
+                  <c:v>12</c:v>
+                </c:pt>
+              </c:numCache>
+            </c:numRef>
+          </c:yVal>
+          <c:smooth val="0"/>
+          <c:extLst>
+            <c:ext xmlns:c16="http://schemas.microsoft.com/office/drawing/2014/chart" uri="{C3380CC4-5D6E-409C-BE32-E72D297353CC}">
+              <c16:uniqueId val="{00000003-DF0D-4345-93B5-6FF58968DCA5}"/>
+            </c:ext>
+          </c:extLst>
+        </c:ser>
+        <c:dLbls>
+          <c:showLegendKey val="0"/>
+          <c:showVal val="0"/>
+          <c:showCatName val="0"/>
+          <c:showSerName val="0"/>
+          <c:showPercent val="0"/>
+          <c:showBubbleSize val="0"/>
+        </c:dLbls>
+        <c:axId val="921563791"/>
+        <c:axId val="1147557615"/>
+      </c:scatterChart>
+      <c:valAx>
+        <c:axId val="921563791"/>
+        <c:scaling>
+          <c:orientation val="minMax"/>
+          <c:max val="0.5"/>
+        </c:scaling>
+        <c:delete val="0"/>
+        <c:axPos val="b"/>
+        <c:majorGridlines>
+          <c:spPr>
+            <a:ln w="9525" cap="flat" cmpd="sng" algn="ctr">
+              <a:solidFill>
+                <a:schemeClr val="tx1">
+                  <a:lumMod val="15000"/>
+                  <a:lumOff val="85000"/>
+                </a:schemeClr>
+              </a:solidFill>
+              <a:round/>
+            </a:ln>
+            <a:effectLst/>
+          </c:spPr>
+        </c:majorGridlines>
+        <c:title>
+          <c:tx>
+            <c:rich>
+              <a:bodyPr rot="0" spcFirstLastPara="1" vertOverflow="ellipsis" vert="horz" wrap="square" anchor="ctr" anchorCtr="1"/>
+              <a:lstStyle/>
+              <a:p>
+                <a:pPr>
+                  <a:defRPr sz="1000" b="0" i="0" u="none" strike="noStrike" kern="1200" baseline="0">
+                    <a:solidFill>
+                      <a:schemeClr val="tx1">
+                        <a:lumMod val="65000"/>
+                        <a:lumOff val="35000"/>
+                      </a:schemeClr>
+                    </a:solidFill>
+                    <a:latin typeface="+mn-lt"/>
+                    <a:ea typeface="+mn-ea"/>
+                    <a:cs typeface="+mn-cs"/>
+                  </a:defRPr>
+                </a:pPr>
+                <a:r>
+                  <a:rPr lang="fr-CA"/>
+                  <a:t>r</a:t>
+                </a:r>
+                <a:r>
+                  <a:rPr lang="fr-CA" baseline="0"/>
+                  <a:t> [m]</a:t>
+                </a:r>
+                <a:endParaRPr lang="fr-CA"/>
+              </a:p>
+            </c:rich>
+          </c:tx>
+          <c:overlay val="0"/>
+          <c:spPr>
+            <a:noFill/>
+            <a:ln>
+              <a:noFill/>
+            </a:ln>
+            <a:effectLst/>
+          </c:spPr>
+          <c:txPr>
+            <a:bodyPr rot="0" spcFirstLastPara="1" vertOverflow="ellipsis" vert="horz" wrap="square" anchor="ctr" anchorCtr="1"/>
+            <a:lstStyle/>
+            <a:p>
+              <a:pPr>
+                <a:defRPr sz="1000" b="0" i="0" u="none" strike="noStrike" kern="1200" baseline="0">
+                  <a:solidFill>
+                    <a:schemeClr val="tx1">
+                      <a:lumMod val="65000"/>
+                      <a:lumOff val="35000"/>
+                    </a:schemeClr>
+                  </a:solidFill>
+                  <a:latin typeface="+mn-lt"/>
+                  <a:ea typeface="+mn-ea"/>
+                  <a:cs typeface="+mn-cs"/>
+                </a:defRPr>
+              </a:pPr>
+              <a:endParaRPr lang="fr-FR"/>
+            </a:p>
+          </c:txPr>
+        </c:title>
+        <c:numFmt formatCode="General" sourceLinked="1"/>
+        <c:majorTickMark val="none"/>
+        <c:minorTickMark val="none"/>
+        <c:tickLblPos val="nextTo"/>
+        <c:spPr>
+          <a:noFill/>
+          <a:ln w="9525" cap="flat" cmpd="sng" algn="ctr">
+            <a:solidFill>
+              <a:schemeClr val="tx1">
+                <a:lumMod val="25000"/>
+                <a:lumOff val="75000"/>
+              </a:schemeClr>
+            </a:solidFill>
+            <a:round/>
+          </a:ln>
+          <a:effectLst/>
+        </c:spPr>
+        <c:txPr>
+          <a:bodyPr rot="-60000000" spcFirstLastPara="1" vertOverflow="ellipsis" vert="horz" wrap="square" anchor="ctr" anchorCtr="1"/>
+          <a:lstStyle/>
+          <a:p>
+            <a:pPr>
+              <a:defRPr sz="900" b="0" i="0" u="none" strike="noStrike" kern="1200" baseline="0">
+                <a:solidFill>
+                  <a:schemeClr val="tx1">
+                    <a:lumMod val="65000"/>
+                    <a:lumOff val="35000"/>
+                  </a:schemeClr>
+                </a:solidFill>
+                <a:latin typeface="+mn-lt"/>
+                <a:ea typeface="+mn-ea"/>
+                <a:cs typeface="+mn-cs"/>
+              </a:defRPr>
+            </a:pPr>
+            <a:endParaRPr lang="fr-FR"/>
+          </a:p>
+        </c:txPr>
+        <c:crossAx val="1147557615"/>
+        <c:crosses val="autoZero"/>
+        <c:crossBetween val="midCat"/>
+      </c:valAx>
+      <c:valAx>
+        <c:axId val="1147557615"/>
+        <c:scaling>
+          <c:orientation val="minMax"/>
+        </c:scaling>
+        <c:delete val="0"/>
+        <c:axPos val="l"/>
+        <c:majorGridlines>
+          <c:spPr>
+            <a:ln w="9525" cap="flat" cmpd="sng" algn="ctr">
+              <a:solidFill>
+                <a:schemeClr val="tx1">
+                  <a:lumMod val="15000"/>
+                  <a:lumOff val="85000"/>
+                </a:schemeClr>
+              </a:solidFill>
+              <a:round/>
+            </a:ln>
+            <a:effectLst/>
+          </c:spPr>
+        </c:majorGridlines>
+        <c:title>
+          <c:tx>
+            <c:rich>
+              <a:bodyPr rot="-5400000" spcFirstLastPara="1" vertOverflow="ellipsis" vert="horz" wrap="square" anchor="ctr" anchorCtr="1"/>
+              <a:lstStyle/>
+              <a:p>
+                <a:pPr>
+                  <a:defRPr sz="1000" b="0" i="0" u="none" strike="noStrike" kern="1200" baseline="0">
+                    <a:solidFill>
+                      <a:schemeClr val="tx1">
+                        <a:lumMod val="65000"/>
+                        <a:lumOff val="35000"/>
+                      </a:schemeClr>
+                    </a:solidFill>
+                    <a:latin typeface="+mn-lt"/>
+                    <a:ea typeface="+mn-ea"/>
+                    <a:cs typeface="+mn-cs"/>
+                  </a:defRPr>
+                </a:pPr>
+                <a:r>
+                  <a:rPr lang="fr-CA"/>
+                  <a:t>C [mol/m^3 ]</a:t>
+                </a:r>
+              </a:p>
+            </c:rich>
+          </c:tx>
+          <c:overlay val="0"/>
+          <c:spPr>
+            <a:noFill/>
+            <a:ln>
+              <a:noFill/>
+            </a:ln>
+            <a:effectLst/>
+          </c:spPr>
+          <c:txPr>
+            <a:bodyPr rot="-5400000" spcFirstLastPara="1" vertOverflow="ellipsis" vert="horz" wrap="square" anchor="ctr" anchorCtr="1"/>
+            <a:lstStyle/>
+            <a:p>
+              <a:pPr>
+                <a:defRPr sz="1000" b="0" i="0" u="none" strike="noStrike" kern="1200" baseline="0">
+                  <a:solidFill>
+                    <a:schemeClr val="tx1">
+                      <a:lumMod val="65000"/>
+                      <a:lumOff val="35000"/>
+                    </a:schemeClr>
+                  </a:solidFill>
+                  <a:latin typeface="+mn-lt"/>
+                  <a:ea typeface="+mn-ea"/>
+                  <a:cs typeface="+mn-cs"/>
+                </a:defRPr>
+              </a:pPr>
+              <a:endParaRPr lang="fr-FR"/>
+            </a:p>
+          </c:txPr>
+        </c:title>
+        <c:numFmt formatCode="0.00E+00" sourceLinked="1"/>
+        <c:majorTickMark val="none"/>
+        <c:minorTickMark val="none"/>
+        <c:tickLblPos val="nextTo"/>
+        <c:spPr>
+          <a:noFill/>
+          <a:ln w="9525" cap="flat" cmpd="sng" algn="ctr">
+            <a:solidFill>
+              <a:schemeClr val="tx1">
+                <a:lumMod val="25000"/>
+                <a:lumOff val="75000"/>
+              </a:schemeClr>
+            </a:solidFill>
+            <a:round/>
+          </a:ln>
+          <a:effectLst/>
+        </c:spPr>
+        <c:txPr>
+          <a:bodyPr rot="-60000000" spcFirstLastPara="1" vertOverflow="ellipsis" vert="horz" wrap="square" anchor="ctr" anchorCtr="1"/>
+          <a:lstStyle/>
+          <a:p>
+            <a:pPr>
+              <a:defRPr sz="900" b="0" i="0" u="none" strike="noStrike" kern="1200" baseline="0">
+                <a:solidFill>
+                  <a:schemeClr val="tx1">
+                    <a:lumMod val="65000"/>
+                    <a:lumOff val="35000"/>
+                  </a:schemeClr>
+                </a:solidFill>
+                <a:latin typeface="+mn-lt"/>
+                <a:ea typeface="+mn-ea"/>
+                <a:cs typeface="+mn-cs"/>
+              </a:defRPr>
+            </a:pPr>
+            <a:endParaRPr lang="fr-FR"/>
+          </a:p>
+        </c:txPr>
+        <c:crossAx val="921563791"/>
+        <c:crosses val="autoZero"/>
+        <c:crossBetween val="midCat"/>
+      </c:valAx>
+      <c:spPr>
+        <a:noFill/>
+        <a:ln>
+          <a:noFill/>
+        </a:ln>
+        <a:effectLst/>
+      </c:spPr>
+    </c:plotArea>
+    <c:legend>
+      <c:legendPos val="r"/>
+      <c:overlay val="0"/>
+      <c:spPr>
+        <a:noFill/>
+        <a:ln>
+          <a:noFill/>
+        </a:ln>
+        <a:effectLst/>
+      </c:spPr>
+      <c:txPr>
+        <a:bodyPr rot="0" spcFirstLastPara="1" vertOverflow="ellipsis" vert="horz" wrap="square" anchor="ctr" anchorCtr="1"/>
+        <a:lstStyle/>
+        <a:p>
+          <a:pPr>
+            <a:defRPr sz="900" b="0" i="0" u="none" strike="noStrike" kern="1200" baseline="0">
+              <a:solidFill>
+                <a:schemeClr val="tx1">
+                  <a:lumMod val="65000"/>
+                  <a:lumOff val="35000"/>
+                </a:schemeClr>
+              </a:solidFill>
+              <a:latin typeface="+mn-lt"/>
+              <a:ea typeface="+mn-ea"/>
+              <a:cs typeface="+mn-cs"/>
+            </a:defRPr>
+          </a:pPr>
+          <a:endParaRPr lang="fr-FR"/>
+        </a:p>
+      </c:txPr>
+    </c:legend>
+    <c:plotVisOnly val="1"/>
+    <c:dispBlanksAs val="gap"/>
+    <c:extLst>
+      <c:ext xmlns:c16r3="http://schemas.microsoft.com/office/drawing/2017/03/chart" uri="{56B9EC1D-385E-4148-901F-78D8002777C0}">
+        <c16r3:dataDisplayOptions16>
+          <c16r3:dispNaAsBlank val="1"/>
+        </c16r3:dataDisplayOptions16>
+      </c:ext>
+    </c:extLst>
+    <c:showDLblsOverMax val="0"/>
+  </c:chart>
+  <c:spPr>
+    <a:noFill/>
+    <a:ln>
+      <a:noFill/>
+    </a:ln>
+    <a:effectLst/>
+  </c:spPr>
+  <c:txPr>
+    <a:bodyPr/>
+    <a:lstStyle/>
+    <a:p>
+      <a:pPr>
+        <a:defRPr/>
+      </a:pPr>
+      <a:endParaRPr lang="fr-FR"/>
+    </a:p>
+  </c:txPr>
+  <c:externalData r:id="rId3">
+    <c:autoUpdate val="0"/>
+  </c:externalData>
+</c:chartSpace>
+</file>
+
+<file path=ppt/charts/chart2.xml><?xml version="1.0" encoding="utf-8"?>
+<c:chartSpace xmlns:c="http://schemas.openxmlformats.org/drawingml/2006/chart" xmlns:a="http://schemas.openxmlformats.org/drawingml/2006/main" xmlns:r="http://schemas.openxmlformats.org/officeDocument/2006/relationships" xmlns:c16r2="http://schemas.microsoft.com/office/drawing/2015/06/chart">
+  <c:date1904 val="0"/>
+  <c:lang val="fr-FR"/>
+  <c:roundedCorners val="0"/>
+  <mc:AlternateContent xmlns:mc="http://schemas.openxmlformats.org/markup-compatibility/2006">
+    <mc:Choice xmlns:c14="http://schemas.microsoft.com/office/drawing/2007/8/2/chart" Requires="c14">
+      <c14:style val="102"/>
+    </mc:Choice>
+    <mc:Fallback>
+      <c:style val="2"/>
+    </mc:Fallback>
+  </mc:AlternateContent>
+  <c:chart>
+    <c:title>
+      <c:tx>
+        <c:rich>
+          <a:bodyPr rot="0" spcFirstLastPara="1" vertOverflow="ellipsis" vert="horz" wrap="square" anchor="ctr" anchorCtr="1"/>
+          <a:lstStyle/>
+          <a:p>
+            <a:pPr>
+              <a:defRPr sz="1400" b="0" i="0" u="none" strike="noStrike" kern="1200" spc="0" baseline="0">
+                <a:solidFill>
+                  <a:schemeClr val="tx1">
+                    <a:lumMod val="65000"/>
+                    <a:lumOff val="35000"/>
+                  </a:schemeClr>
+                </a:solidFill>
+                <a:latin typeface="+mn-lt"/>
+                <a:ea typeface="+mn-ea"/>
+                <a:cs typeface="+mn-cs"/>
+              </a:defRPr>
+            </a:pPr>
+            <a:r>
+              <a:rPr lang="en-US" sz="1400" b="0" i="0" u="none" strike="noStrike" kern="1200" spc="0" baseline="0" dirty="0" err="1">
+                <a:solidFill>
+                  <a:prstClr val="black">
+                    <a:lumMod val="65000"/>
+                    <a:lumOff val="35000"/>
+                  </a:prstClr>
+                </a:solidFill>
+              </a:rPr>
+              <a:t>Erreur</a:t>
+            </a:r>
+            <a:r>
+              <a:rPr lang="en-US" sz="1400" b="0" i="0" u="none" strike="noStrike" kern="1200" spc="0" baseline="0" dirty="0">
+                <a:solidFill>
+                  <a:prstClr val="black">
+                    <a:lumMod val="65000"/>
+                    <a:lumOff val="35000"/>
+                  </a:prstClr>
+                </a:solidFill>
+              </a:rPr>
+              <a:t> entre les deux codes </a:t>
+            </a:r>
+            <a:r>
+              <a:rPr lang="en-US" sz="1400" b="0" i="0" u="none" strike="noStrike" kern="1200" spc="0" baseline="0" dirty="0" err="1">
+                <a:solidFill>
+                  <a:prstClr val="black">
+                    <a:lumMod val="65000"/>
+                    <a:lumOff val="35000"/>
+                  </a:prstClr>
+                </a:solidFill>
+              </a:rPr>
+              <a:t>en</a:t>
+            </a:r>
+            <a:r>
+              <a:rPr lang="en-US" sz="1400" b="0" i="0" u="none" strike="noStrike" kern="1200" spc="0" baseline="0" dirty="0">
+                <a:solidFill>
+                  <a:prstClr val="black">
+                    <a:lumMod val="65000"/>
+                    <a:lumOff val="35000"/>
+                  </a:prstClr>
+                </a:solidFill>
+              </a:rPr>
+              <a:t> </a:t>
+            </a:r>
+            <a:r>
+              <a:rPr lang="en-US" sz="1400" b="0" i="0" u="none" strike="noStrike" kern="1200" spc="0" baseline="0" dirty="0" err="1">
+                <a:solidFill>
+                  <a:prstClr val="black">
+                    <a:lumMod val="65000"/>
+                    <a:lumOff val="35000"/>
+                  </a:prstClr>
+                </a:solidFill>
+              </a:rPr>
+              <a:t>fonction</a:t>
+            </a:r>
+            <a:r>
+              <a:rPr lang="en-US" sz="1400" b="0" i="0" u="none" strike="noStrike" kern="1200" spc="0" baseline="0" dirty="0">
+                <a:solidFill>
+                  <a:prstClr val="black">
+                    <a:lumMod val="65000"/>
+                    <a:lumOff val="35000"/>
+                  </a:prstClr>
+                </a:solidFill>
+              </a:rPr>
+              <a:t> de r</a:t>
             </a:r>
           </a:p>
         </c:rich>
@@ -197,23 +2053,13 @@
               <a:cs typeface="+mn-cs"/>
             </a:defRPr>
           </a:pPr>
-          <a:endParaRPr lang="en-US"/>
+          <a:endParaRPr lang="fr-FR"/>
         </a:p>
       </c:txPr>
     </c:title>
     <c:autoTitleDeleted val="0"/>
     <c:plotArea>
-      <c:layout>
-        <c:manualLayout>
-          <c:layoutTarget val="inner"/>
-          <c:xMode val="edge"/>
-          <c:yMode val="edge"/>
-          <c:x val="0.10253092128577232"/>
-          <c:y val="0.11724355934882252"/>
-          <c:w val="0.83784160349879422"/>
-          <c:h val="0.79992084915416872"/>
-        </c:manualLayout>
-      </c:layout>
+      <c:layout/>
       <c:scatterChart>
         <c:scatterStyle val="lineMarker"/>
         <c:varyColors val="0"/>
@@ -222,11 +2068,11 @@
           <c:order val="0"/>
           <c:tx>
             <c:strRef>
-              <c:f>'10e7_D'!$D$1</c:f>
+              <c:f>Feuil1!$C$3</c:f>
               <c:strCache>
                 <c:ptCount val="1"/>
                 <c:pt idx="0">
-                  <c:v>C_Comsol</c:v>
+                  <c:v>Erreur</c:v>
                 </c:pt>
               </c:strCache>
             </c:strRef>
@@ -240,7 +2086,7 @@
           </c:spPr>
           <c:marker>
             <c:symbol val="circle"/>
-            <c:size val="3"/>
+            <c:size val="5"/>
             <c:spPr>
               <a:solidFill>
                 <a:schemeClr val="accent1"/>
@@ -255,7 +2101,7 @@
           </c:marker>
           <c:xVal>
             <c:numRef>
-              <c:f>'10e7_D'!$C$2:$C$102</c:f>
+              <c:f>Feuil1!$B$4:$B$104</c:f>
               <c:numCache>
                 <c:formatCode>General</c:formatCode>
                 <c:ptCount val="101"/>
@@ -567,312 +2413,312 @@
           </c:xVal>
           <c:yVal>
             <c:numRef>
-              <c:f>'10e7_D'!$D$2:$D$102</c:f>
+              <c:f>Feuil1!$C$4:$C$104</c:f>
               <c:numCache>
-                <c:formatCode>0.00E+00</c:formatCode>
+                <c:formatCode>General</c:formatCode>
                 <c:ptCount val="101"/>
                 <c:pt idx="0">
-                  <c:v>1.52621043656057E-17</c:v>
+                  <c:v>1.5262087180991454E-17</c:v>
                 </c:pt>
                 <c:pt idx="1">
-                  <c:v>1.6604600040011101E-17</c:v>
+                  <c:v>1.6604576400521754E-17</c:v>
                 </c:pt>
                 <c:pt idx="2">
-                  <c:v>2.1003753689289399E-17</c:v>
+                  <c:v>2.1003710685174753E-17</c:v>
                 </c:pt>
                 <c:pt idx="3">
-                  <c:v>2.96281246131571E-17</c:v>
+                  <c:v>2.9628032964910253E-17</c:v>
                 </c:pt>
                 <c:pt idx="4">
-                  <c:v>4.4809087703812401E-17</c:v>
+                  <c:v>4.4808878091374298E-17</c:v>
                 </c:pt>
                 <c:pt idx="5">
-                  <c:v>7.0723436579277805E-17</c:v>
+                  <c:v>7.0722940940509683E-17</c:v>
                 </c:pt>
                 <c:pt idx="6">
-                  <c:v>1.1463098654742099E-16</c:v>
+                  <c:v>1.1462979449406947E-16</c:v>
                 </c:pt>
                 <c:pt idx="7">
-                  <c:v>1.8904182847589699E-16</c:v>
+                  <c:v>1.8903893595074296E-16</c:v>
                 </c:pt>
                 <c:pt idx="8">
-                  <c:v>3.1547638027053098E-16</c:v>
+                  <c:v>3.1546933169513705E-16</c:v>
                 </c:pt>
                 <c:pt idx="9">
-                  <c:v>5.3097178379962004E-16</c:v>
+                  <c:v>5.3095458457396674E-16</c:v>
                 </c:pt>
                 <c:pt idx="10">
-                  <c:v>8.9933462294042708E-16</c:v>
+                  <c:v>8.9929268065040554E-16</c:v>
                 </c:pt>
                 <c:pt idx="11">
-                  <c:v>1.5306034872571699E-15</c:v>
+                  <c:v>1.5305014098681199E-15</c:v>
                 </c:pt>
                 <c:pt idx="12">
-                  <c:v>2.61471624332294E-15</c:v>
+                  <c:v>2.6144685603598286E-15</c:v>
                 </c:pt>
                 <c:pt idx="13">
-                  <c:v>4.4797539330269101E-15</c:v>
+                  <c:v>4.4791552301930951E-15</c:v>
                 </c:pt>
                 <c:pt idx="14">
-                  <c:v>7.6926979401759398E-15</c:v>
+                  <c:v>7.691257129549902E-15</c:v>
                 </c:pt>
                 <c:pt idx="15">
-                  <c:v>1.3233702190872501E-14</c:v>
+                  <c:v>1.323025181449766E-14</c:v>
                 </c:pt>
                 <c:pt idx="16">
-                  <c:v>2.2797429212987301E-14</c:v>
+                  <c:v>2.278921035310931E-14</c:v>
                 </c:pt>
                 <c:pt idx="17">
-                  <c:v>3.9313874150974398E-14</c:v>
+                  <c:v>3.9294407453668767E-14</c:v>
                 </c:pt>
                 <c:pt idx="18">
-                  <c:v>6.7848061142049803E-14</c:v>
+                  <c:v>6.7802227916178494E-14</c:v>
                 </c:pt>
                 <c:pt idx="19">
-                  <c:v>1.17153202733983E-13</c:v>
+                  <c:v>1.1704596075403509E-13</c:v>
                 </c:pt>
                 <c:pt idx="20">
-                  <c:v>2.02349885022673E-13</c:v>
+                  <c:v>2.0210057046665576E-13</c:v>
                 </c:pt>
                 <c:pt idx="21">
-                  <c:v>3.4954358728297701E-13</c:v>
+                  <c:v>3.4896782700312436E-13</c:v>
                 </c:pt>
                 <c:pt idx="22">
-                  <c:v>6.03775057898653E-13</c:v>
+                  <c:v>6.0245446643027656E-13</c:v>
                 </c:pt>
                 <c:pt idx="23">
-                  <c:v>1.0426942513292501E-12</c:v>
+                  <c:v>1.0396863990597605E-12</c:v>
                 </c:pt>
                 <c:pt idx="24">
-                  <c:v>1.8000502115900001E-12</c:v>
+                  <c:v>1.7932481579445342E-12</c:v>
                 </c:pt>
                 <c:pt idx="25">
-                  <c:v>3.1059909700163498E-12</c:v>
+                  <c:v>3.0907202939828424E-12</c:v>
                 </c:pt>
                 <c:pt idx="26">
-                  <c:v>5.3561061277385099E-12</c:v>
+                  <c:v>5.3220767277657212E-12</c:v>
                 </c:pt>
                 <c:pt idx="27">
-                  <c:v>9.2295333816743908E-12</c:v>
+                  <c:v>9.1542715661469574E-12</c:v>
                 </c:pt>
                 <c:pt idx="28">
-                  <c:v>1.5890668649704001E-11</c:v>
+                  <c:v>1.572548429966509E-11</c:v>
                 </c:pt>
                 <c:pt idx="29">
-                  <c:v>2.7333064945810499E-11</c:v>
+                  <c:v>2.6973324875320373E-11</c:v>
                 </c:pt>
                 <c:pt idx="30">
-                  <c:v>4.69646728522176E-11</c:v>
+                  <c:v>4.6187373236668477E-11</c:v>
                 </c:pt>
                 <c:pt idx="31">
-                  <c:v>8.0601845485244501E-11</c:v>
+                  <c:v>7.8935658839449706E-11</c:v>
                 </c:pt>
                 <c:pt idx="32">
-                  <c:v>1.3815411389132901E-10</c:v>
+                  <c:v>1.3461127153380212E-10</c:v>
                 </c:pt>
                 <c:pt idx="33">
-                  <c:v>2.3647351058629898E-10</c:v>
+                  <c:v>2.2900159772163598E-10</c:v>
                 </c:pt>
                 <c:pt idx="34">
-                  <c:v>4.0416222187357401E-10</c:v>
+                  <c:v>3.885334955704477E-10</c:v>
                 </c:pt>
                 <c:pt idx="35">
-                  <c:v>6.8966464792477105E-10</c:v>
+                  <c:v>6.5724649319287297E-10</c:v>
                 </c:pt>
                 <c:pt idx="36">
-                  <c:v>1.1748524425056501E-9</c:v>
+                  <c:v>1.1081736122894859E-9</c:v>
                 </c:pt>
                 <c:pt idx="37">
-                  <c:v>1.9977690482425298E-9</c:v>
+                  <c:v>1.8617857580845849E-9</c:v>
                 </c:pt>
                 <c:pt idx="38">
-                  <c:v>3.3905999477037398E-9</c:v>
+                  <c:v>3.1156556624810059E-9</c:v>
                 </c:pt>
                 <c:pt idx="39">
-                  <c:v>5.7428691763349601E-9</c:v>
+                  <c:v>5.1917699257600253E-9</c:v>
                 </c:pt>
                 <c:pt idx="40">
-                  <c:v>9.7062862816217107E-9</c:v>
+                  <c:v>8.6113068777318516E-9</c:v>
                 </c:pt>
                 <c:pt idx="41">
-                  <c:v>1.6368109969663899E-8</c:v>
+                  <c:v>1.4211663315415978E-8</c:v>
                 </c:pt>
                 <c:pt idx="42">
-                  <c:v>2.7536790297018201E-8</c:v>
+                  <c:v>2.3327641137674161E-8</c:v>
                 </c:pt>
                 <c:pt idx="43">
-                  <c:v>4.6210854835922703E-8</c:v>
+                  <c:v>3.8068698135246483E-8</c:v>
                 </c:pt>
                 <c:pt idx="44">
-                  <c:v>7.7345576851538296E-8</c:v>
+                  <c:v>6.17377888803412E-8</c:v>
                 </c:pt>
                 <c:pt idx="45">
-                  <c:v>1.2910136986434699E-7</c:v>
+                  <c:v>9.9455259786474697E-8</c:v>
                 </c:pt>
                 <c:pt idx="46">
-                  <c:v>2.1486776201135101E-7</c:v>
+                  <c:v>1.5907386349460561E-7</c:v>
                 </c:pt>
                 <c:pt idx="47">
-                  <c:v>3.5652976729943603E-7</c:v>
+                  <c:v>2.5249776302568104E-7</c:v>
                 </c:pt>
                 <c:pt idx="48">
-                  <c:v>5.8971385912853696E-7</c:v>
+                  <c:v>3.9754740081005594E-7</c:v>
                 </c:pt>
                 <c:pt idx="49">
-                  <c:v>9.7217045288522498E-7</c:v>
+                  <c:v>6.2053866418472803E-7</c:v>
                 </c:pt>
                 <c:pt idx="50">
-                  <c:v>1.5970963547810701E-6</c:v>
+                  <c:v>9.5976009424071108E-7</c:v>
                 </c:pt>
                 <c:pt idx="51">
-                  <c:v>2.6141886004221799E-6</c:v>
+                  <c:v>1.47002114234533E-6</c:v>
                 </c:pt>
                 <c:pt idx="52">
-                  <c:v>4.2627176990281298E-6</c:v>
+                  <c:v>2.2283847767965099E-6</c:v>
                 </c:pt>
                 <c:pt idx="53">
-                  <c:v>6.9231542561457703E-6</c:v>
+                  <c:v>3.3410563222239803E-6</c:v>
                 </c:pt>
                 <c:pt idx="54">
-                  <c:v>1.11972196408237E-5</c:v>
+                  <c:v>4.9511340742732999E-6</c:v>
                 </c:pt>
                 <c:pt idx="55">
-                  <c:v>1.8031134650944001E-5</c:v>
+                  <c:v>7.2464844028044009E-6</c:v>
                 </c:pt>
                 <c:pt idx="56">
-                  <c:v>2.8903960523546E-5</c:v>
+                  <c:v>1.04663317106368E-5</c:v>
                 </c:pt>
                 <c:pt idx="57">
-                  <c:v>4.6113133525381301E-5</c:v>
+                  <c:v>1.49042118381966E-5</c:v>
                 </c:pt>
                 <c:pt idx="58">
-                  <c:v>7.3203718999393305E-5</c:v>
+                  <c:v>2.0903724932641307E-5</c:v>
                 </c:pt>
                 <c:pt idx="59">
-                  <c:v>1.15607978008964E-4</c:v>
+                  <c:v>2.8842116713113789E-5</c:v>
                 </c:pt>
                 <c:pt idx="60">
-                  <c:v>1.81589271912381E-4</c:v>
+                  <c:v>3.9095323120402997E-5</c:v>
                 </c:pt>
                 <c:pt idx="61">
-                  <c:v>2.8362109739201E-4</c:v>
+                  <c:v>5.1977136887755993E-5</c:v>
                 </c:pt>
                 <c:pt idx="62">
-                  <c:v>4.4038022544192401E-4</c:v>
+                  <c:v>6.7645263461472982E-5</c:v>
                 </c:pt>
                 <c:pt idx="63">
-                  <c:v>6.7959442499584402E-4</c:v>
-                </c:pt>
-                <c:pt idx="64" formatCode="General">
-                  <c:v>1.0420613658444699E-3</c:v>
-                </c:pt>
-                <c:pt idx="65" formatCode="General">
-                  <c:v>1.58724595511126E-3</c:v>
-                </c:pt>
-                <c:pt idx="66" formatCode="General">
-                  <c:v>2.40096617134648E-3</c:v>
-                </c:pt>
-                <c:pt idx="67" formatCode="General">
-                  <c:v>3.6057864178819202E-3</c:v>
-                </c:pt>
-                <c:pt idx="68" formatCode="General">
-                  <c:v>5.3748414397186304E-3</c:v>
-                </c:pt>
-                <c:pt idx="69" formatCode="General">
-                  <c:v>7.9498952957393707E-3</c:v>
-                </c:pt>
-                <c:pt idx="70" formatCode="General">
-                  <c:v>1.16644734276284E-2</c:v>
-                </c:pt>
-                <c:pt idx="71" formatCode="General">
-                  <c:v>1.6972858273465698E-2</c:v>
-                </c:pt>
-                <c:pt idx="72" formatCode="General">
-                  <c:v>2.4485570303917001E-2</c:v>
-                </c:pt>
-                <c:pt idx="73" formatCode="General">
-                  <c:v>3.5011624039207399E-2</c:v>
-                </c:pt>
-                <c:pt idx="74" formatCode="General">
-                  <c:v>4.9607313385134702E-2</c:v>
-                </c:pt>
-                <c:pt idx="75" formatCode="General">
-                  <c:v>6.9630516606184495E-2</c:v>
-                </c:pt>
-                <c:pt idx="76" formatCode="General">
-                  <c:v>9.6798517829139702E-2</c:v>
-                </c:pt>
-                <c:pt idx="77" formatCode="General">
-                  <c:v>0.13324615654004199</c:v>
-                </c:pt>
-                <c:pt idx="78" formatCode="General">
-                  <c:v>0.18157982492110999</c:v>
-                </c:pt>
-                <c:pt idx="79" formatCode="General">
-                  <c:v>0.24492157362684999</c:v>
-                </c:pt>
-                <c:pt idx="80" formatCode="General">
-                  <c:v>0.326936545388615</c:v>
-                </c:pt>
-                <c:pt idx="81" formatCode="General">
-                  <c:v>0.43183634738010002</c:v>
-                </c:pt>
-                <c:pt idx="82" formatCode="General">
-                  <c:v>0.56435101105635999</c:v>
-                </c:pt>
-                <c:pt idx="83" formatCode="General">
-                  <c:v>0.72966304586292796</c:v>
-                </c:pt>
-                <c:pt idx="84" formatCode="General">
-                  <c:v>0.933298865107827</c:v>
-                </c:pt>
-                <c:pt idx="85" formatCode="General">
-                  <c:v>1.1809755319452</c:v>
-                </c:pt>
-                <c:pt idx="86" formatCode="General">
-                  <c:v>1.4784041984605401</c:v>
-                </c:pt>
-                <c:pt idx="87" formatCode="General">
-                  <c:v>1.83105552847393</c:v>
-                </c:pt>
-                <c:pt idx="88" formatCode="General">
-                  <c:v>2.2438964472020699</c:v>
-                </c:pt>
-                <c:pt idx="89" formatCode="General">
-                  <c:v>2.72111133632762</c:v>
-                </c:pt>
-                <c:pt idx="90" formatCode="General">
-                  <c:v>3.2658238732341802</c:v>
-                </c:pt>
-                <c:pt idx="91" formatCode="General">
-                  <c:v>3.8798377226558198</c:v>
-                </c:pt>
-                <c:pt idx="92" formatCode="General">
-                  <c:v>4.5634149379381199</c:v>
-                </c:pt>
-                <c:pt idx="93" formatCode="General">
-                  <c:v>5.3151100469461303</c:v>
-                </c:pt>
-                <c:pt idx="94" formatCode="General">
-                  <c:v>6.1316753544968003</c:v>
-                </c:pt>
-                <c:pt idx="95" formatCode="General">
-                  <c:v>7.0080491076588602</c:v>
-                </c:pt>
-                <c:pt idx="96" formatCode="General">
-                  <c:v>7.9374331030796101</c:v>
-                </c:pt>
-                <c:pt idx="97" formatCode="General">
-                  <c:v>8.9114604491379197</c:v>
-                </c:pt>
-                <c:pt idx="98" formatCode="General">
-                  <c:v>9.92044800129589</c:v>
-                </c:pt>
-                <c:pt idx="99" formatCode="General">
-                  <c:v>10.9537219830476</c:v>
-                </c:pt>
-                <c:pt idx="100" formatCode="General">
-                  <c:v>12</c:v>
+                  <c:v>8.5969207216020035E-5</c:v>
+                </c:pt>
+                <c:pt idx="64">
+                  <c:v>1.0636045345204588E-4</c:v>
+                </c:pt>
+                <c:pt idx="65">
+                  <c:v>1.2757577773349002E-4</c:v>
+                </c:pt>
+                <c:pt idx="66">
+                  <c:v>1.4752115971319998E-4</c:v>
+                </c:pt>
+                <c:pt idx="67">
+                  <c:v>1.6310762864967009E-4</c:v>
+                </c:pt>
+                <c:pt idx="68">
+                  <c:v>1.7024114669039053E-4</c:v>
+                </c:pt>
+                <c:pt idx="69">
+                  <c:v>1.6406399102406044E-4</c:v>
+                </c:pt>
+                <c:pt idx="70">
+                  <c:v>1.3959966998229947E-4</c:v>
+                </c:pt>
+                <c:pt idx="71">
+                  <c:v>9.2978131116697865E-5</c:v>
+                </c:pt>
+                <c:pt idx="72">
+                  <c:v>2.3420027246499886E-5</c:v>
+                </c:pt>
+                <c:pt idx="73">
+                  <c:v>6.3877516443301696E-5</c:v>
+                </c:pt>
+                <c:pt idx="74">
+                  <c:v>1.5390159220019656E-4</c:v>
+                </c:pt>
+                <c:pt idx="75">
+                  <c:v>2.1713457431050964E-4</c:v>
+                </c:pt>
+                <c:pt idx="76">
+                  <c:v>2.0434236581100274E-4</c:v>
+                </c:pt>
+                <c:pt idx="77">
+                  <c:v>4.144152558502312E-5</c:v>
+                </c:pt>
+                <c:pt idx="78">
+                  <c:v>3.7466195332200303E-4</c:v>
+                </c:pt>
+                <c:pt idx="79">
+                  <c:v>1.1781194030630049E-3</c:v>
+                </c:pt>
+                <c:pt idx="80">
+                  <c:v>2.5327926370469767E-3</c:v>
+                </c:pt>
+                <c:pt idx="81">
+                  <c:v>4.6262864333659892E-3</c:v>
+                </c:pt>
+                <c:pt idx="82">
+                  <c:v>7.6584307535110252E-3</c:v>
+                </c:pt>
+                <c:pt idx="83">
+                  <c:v>1.1823843564270908E-2</c:v>
+                </c:pt>
+                <c:pt idx="84">
+                  <c:v>1.7288989526774046E-2</c:v>
+                </c:pt>
+                <c:pt idx="85">
+                  <c:v>2.4165056877869961E-2</c:v>
+                </c:pt>
+                <c:pt idx="86">
+                  <c:v>3.2478851824770061E-2</c:v>
+                </c:pt>
+                <c:pt idx="87">
+                  <c:v>4.214457970003016E-2</c:v>
+                </c:pt>
+                <c:pt idx="88">
+                  <c:v>5.2939681872879785E-2</c:v>
+                </c:pt>
+                <c:pt idx="89">
+                  <c:v>6.4487717439659864E-2</c:v>
+                </c:pt>
+                <c:pt idx="90">
+                  <c:v>7.62505937433402E-2</c:v>
+                </c:pt>
+                <c:pt idx="91">
+                  <c:v>8.7531332320269772E-2</c:v>
+                </c:pt>
+                <c:pt idx="92">
+                  <c:v>9.7487169854230338E-2</c:v>
+                </c:pt>
+                <c:pt idx="93">
+                  <c:v>0.10515136326666052</c:v>
+                </c:pt>
+                <c:pt idx="94">
+                  <c:v>0.10946084213032048</c:v>
+                </c:pt>
+                <c:pt idx="95">
+                  <c:v>0.10928605266802016</c:v>
+                </c:pt>
+                <c:pt idx="96">
+                  <c:v>0.10345911910062</c:v>
+                </c:pt>
+                <c:pt idx="97">
+                  <c:v>9.0796862968689496E-2</c:v>
+                </c:pt>
+                <c:pt idx="98">
+                  <c:v>7.0116208747439401E-2</c:v>
+                </c:pt>
+                <c:pt idx="99">
+                  <c:v>4.0240898832699656E-2</c:v>
+                </c:pt>
+                <c:pt idx="100">
+                  <c:v>0</c:v>
                 </c:pt>
               </c:numCache>
             </c:numRef>
@@ -880,674 +2726,7 @@
           <c:smooth val="0"/>
           <c:extLst>
             <c:ext xmlns:c16="http://schemas.microsoft.com/office/drawing/2014/chart" uri="{C3380CC4-5D6E-409C-BE32-E72D297353CC}">
-              <c16:uniqueId val="{00000000-1A61-4D04-AF37-88C44E152969}"/>
-            </c:ext>
-          </c:extLst>
-        </c:ser>
-        <c:ser>
-          <c:idx val="1"/>
-          <c:order val="1"/>
-          <c:tx>
-            <c:strRef>
-              <c:f>'10e7_D'!$B$1</c:f>
-              <c:strCache>
-                <c:ptCount val="1"/>
-                <c:pt idx="0">
-                  <c:v>C_Différence finies</c:v>
-                </c:pt>
-              </c:strCache>
-            </c:strRef>
-          </c:tx>
-          <c:spPr>
-            <a:ln w="9525" cap="rnd">
-              <a:solidFill>
-                <a:schemeClr val="accent2"/>
-              </a:solidFill>
-              <a:round/>
-            </a:ln>
-            <a:effectLst/>
-          </c:spPr>
-          <c:marker>
-            <c:symbol val="triangle"/>
-            <c:size val="6"/>
-            <c:spPr>
-              <a:solidFill>
-                <a:schemeClr val="accent2"/>
-              </a:solidFill>
-              <a:ln w="9525">
-                <a:noFill/>
-              </a:ln>
-              <a:effectLst/>
-            </c:spPr>
-          </c:marker>
-          <c:xVal>
-            <c:numRef>
-              <c:f>'10e7_D'!$A$2:$A$102</c:f>
-              <c:numCache>
-                <c:formatCode>General</c:formatCode>
-                <c:ptCount val="101"/>
-                <c:pt idx="0">
-                  <c:v>0</c:v>
-                </c:pt>
-                <c:pt idx="1">
-                  <c:v>5.0000000000000001E-3</c:v>
-                </c:pt>
-                <c:pt idx="2">
-                  <c:v>0.01</c:v>
-                </c:pt>
-                <c:pt idx="3">
-                  <c:v>1.4999999999999999E-2</c:v>
-                </c:pt>
-                <c:pt idx="4">
-                  <c:v>0.02</c:v>
-                </c:pt>
-                <c:pt idx="5">
-                  <c:v>2.5000000000000001E-2</c:v>
-                </c:pt>
-                <c:pt idx="6">
-                  <c:v>0.03</c:v>
-                </c:pt>
-                <c:pt idx="7">
-                  <c:v>3.5000000000000003E-2</c:v>
-                </c:pt>
-                <c:pt idx="8">
-                  <c:v>0.04</c:v>
-                </c:pt>
-                <c:pt idx="9">
-                  <c:v>4.4999999999999998E-2</c:v>
-                </c:pt>
-                <c:pt idx="10">
-                  <c:v>0.05</c:v>
-                </c:pt>
-                <c:pt idx="11">
-                  <c:v>5.5E-2</c:v>
-                </c:pt>
-                <c:pt idx="12">
-                  <c:v>0.06</c:v>
-                </c:pt>
-                <c:pt idx="13">
-                  <c:v>6.5000000000000002E-2</c:v>
-                </c:pt>
-                <c:pt idx="14">
-                  <c:v>7.0000000000000007E-2</c:v>
-                </c:pt>
-                <c:pt idx="15">
-                  <c:v>7.4999999999999997E-2</c:v>
-                </c:pt>
-                <c:pt idx="16">
-                  <c:v>0.08</c:v>
-                </c:pt>
-                <c:pt idx="17">
-                  <c:v>8.5000000000000006E-2</c:v>
-                </c:pt>
-                <c:pt idx="18">
-                  <c:v>0.09</c:v>
-                </c:pt>
-                <c:pt idx="19">
-                  <c:v>9.5000000000000001E-2</c:v>
-                </c:pt>
-                <c:pt idx="20">
-                  <c:v>0.1</c:v>
-                </c:pt>
-                <c:pt idx="21">
-                  <c:v>0.105</c:v>
-                </c:pt>
-                <c:pt idx="22">
-                  <c:v>0.11</c:v>
-                </c:pt>
-                <c:pt idx="23">
-                  <c:v>0.115</c:v>
-                </c:pt>
-                <c:pt idx="24">
-                  <c:v>0.12</c:v>
-                </c:pt>
-                <c:pt idx="25">
-                  <c:v>0.125</c:v>
-                </c:pt>
-                <c:pt idx="26">
-                  <c:v>0.13</c:v>
-                </c:pt>
-                <c:pt idx="27">
-                  <c:v>0.13500000000000001</c:v>
-                </c:pt>
-                <c:pt idx="28">
-                  <c:v>0.14000000000000001</c:v>
-                </c:pt>
-                <c:pt idx="29">
-                  <c:v>0.14499999999999999</c:v>
-                </c:pt>
-                <c:pt idx="30">
-                  <c:v>0.15</c:v>
-                </c:pt>
-                <c:pt idx="31">
-                  <c:v>0.155</c:v>
-                </c:pt>
-                <c:pt idx="32">
-                  <c:v>0.16</c:v>
-                </c:pt>
-                <c:pt idx="33">
-                  <c:v>0.16500000000000001</c:v>
-                </c:pt>
-                <c:pt idx="34">
-                  <c:v>0.17</c:v>
-                </c:pt>
-                <c:pt idx="35">
-                  <c:v>0.17499999999999999</c:v>
-                </c:pt>
-                <c:pt idx="36">
-                  <c:v>0.18</c:v>
-                </c:pt>
-                <c:pt idx="37">
-                  <c:v>0.185</c:v>
-                </c:pt>
-                <c:pt idx="38">
-                  <c:v>0.19</c:v>
-                </c:pt>
-                <c:pt idx="39">
-                  <c:v>0.19500000000000001</c:v>
-                </c:pt>
-                <c:pt idx="40">
-                  <c:v>0.2</c:v>
-                </c:pt>
-                <c:pt idx="41">
-                  <c:v>0.20499999999999999</c:v>
-                </c:pt>
-                <c:pt idx="42">
-                  <c:v>0.21</c:v>
-                </c:pt>
-                <c:pt idx="43">
-                  <c:v>0.215</c:v>
-                </c:pt>
-                <c:pt idx="44">
-                  <c:v>0.22</c:v>
-                </c:pt>
-                <c:pt idx="45">
-                  <c:v>0.22500000000000001</c:v>
-                </c:pt>
-                <c:pt idx="46">
-                  <c:v>0.23</c:v>
-                </c:pt>
-                <c:pt idx="47">
-                  <c:v>0.23499999999999999</c:v>
-                </c:pt>
-                <c:pt idx="48">
-                  <c:v>0.24</c:v>
-                </c:pt>
-                <c:pt idx="49">
-                  <c:v>0.245</c:v>
-                </c:pt>
-                <c:pt idx="50">
-                  <c:v>0.25</c:v>
-                </c:pt>
-                <c:pt idx="51">
-                  <c:v>0.255</c:v>
-                </c:pt>
-                <c:pt idx="52">
-                  <c:v>0.26</c:v>
-                </c:pt>
-                <c:pt idx="53">
-                  <c:v>0.26500000000000001</c:v>
-                </c:pt>
-                <c:pt idx="54">
-                  <c:v>0.27</c:v>
-                </c:pt>
-                <c:pt idx="55">
-                  <c:v>0.27500000000000002</c:v>
-                </c:pt>
-                <c:pt idx="56">
-                  <c:v>0.28000000000000003</c:v>
-                </c:pt>
-                <c:pt idx="57">
-                  <c:v>0.28499999999999998</c:v>
-                </c:pt>
-                <c:pt idx="58">
-                  <c:v>0.28999999999999998</c:v>
-                </c:pt>
-                <c:pt idx="59">
-                  <c:v>0.29499999999999998</c:v>
-                </c:pt>
-                <c:pt idx="60">
-                  <c:v>0.3</c:v>
-                </c:pt>
-                <c:pt idx="61">
-                  <c:v>0.30499999999999999</c:v>
-                </c:pt>
-                <c:pt idx="62">
-                  <c:v>0.31</c:v>
-                </c:pt>
-                <c:pt idx="63">
-                  <c:v>0.315</c:v>
-                </c:pt>
-                <c:pt idx="64">
-                  <c:v>0.32</c:v>
-                </c:pt>
-                <c:pt idx="65">
-                  <c:v>0.32500000000000001</c:v>
-                </c:pt>
-                <c:pt idx="66">
-                  <c:v>0.33</c:v>
-                </c:pt>
-                <c:pt idx="67">
-                  <c:v>0.33500000000000002</c:v>
-                </c:pt>
-                <c:pt idx="68">
-                  <c:v>0.34</c:v>
-                </c:pt>
-                <c:pt idx="69">
-                  <c:v>0.34499999999999997</c:v>
-                </c:pt>
-                <c:pt idx="70">
-                  <c:v>0.35</c:v>
-                </c:pt>
-                <c:pt idx="71">
-                  <c:v>0.35499999999999998</c:v>
-                </c:pt>
-                <c:pt idx="72">
-                  <c:v>0.36</c:v>
-                </c:pt>
-                <c:pt idx="73">
-                  <c:v>0.36499999999999999</c:v>
-                </c:pt>
-                <c:pt idx="74">
-                  <c:v>0.37</c:v>
-                </c:pt>
-                <c:pt idx="75">
-                  <c:v>0.375</c:v>
-                </c:pt>
-                <c:pt idx="76">
-                  <c:v>0.38</c:v>
-                </c:pt>
-                <c:pt idx="77">
-                  <c:v>0.38500000000000001</c:v>
-                </c:pt>
-                <c:pt idx="78">
-                  <c:v>0.39</c:v>
-                </c:pt>
-                <c:pt idx="79">
-                  <c:v>0.39500000000000002</c:v>
-                </c:pt>
-                <c:pt idx="80">
-                  <c:v>0.4</c:v>
-                </c:pt>
-                <c:pt idx="81">
-                  <c:v>0.40500000000000003</c:v>
-                </c:pt>
-                <c:pt idx="82">
-                  <c:v>0.41</c:v>
-                </c:pt>
-                <c:pt idx="83">
-                  <c:v>0.41499999999999998</c:v>
-                </c:pt>
-                <c:pt idx="84">
-                  <c:v>0.42</c:v>
-                </c:pt>
-                <c:pt idx="85">
-                  <c:v>0.42499999999999999</c:v>
-                </c:pt>
-                <c:pt idx="86">
-                  <c:v>0.43</c:v>
-                </c:pt>
-                <c:pt idx="87">
-                  <c:v>0.435</c:v>
-                </c:pt>
-                <c:pt idx="88">
-                  <c:v>0.44</c:v>
-                </c:pt>
-                <c:pt idx="89">
-                  <c:v>0.44500000000000001</c:v>
-                </c:pt>
-                <c:pt idx="90">
-                  <c:v>0.45</c:v>
-                </c:pt>
-                <c:pt idx="91">
-                  <c:v>0.45500000000000002</c:v>
-                </c:pt>
-                <c:pt idx="92">
-                  <c:v>0.46</c:v>
-                </c:pt>
-                <c:pt idx="93">
-                  <c:v>0.46500000000000002</c:v>
-                </c:pt>
-                <c:pt idx="94">
-                  <c:v>0.47</c:v>
-                </c:pt>
-                <c:pt idx="95">
-                  <c:v>0.47499999999999998</c:v>
-                </c:pt>
-                <c:pt idx="96">
-                  <c:v>0.48</c:v>
-                </c:pt>
-                <c:pt idx="97">
-                  <c:v>0.48499999999999999</c:v>
-                </c:pt>
-                <c:pt idx="98">
-                  <c:v>0.49</c:v>
-                </c:pt>
-                <c:pt idx="99">
-                  <c:v>0.495</c:v>
-                </c:pt>
-                <c:pt idx="100">
-                  <c:v>0.5</c:v>
-                </c:pt>
-              </c:numCache>
-            </c:numRef>
-          </c:xVal>
-          <c:yVal>
-            <c:numRef>
-              <c:f>'10e7_D'!$B$2:$B$102</c:f>
-              <c:numCache>
-                <c:formatCode>0.00E+00</c:formatCode>
-                <c:ptCount val="101"/>
-                <c:pt idx="0">
-                  <c:v>-9.60836520157298E-5</c:v>
-                </c:pt>
-                <c:pt idx="1">
-                  <c:v>-9.60836520157298E-5</c:v>
-                </c:pt>
-                <c:pt idx="2">
-                  <c:v>-9.6083652015729597E-5</c:v>
-                </c:pt>
-                <c:pt idx="3">
-                  <c:v>-9.6083652015729393E-5</c:v>
-                </c:pt>
-                <c:pt idx="4">
-                  <c:v>-9.6083652015729298E-5</c:v>
-                </c:pt>
-                <c:pt idx="5">
-                  <c:v>-9.6083652015729298E-5</c:v>
-                </c:pt>
-                <c:pt idx="6">
-                  <c:v>-9.6083652015729095E-5</c:v>
-                </c:pt>
-                <c:pt idx="7">
-                  <c:v>-9.6083652015729E-5</c:v>
-                </c:pt>
-                <c:pt idx="8">
-                  <c:v>-9.6083652015729204E-5</c:v>
-                </c:pt>
-                <c:pt idx="9">
-                  <c:v>-9.6083652015729204E-5</c:v>
-                </c:pt>
-                <c:pt idx="10">
-                  <c:v>-9.6083652015729095E-5</c:v>
-                </c:pt>
-                <c:pt idx="11">
-                  <c:v>-9.6083652015728905E-5</c:v>
-                </c:pt>
-                <c:pt idx="12">
-                  <c:v>-9.6083652015728499E-5</c:v>
-                </c:pt>
-                <c:pt idx="13">
-                  <c:v>-9.6083652015727997E-5</c:v>
-                </c:pt>
-                <c:pt idx="14">
-                  <c:v>-9.6083652015727103E-5</c:v>
-                </c:pt>
-                <c:pt idx="15">
-                  <c:v>-9.6083652015724799E-5</c:v>
-                </c:pt>
-                <c:pt idx="16">
-                  <c:v>-9.6083652015719703E-5</c:v>
-                </c:pt>
-                <c:pt idx="17">
-                  <c:v>-9.6083652015707994E-5</c:v>
-                </c:pt>
-                <c:pt idx="18">
-                  <c:v>-9.6083652015680496E-5</c:v>
-                </c:pt>
-                <c:pt idx="19">
-                  <c:v>-9.6083652015616501E-5</c:v>
-                </c:pt>
-                <c:pt idx="20">
-                  <c:v>-9.6083652015468805E-5</c:v>
-                </c:pt>
-                <c:pt idx="21">
-                  <c:v>-9.6083652015129003E-5</c:v>
-                </c:pt>
-                <c:pt idx="22">
-                  <c:v>-9.6083652014353703E-5</c:v>
-                </c:pt>
-                <c:pt idx="23">
-                  <c:v>-9.6083652012597594E-5</c:v>
-                </c:pt>
-                <c:pt idx="24">
-                  <c:v>-9.6083652008648198E-5</c:v>
-                </c:pt>
-                <c:pt idx="25">
-                  <c:v>-9.6083651999833594E-5</c:v>
-                </c:pt>
-                <c:pt idx="26">
-                  <c:v>-9.6083651980308996E-5</c:v>
-                </c:pt>
-                <c:pt idx="27">
-                  <c:v>-9.6083651937395597E-5</c:v>
-                </c:pt>
-                <c:pt idx="28">
-                  <c:v>-9.6083651843812605E-5</c:v>
-                </c:pt>
-                <c:pt idx="29">
-                  <c:v>-9.6083651641350006E-5</c:v>
-                </c:pt>
-                <c:pt idx="30">
-                  <c:v>-9.6083651206848802E-5</c:v>
-                </c:pt>
-                <c:pt idx="31">
-                  <c:v>-9.6083650281958606E-5</c:v>
-                </c:pt>
-                <c:pt idx="32">
-                  <c:v>-9.6083648329423697E-5</c:v>
-                </c:pt>
-                <c:pt idx="33">
-                  <c:v>-9.6083644241769302E-5</c:v>
-                </c:pt>
-                <c:pt idx="34">
-                  <c:v>-9.6083635756327298E-5</c:v>
-                </c:pt>
-                <c:pt idx="35">
-                  <c:v>-9.6083618291720104E-5</c:v>
-                </c:pt>
-                <c:pt idx="36">
-                  <c:v>-9.6083582655866895E-5</c:v>
-                </c:pt>
-                <c:pt idx="37">
-                  <c:v>-9.6083510574989603E-5</c:v>
-                </c:pt>
-                <c:pt idx="38">
-                  <c:v>-9.6083366058067194E-5</c:v>
-                </c:pt>
-                <c:pt idx="39">
-                  <c:v>-9.6083078884297201E-5</c:v>
-                </c:pt>
-                <c:pt idx="40">
-                  <c:v>-9.6082513348091201E-5</c:v>
-                </c:pt>
-                <c:pt idx="41">
-                  <c:v>-9.6081409706141996E-5</c:v>
-                </c:pt>
-                <c:pt idx="42">
-                  <c:v>-9.6079275624365494E-5</c:v>
-                </c:pt>
-                <c:pt idx="43">
-                  <c:v>-9.6075187046718396E-5</c:v>
-                </c:pt>
-                <c:pt idx="44">
-                  <c:v>-9.6067426803328804E-5</c:v>
-                </c:pt>
-                <c:pt idx="45">
-                  <c:v>-9.6052835832907506E-5</c:v>
-                </c:pt>
-                <c:pt idx="46">
-                  <c:v>-9.6025661252154395E-5</c:v>
-                </c:pt>
-                <c:pt idx="47">
-                  <c:v>-9.5975533791046197E-5</c:v>
-                </c:pt>
-                <c:pt idx="48">
-                  <c:v>-9.5883956601005795E-5</c:v>
-                </c:pt>
-                <c:pt idx="49">
-                  <c:v>-9.5718279512495703E-5</c:v>
-                </c:pt>
-                <c:pt idx="50">
-                  <c:v>-9.5421477985873504E-5</c:v>
-                </c:pt>
-                <c:pt idx="51">
-                  <c:v>-9.4895020199842198E-5</c:v>
-                </c:pt>
-                <c:pt idx="52">
-                  <c:v>-9.3970492045096003E-5</c:v>
-                </c:pt>
-                <c:pt idx="53">
-                  <c:v>-9.2363175090536697E-5</c:v>
-                </c:pt>
-                <c:pt idx="54">
-                  <c:v>-8.9597038940369094E-5</c:v>
-                </c:pt>
-                <c:pt idx="55">
-                  <c:v>-8.48850714188748E-5</c:v>
-                </c:pt>
-                <c:pt idx="56">
-                  <c:v>-7.6940800792860305E-5</c:v>
-                </c:pt>
-                <c:pt idx="57">
-                  <c:v>-6.3685325192314602E-5</c:v>
-                </c:pt>
-                <c:pt idx="58">
-                  <c:v>-4.1797987952240599E-5</c:v>
-                </c:pt>
-                <c:pt idx="59">
-                  <c:v>-6.0366360460219403E-6</c:v>
-                </c:pt>
-                <c:pt idx="60">
-                  <c:v>5.1776382403345297E-5</c:v>
-                </c:pt>
-                <c:pt idx="61" formatCode="General">
-                  <c:v>1.4424528643802601E-4</c:v>
-                </c:pt>
-                <c:pt idx="62" formatCode="General">
-                  <c:v>2.9056137162257299E-4</c:v>
-                </c:pt>
-                <c:pt idx="63" formatCode="General">
-                  <c:v>5.19586437101442E-4</c:v>
-                </c:pt>
-                <c:pt idx="64" formatCode="General">
-                  <c:v>8.7418517237776102E-4</c:v>
-                </c:pt>
-                <c:pt idx="65" formatCode="General">
-                  <c:v>1.4172148874191199E-3</c:v>
-                </c:pt>
-                <c:pt idx="66" formatCode="General">
-                  <c:v>2.2396690149511802E-3</c:v>
-                </c:pt>
-                <c:pt idx="67" formatCode="General">
-                  <c:v>3.4715572643332399E-3</c:v>
-                </c:pt>
-                <c:pt idx="68" formatCode="General">
-                  <c:v>5.2961788273332196E-3</c:v>
-                </c:pt>
-                <c:pt idx="69" formatCode="General">
-                  <c:v>7.9684896423662908E-3</c:v>
-                </c:pt>
-                <c:pt idx="70" formatCode="General">
-                  <c:v>1.18382595903234E-2</c:v>
-                </c:pt>
-                <c:pt idx="71" formatCode="General">
-                  <c:v>1.7378635465595399E-2</c:v>
-                </c:pt>
-                <c:pt idx="72" formatCode="General">
-                  <c:v>2.52205426500616E-2</c:v>
-                </c:pt>
-                <c:pt idx="73" formatCode="General">
-                  <c:v>3.6193044532547403E-2</c:v>
-                </c:pt>
-                <c:pt idx="74" formatCode="General">
-                  <c:v>5.1369309814929202E-2</c:v>
-                </c:pt>
-                <c:pt idx="75" formatCode="General">
-                  <c:v>7.2117199384727895E-2</c:v>
-                </c:pt>
-                <c:pt idx="76" formatCode="General">
-                  <c:v>0.100152677838731</c:v>
-                </c:pt>
-                <c:pt idx="77" formatCode="General">
-                  <c:v>0.13759330419037</c:v>
-                </c:pt>
-                <c:pt idx="78" formatCode="General">
-                  <c:v>0.187008014750316</c:v>
-                </c:pt>
-                <c:pt idx="79" formatCode="General">
-                  <c:v>0.25145836430007501</c:v>
-                </c:pt>
-                <c:pt idx="80" formatCode="General">
-                  <c:v>0.334525458082435</c:v>
-                </c:pt>
-                <c:pt idx="81" formatCode="General">
-                  <c:v>0.44031613342543202</c:v>
-                </c:pt>
-                <c:pt idx="82" formatCode="General">
-                  <c:v>0.57344169947356105</c:v>
-                </c:pt>
-                <c:pt idx="83" formatCode="General">
-                  <c:v>0.73896287916935</c:v>
-                </c:pt>
-                <c:pt idx="84" formatCode="General">
-                  <c:v>0.942295657721269</c:v>
-                </c:pt>
-                <c:pt idx="85" formatCode="General">
-                  <c:v>1.1890746135038901</c:v>
-                </c:pt>
-                <c:pt idx="86" formatCode="General">
-                  <c:v>1.4849729995830601</c:v>
-                </c:pt>
-                <c:pt idx="87" formatCode="General">
-                  <c:v>1.8354822649167699</c:v>
-                </c:pt>
-                <c:pt idx="88" formatCode="General">
-                  <c:v>2.2456576479357802</c:v>
-                </c:pt>
-                <c:pt idx="89" formatCode="General">
-                  <c:v>2.7198406230882899</c:v>
-                </c:pt>
-                <c:pt idx="90" formatCode="General">
-                  <c:v>3.2613729203076902</c:v>
-                </c:pt>
-                <c:pt idx="91" formatCode="General">
-                  <c:v>3.8723200982555399</c:v>
-                </c:pt>
-                <c:pt idx="92" formatCode="General">
-                  <c:v>4.5532247604386296</c:v>
-                </c:pt>
-                <c:pt idx="93" formatCode="General">
-                  <c:v>5.3029100441921004</c:v>
-                </c:pt>
-                <c:pt idx="94" formatCode="General">
-                  <c:v>6.1183526965827797</c:v>
-                </c:pt>
-                <c:pt idx="95" formatCode="General">
-                  <c:v>6.9946417718452398</c:v>
-                </c:pt>
-                <c:pt idx="96" formatCode="General">
-                  <c:v>7.92503385700003</c:v>
-                </c:pt>
-                <c:pt idx="97" formatCode="General">
-                  <c:v>8.9011091038012804</c:v>
-                </c:pt>
-                <c:pt idx="98" formatCode="General">
-                  <c:v>9.9130247757875392</c:v>
-                </c:pt>
-                <c:pt idx="99" formatCode="General">
-                  <c:v>10.949855226255201</c:v>
-                </c:pt>
-                <c:pt idx="100" formatCode="General">
-                  <c:v>12</c:v>
-                </c:pt>
-              </c:numCache>
-            </c:numRef>
-          </c:yVal>
-          <c:smooth val="0"/>
-          <c:extLst>
-            <c:ext xmlns:c16="http://schemas.microsoft.com/office/drawing/2014/chart" uri="{C3380CC4-5D6E-409C-BE32-E72D297353CC}">
-              <c16:uniqueId val="{00000001-1A61-4D04-AF37-88C44E152969}"/>
+              <c16:uniqueId val="{00000000-E335-4774-81B2-F93069541D17}"/>
             </c:ext>
           </c:extLst>
         </c:ser>
@@ -1559,11 +2738,11 @@
           <c:showPercent val="0"/>
           <c:showBubbleSize val="0"/>
         </c:dLbls>
-        <c:axId val="1661925791"/>
-        <c:axId val="1714937103"/>
+        <c:axId val="1770020943"/>
+        <c:axId val="1046066975"/>
       </c:scatterChart>
       <c:valAx>
-        <c:axId val="1661925791"/>
+        <c:axId val="1770020943"/>
         <c:scaling>
           <c:orientation val="minMax"/>
         </c:scaling>
@@ -1604,7 +2783,7 @@
                 </a:pPr>
                 <a:r>
                   <a:rPr lang="fr-CA"/>
-                  <a:t>r[m]</a:t>
+                  <a:t>r [m]</a:t>
                 </a:r>
               </a:p>
             </c:rich>
@@ -1634,7 +2813,7 @@
                   <a:cs typeface="+mn-cs"/>
                 </a:defRPr>
               </a:pPr>
-              <a:endParaRPr lang="en-US"/>
+              <a:endParaRPr lang="fr-FR"/>
             </a:p>
           </c:txPr>
         </c:title>
@@ -1672,1091 +2851,15 @@
                 <a:cs typeface="+mn-cs"/>
               </a:defRPr>
             </a:pPr>
-            <a:endParaRPr lang="en-US"/>
+            <a:endParaRPr lang="fr-FR"/>
           </a:p>
         </c:txPr>
-        <c:crossAx val="1714937103"/>
+        <c:crossAx val="1046066975"/>
         <c:crosses val="autoZero"/>
         <c:crossBetween val="midCat"/>
       </c:valAx>
       <c:valAx>
-        <c:axId val="1714937103"/>
-        <c:scaling>
-          <c:orientation val="minMax"/>
-          <c:max val="12"/>
-        </c:scaling>
-        <c:delete val="0"/>
-        <c:axPos val="l"/>
-        <c:majorGridlines>
-          <c:spPr>
-            <a:ln w="9525" cap="flat" cmpd="sng" algn="ctr">
-              <a:solidFill>
-                <a:schemeClr val="tx1">
-                  <a:lumMod val="15000"/>
-                  <a:lumOff val="85000"/>
-                </a:schemeClr>
-              </a:solidFill>
-              <a:round/>
-            </a:ln>
-            <a:effectLst/>
-          </c:spPr>
-        </c:majorGridlines>
-        <c:title>
-          <c:tx>
-            <c:rich>
-              <a:bodyPr rot="-5400000" spcFirstLastPara="1" vertOverflow="ellipsis" vert="horz" wrap="square" anchor="ctr" anchorCtr="1"/>
-              <a:lstStyle/>
-              <a:p>
-                <a:pPr>
-                  <a:defRPr sz="1000" b="0" i="0" u="none" strike="noStrike" kern="1200" baseline="0">
-                    <a:solidFill>
-                      <a:schemeClr val="tx1">
-                        <a:lumMod val="65000"/>
-                        <a:lumOff val="35000"/>
-                      </a:schemeClr>
-                    </a:solidFill>
-                    <a:latin typeface="+mn-lt"/>
-                    <a:ea typeface="+mn-ea"/>
-                    <a:cs typeface="+mn-cs"/>
-                  </a:defRPr>
-                </a:pPr>
-                <a:r>
-                  <a:rPr lang="fr-CA"/>
-                  <a:t>C</a:t>
-                </a:r>
-                <a:r>
-                  <a:rPr lang="fr-CA" baseline="0"/>
-                  <a:t> [mol/m^3]</a:t>
-                </a:r>
-                <a:endParaRPr lang="fr-CA"/>
-              </a:p>
-            </c:rich>
-          </c:tx>
-          <c:overlay val="0"/>
-          <c:spPr>
-            <a:noFill/>
-            <a:ln>
-              <a:noFill/>
-            </a:ln>
-            <a:effectLst/>
-          </c:spPr>
-          <c:txPr>
-            <a:bodyPr rot="-5400000" spcFirstLastPara="1" vertOverflow="ellipsis" vert="horz" wrap="square" anchor="ctr" anchorCtr="1"/>
-            <a:lstStyle/>
-            <a:p>
-              <a:pPr>
-                <a:defRPr sz="1000" b="0" i="0" u="none" strike="noStrike" kern="1200" baseline="0">
-                  <a:solidFill>
-                    <a:schemeClr val="tx1">
-                      <a:lumMod val="65000"/>
-                      <a:lumOff val="35000"/>
-                    </a:schemeClr>
-                  </a:solidFill>
-                  <a:latin typeface="+mn-lt"/>
-                  <a:ea typeface="+mn-ea"/>
-                  <a:cs typeface="+mn-cs"/>
-                </a:defRPr>
-              </a:pPr>
-              <a:endParaRPr lang="en-US"/>
-            </a:p>
-          </c:txPr>
-        </c:title>
-        <c:numFmt formatCode="0.00E+00" sourceLinked="1"/>
-        <c:majorTickMark val="none"/>
-        <c:minorTickMark val="none"/>
-        <c:tickLblPos val="nextTo"/>
-        <c:spPr>
-          <a:noFill/>
-          <a:ln w="9525" cap="flat" cmpd="sng" algn="ctr">
-            <a:solidFill>
-              <a:schemeClr val="tx1">
-                <a:lumMod val="25000"/>
-                <a:lumOff val="75000"/>
-              </a:schemeClr>
-            </a:solidFill>
-            <a:round/>
-          </a:ln>
-          <a:effectLst/>
-        </c:spPr>
-        <c:txPr>
-          <a:bodyPr rot="-60000000" spcFirstLastPara="1" vertOverflow="ellipsis" vert="horz" wrap="square" anchor="ctr" anchorCtr="1"/>
-          <a:lstStyle/>
-          <a:p>
-            <a:pPr>
-              <a:defRPr sz="900" b="0" i="0" u="none" strike="noStrike" kern="1200" baseline="0">
-                <a:solidFill>
-                  <a:schemeClr val="tx1">
-                    <a:lumMod val="65000"/>
-                    <a:lumOff val="35000"/>
-                  </a:schemeClr>
-                </a:solidFill>
-                <a:latin typeface="+mn-lt"/>
-                <a:ea typeface="+mn-ea"/>
-                <a:cs typeface="+mn-cs"/>
-              </a:defRPr>
-            </a:pPr>
-            <a:endParaRPr lang="en-US"/>
-          </a:p>
-        </c:txPr>
-        <c:crossAx val="1661925791"/>
-        <c:crosses val="autoZero"/>
-        <c:crossBetween val="midCat"/>
-      </c:valAx>
-      <c:spPr>
-        <a:noFill/>
-        <a:ln>
-          <a:noFill/>
-        </a:ln>
-        <a:effectLst/>
-      </c:spPr>
-    </c:plotArea>
-    <c:legend>
-      <c:legendPos val="r"/>
-      <c:layout>
-        <c:manualLayout>
-          <c:xMode val="edge"/>
-          <c:yMode val="edge"/>
-          <c:x val="0.79508163565174539"/>
-          <c:y val="0.61749607045918686"/>
-          <c:w val="0.1434474532615366"/>
-          <c:h val="0.10668637970751524"/>
-        </c:manualLayout>
-      </c:layout>
-      <c:overlay val="0"/>
-      <c:spPr>
-        <a:noFill/>
-        <a:ln>
-          <a:noFill/>
-        </a:ln>
-        <a:effectLst/>
-      </c:spPr>
-      <c:txPr>
-        <a:bodyPr rot="0" spcFirstLastPara="1" vertOverflow="ellipsis" vert="horz" wrap="square" anchor="ctr" anchorCtr="1"/>
-        <a:lstStyle/>
-        <a:p>
-          <a:pPr>
-            <a:defRPr sz="900" b="0" i="0" u="none" strike="noStrike" kern="1200" baseline="0">
-              <a:solidFill>
-                <a:schemeClr val="tx1">
-                  <a:lumMod val="65000"/>
-                  <a:lumOff val="35000"/>
-                </a:schemeClr>
-              </a:solidFill>
-              <a:latin typeface="+mn-lt"/>
-              <a:ea typeface="+mn-ea"/>
-              <a:cs typeface="+mn-cs"/>
-            </a:defRPr>
-          </a:pPr>
-          <a:endParaRPr lang="en-US"/>
-        </a:p>
-      </c:txPr>
-    </c:legend>
-    <c:plotVisOnly val="1"/>
-    <c:dispBlanksAs val="gap"/>
-    <c:extLst>
-      <c:ext xmlns:c16r3="http://schemas.microsoft.com/office/drawing/2017/03/chart" uri="{56B9EC1D-385E-4148-901F-78D8002777C0}">
-        <c16r3:dataDisplayOptions16>
-          <c16r3:dispNaAsBlank val="1"/>
-        </c16r3:dataDisplayOptions16>
-      </c:ext>
-    </c:extLst>
-    <c:showDLblsOverMax val="0"/>
-  </c:chart>
-  <c:spPr>
-    <a:noFill/>
-    <a:ln>
-      <a:noFill/>
-    </a:ln>
-    <a:effectLst/>
-  </c:spPr>
-  <c:txPr>
-    <a:bodyPr/>
-    <a:lstStyle/>
-    <a:p>
-      <a:pPr>
-        <a:defRPr/>
-      </a:pPr>
-      <a:endParaRPr lang="en-US"/>
-    </a:p>
-  </c:txPr>
-  <c:externalData r:id="rId3">
-    <c:autoUpdate val="0"/>
-  </c:externalData>
-</c:chartSpace>
-</file>
-
-<file path=ppt/charts/chart2.xml><?xml version="1.0" encoding="utf-8"?>
-<c:chartSpace xmlns:c="http://schemas.openxmlformats.org/drawingml/2006/chart" xmlns:a="http://schemas.openxmlformats.org/drawingml/2006/main" xmlns:r="http://schemas.openxmlformats.org/officeDocument/2006/relationships" xmlns:c16r2="http://schemas.microsoft.com/office/drawing/2015/06/chart">
-  <c:date1904 val="0"/>
-  <c:lang val="en-US"/>
-  <c:roundedCorners val="0"/>
-  <mc:AlternateContent xmlns:mc="http://schemas.openxmlformats.org/markup-compatibility/2006">
-    <mc:Choice xmlns:c14="http://schemas.microsoft.com/office/drawing/2007/8/2/chart" Requires="c14">
-      <c14:style val="102"/>
-    </mc:Choice>
-    <mc:Fallback>
-      <c:style val="2"/>
-    </mc:Fallback>
-  </mc:AlternateContent>
-  <c:chart>
-    <c:title>
-      <c:tx>
-        <c:rich>
-          <a:bodyPr rot="0" spcFirstLastPara="1" vertOverflow="ellipsis" vert="horz" wrap="square" anchor="ctr" anchorCtr="1"/>
-          <a:lstStyle/>
-          <a:p>
-            <a:pPr>
-              <a:defRPr sz="1400" b="0" i="0" u="none" strike="noStrike" kern="1200" spc="0" baseline="0">
-                <a:solidFill>
-                  <a:schemeClr val="tx1">
-                    <a:lumMod val="65000"/>
-                    <a:lumOff val="35000"/>
-                  </a:schemeClr>
-                </a:solidFill>
-                <a:latin typeface="+mn-lt"/>
-                <a:ea typeface="+mn-ea"/>
-                <a:cs typeface="+mn-cs"/>
-              </a:defRPr>
-            </a:pPr>
-            <a:r>
-              <a:rPr lang="en-US"/>
-              <a:t>Erreur entre les deux codes en fonction de r</a:t>
-            </a:r>
-          </a:p>
-        </c:rich>
-      </c:tx>
-      <c:overlay val="0"/>
-      <c:spPr>
-        <a:noFill/>
-        <a:ln>
-          <a:noFill/>
-        </a:ln>
-        <a:effectLst/>
-      </c:spPr>
-      <c:txPr>
-        <a:bodyPr rot="0" spcFirstLastPara="1" vertOverflow="ellipsis" vert="horz" wrap="square" anchor="ctr" anchorCtr="1"/>
-        <a:lstStyle/>
-        <a:p>
-          <a:pPr>
-            <a:defRPr sz="1400" b="0" i="0" u="none" strike="noStrike" kern="1200" spc="0" baseline="0">
-              <a:solidFill>
-                <a:schemeClr val="tx1">
-                  <a:lumMod val="65000"/>
-                  <a:lumOff val="35000"/>
-                </a:schemeClr>
-              </a:solidFill>
-              <a:latin typeface="+mn-lt"/>
-              <a:ea typeface="+mn-ea"/>
-              <a:cs typeface="+mn-cs"/>
-            </a:defRPr>
-          </a:pPr>
-          <a:endParaRPr lang="en-US"/>
-        </a:p>
-      </c:txPr>
-    </c:title>
-    <c:autoTitleDeleted val="0"/>
-    <c:plotArea>
-      <c:layout/>
-      <c:scatterChart>
-        <c:scatterStyle val="lineMarker"/>
-        <c:varyColors val="0"/>
-        <c:ser>
-          <c:idx val="0"/>
-          <c:order val="0"/>
-          <c:tx>
-            <c:strRef>
-              <c:f>'10e7_D'!$E$1</c:f>
-              <c:strCache>
-                <c:ptCount val="1"/>
-                <c:pt idx="0">
-                  <c:v>Erreur</c:v>
-                </c:pt>
-              </c:strCache>
-            </c:strRef>
-          </c:tx>
-          <c:spPr>
-            <a:ln w="25400" cap="rnd">
-              <a:noFill/>
-              <a:round/>
-            </a:ln>
-            <a:effectLst/>
-          </c:spPr>
-          <c:marker>
-            <c:symbol val="circle"/>
-            <c:size val="5"/>
-            <c:spPr>
-              <a:solidFill>
-                <a:schemeClr val="accent1"/>
-              </a:solidFill>
-              <a:ln w="9525">
-                <a:solidFill>
-                  <a:schemeClr val="accent1"/>
-                </a:solidFill>
-              </a:ln>
-              <a:effectLst/>
-            </c:spPr>
-          </c:marker>
-          <c:xVal>
-            <c:numRef>
-              <c:f>'10e7_D'!$C$2:$C$102</c:f>
-              <c:numCache>
-                <c:formatCode>General</c:formatCode>
-                <c:ptCount val="101"/>
-                <c:pt idx="0">
-                  <c:v>0</c:v>
-                </c:pt>
-                <c:pt idx="1">
-                  <c:v>5.0000000000000001E-3</c:v>
-                </c:pt>
-                <c:pt idx="2">
-                  <c:v>0.01</c:v>
-                </c:pt>
-                <c:pt idx="3">
-                  <c:v>1.4999999999999999E-2</c:v>
-                </c:pt>
-                <c:pt idx="4">
-                  <c:v>0.02</c:v>
-                </c:pt>
-                <c:pt idx="5">
-                  <c:v>2.5000000000000001E-2</c:v>
-                </c:pt>
-                <c:pt idx="6">
-                  <c:v>0.03</c:v>
-                </c:pt>
-                <c:pt idx="7">
-                  <c:v>3.5000000000000003E-2</c:v>
-                </c:pt>
-                <c:pt idx="8">
-                  <c:v>0.04</c:v>
-                </c:pt>
-                <c:pt idx="9">
-                  <c:v>4.4999999999999998E-2</c:v>
-                </c:pt>
-                <c:pt idx="10">
-                  <c:v>0.05</c:v>
-                </c:pt>
-                <c:pt idx="11">
-                  <c:v>5.5E-2</c:v>
-                </c:pt>
-                <c:pt idx="12">
-                  <c:v>0.06</c:v>
-                </c:pt>
-                <c:pt idx="13">
-                  <c:v>6.5000000000000002E-2</c:v>
-                </c:pt>
-                <c:pt idx="14">
-                  <c:v>7.0000000000000007E-2</c:v>
-                </c:pt>
-                <c:pt idx="15">
-                  <c:v>7.4999999999999997E-2</c:v>
-                </c:pt>
-                <c:pt idx="16">
-                  <c:v>0.08</c:v>
-                </c:pt>
-                <c:pt idx="17">
-                  <c:v>8.5000000000000006E-2</c:v>
-                </c:pt>
-                <c:pt idx="18">
-                  <c:v>0.09</c:v>
-                </c:pt>
-                <c:pt idx="19">
-                  <c:v>9.5000000000000001E-2</c:v>
-                </c:pt>
-                <c:pt idx="20">
-                  <c:v>0.1</c:v>
-                </c:pt>
-                <c:pt idx="21">
-                  <c:v>0.105</c:v>
-                </c:pt>
-                <c:pt idx="22">
-                  <c:v>0.11</c:v>
-                </c:pt>
-                <c:pt idx="23">
-                  <c:v>0.115</c:v>
-                </c:pt>
-                <c:pt idx="24">
-                  <c:v>0.12</c:v>
-                </c:pt>
-                <c:pt idx="25">
-                  <c:v>0.125</c:v>
-                </c:pt>
-                <c:pt idx="26">
-                  <c:v>0.13</c:v>
-                </c:pt>
-                <c:pt idx="27">
-                  <c:v>0.13500000000000001</c:v>
-                </c:pt>
-                <c:pt idx="28">
-                  <c:v>0.14000000000000001</c:v>
-                </c:pt>
-                <c:pt idx="29">
-                  <c:v>0.14499999999999999</c:v>
-                </c:pt>
-                <c:pt idx="30">
-                  <c:v>0.15</c:v>
-                </c:pt>
-                <c:pt idx="31">
-                  <c:v>0.155</c:v>
-                </c:pt>
-                <c:pt idx="32">
-                  <c:v>0.16</c:v>
-                </c:pt>
-                <c:pt idx="33">
-                  <c:v>0.16500000000000001</c:v>
-                </c:pt>
-                <c:pt idx="34">
-                  <c:v>0.17</c:v>
-                </c:pt>
-                <c:pt idx="35">
-                  <c:v>0.17499999999999999</c:v>
-                </c:pt>
-                <c:pt idx="36">
-                  <c:v>0.18</c:v>
-                </c:pt>
-                <c:pt idx="37">
-                  <c:v>0.185</c:v>
-                </c:pt>
-                <c:pt idx="38">
-                  <c:v>0.19</c:v>
-                </c:pt>
-                <c:pt idx="39">
-                  <c:v>0.19500000000000001</c:v>
-                </c:pt>
-                <c:pt idx="40">
-                  <c:v>0.2</c:v>
-                </c:pt>
-                <c:pt idx="41">
-                  <c:v>0.20499999999999999</c:v>
-                </c:pt>
-                <c:pt idx="42">
-                  <c:v>0.21</c:v>
-                </c:pt>
-                <c:pt idx="43">
-                  <c:v>0.215</c:v>
-                </c:pt>
-                <c:pt idx="44">
-                  <c:v>0.22</c:v>
-                </c:pt>
-                <c:pt idx="45">
-                  <c:v>0.22500000000000001</c:v>
-                </c:pt>
-                <c:pt idx="46">
-                  <c:v>0.23</c:v>
-                </c:pt>
-                <c:pt idx="47">
-                  <c:v>0.23499999999999999</c:v>
-                </c:pt>
-                <c:pt idx="48">
-                  <c:v>0.24</c:v>
-                </c:pt>
-                <c:pt idx="49">
-                  <c:v>0.245</c:v>
-                </c:pt>
-                <c:pt idx="50">
-                  <c:v>0.25</c:v>
-                </c:pt>
-                <c:pt idx="51">
-                  <c:v>0.255</c:v>
-                </c:pt>
-                <c:pt idx="52">
-                  <c:v>0.26</c:v>
-                </c:pt>
-                <c:pt idx="53">
-                  <c:v>0.26500000000000001</c:v>
-                </c:pt>
-                <c:pt idx="54">
-                  <c:v>0.27</c:v>
-                </c:pt>
-                <c:pt idx="55">
-                  <c:v>0.27500000000000002</c:v>
-                </c:pt>
-                <c:pt idx="56">
-                  <c:v>0.28000000000000003</c:v>
-                </c:pt>
-                <c:pt idx="57">
-                  <c:v>0.28499999999999998</c:v>
-                </c:pt>
-                <c:pt idx="58">
-                  <c:v>0.28999999999999998</c:v>
-                </c:pt>
-                <c:pt idx="59">
-                  <c:v>0.29499999999999998</c:v>
-                </c:pt>
-                <c:pt idx="60">
-                  <c:v>0.3</c:v>
-                </c:pt>
-                <c:pt idx="61">
-                  <c:v>0.30499999999999999</c:v>
-                </c:pt>
-                <c:pt idx="62">
-                  <c:v>0.31</c:v>
-                </c:pt>
-                <c:pt idx="63">
-                  <c:v>0.315</c:v>
-                </c:pt>
-                <c:pt idx="64">
-                  <c:v>0.32</c:v>
-                </c:pt>
-                <c:pt idx="65">
-                  <c:v>0.32500000000000001</c:v>
-                </c:pt>
-                <c:pt idx="66">
-                  <c:v>0.33</c:v>
-                </c:pt>
-                <c:pt idx="67">
-                  <c:v>0.33500000000000002</c:v>
-                </c:pt>
-                <c:pt idx="68">
-                  <c:v>0.34</c:v>
-                </c:pt>
-                <c:pt idx="69">
-                  <c:v>0.34499999999999997</c:v>
-                </c:pt>
-                <c:pt idx="70">
-                  <c:v>0.35</c:v>
-                </c:pt>
-                <c:pt idx="71">
-                  <c:v>0.35499999999999998</c:v>
-                </c:pt>
-                <c:pt idx="72">
-                  <c:v>0.36</c:v>
-                </c:pt>
-                <c:pt idx="73">
-                  <c:v>0.36499999999999999</c:v>
-                </c:pt>
-                <c:pt idx="74">
-                  <c:v>0.37</c:v>
-                </c:pt>
-                <c:pt idx="75">
-                  <c:v>0.375</c:v>
-                </c:pt>
-                <c:pt idx="76">
-                  <c:v>0.38</c:v>
-                </c:pt>
-                <c:pt idx="77">
-                  <c:v>0.38500000000000001</c:v>
-                </c:pt>
-                <c:pt idx="78">
-                  <c:v>0.39</c:v>
-                </c:pt>
-                <c:pt idx="79">
-                  <c:v>0.39500000000000002</c:v>
-                </c:pt>
-                <c:pt idx="80">
-                  <c:v>0.4</c:v>
-                </c:pt>
-                <c:pt idx="81">
-                  <c:v>0.40500000000000003</c:v>
-                </c:pt>
-                <c:pt idx="82">
-                  <c:v>0.41</c:v>
-                </c:pt>
-                <c:pt idx="83">
-                  <c:v>0.41499999999999998</c:v>
-                </c:pt>
-                <c:pt idx="84">
-                  <c:v>0.42</c:v>
-                </c:pt>
-                <c:pt idx="85">
-                  <c:v>0.42499999999999999</c:v>
-                </c:pt>
-                <c:pt idx="86">
-                  <c:v>0.43</c:v>
-                </c:pt>
-                <c:pt idx="87">
-                  <c:v>0.435</c:v>
-                </c:pt>
-                <c:pt idx="88">
-                  <c:v>0.44</c:v>
-                </c:pt>
-                <c:pt idx="89">
-                  <c:v>0.44500000000000001</c:v>
-                </c:pt>
-                <c:pt idx="90">
-                  <c:v>0.45</c:v>
-                </c:pt>
-                <c:pt idx="91">
-                  <c:v>0.45500000000000002</c:v>
-                </c:pt>
-                <c:pt idx="92">
-                  <c:v>0.46</c:v>
-                </c:pt>
-                <c:pt idx="93">
-                  <c:v>0.46500000000000002</c:v>
-                </c:pt>
-                <c:pt idx="94">
-                  <c:v>0.47</c:v>
-                </c:pt>
-                <c:pt idx="95">
-                  <c:v>0.47499999999999998</c:v>
-                </c:pt>
-                <c:pt idx="96">
-                  <c:v>0.48</c:v>
-                </c:pt>
-                <c:pt idx="97">
-                  <c:v>0.48499999999999999</c:v>
-                </c:pt>
-                <c:pt idx="98">
-                  <c:v>0.49</c:v>
-                </c:pt>
-                <c:pt idx="99">
-                  <c:v>0.495</c:v>
-                </c:pt>
-                <c:pt idx="100">
-                  <c:v>0.5</c:v>
-                </c:pt>
-              </c:numCache>
-            </c:numRef>
-          </c:xVal>
-          <c:yVal>
-            <c:numRef>
-              <c:f>'10e7_D'!$E$2:$E$102</c:f>
-              <c:numCache>
-                <c:formatCode>General</c:formatCode>
-                <c:ptCount val="101"/>
-                <c:pt idx="0">
-                  <c:v>9.608365201574506E-5</c:v>
-                </c:pt>
-                <c:pt idx="1">
-                  <c:v>9.6083652015746402E-5</c:v>
-                </c:pt>
-                <c:pt idx="2">
-                  <c:v>9.6083652015750603E-5</c:v>
-                </c:pt>
-                <c:pt idx="3">
-                  <c:v>9.6083652015759019E-5</c:v>
-                </c:pt>
-                <c:pt idx="4">
-                  <c:v>9.6083652015774103E-5</c:v>
-                </c:pt>
-                <c:pt idx="5">
-                  <c:v>9.6083652015800016E-5</c:v>
-                </c:pt>
-                <c:pt idx="6">
-                  <c:v>9.6083652015843722E-5</c:v>
-                </c:pt>
-                <c:pt idx="7">
-                  <c:v>9.6083652015918045E-5</c:v>
-                </c:pt>
-                <c:pt idx="8">
-                  <c:v>9.6083652016044679E-5</c:v>
-                </c:pt>
-                <c:pt idx="9">
-                  <c:v>9.6083652016260178E-5</c:v>
-                </c:pt>
-                <c:pt idx="10">
-                  <c:v>9.6083652016628427E-5</c:v>
-                </c:pt>
-                <c:pt idx="11">
-                  <c:v>9.6083652017259514E-5</c:v>
-                </c:pt>
-                <c:pt idx="12">
-                  <c:v>9.6083652018343215E-5</c:v>
-                </c:pt>
-                <c:pt idx="13">
-                  <c:v>9.6083652020207745E-5</c:v>
-                </c:pt>
-                <c:pt idx="14">
-                  <c:v>9.6083652023419802E-5</c:v>
-                </c:pt>
-                <c:pt idx="15">
-                  <c:v>9.6083652028958503E-5</c:v>
-                </c:pt>
-                <c:pt idx="16">
-                  <c:v>9.6083652038517128E-5</c:v>
-                </c:pt>
-                <c:pt idx="17">
-                  <c:v>9.6083652055021869E-5</c:v>
-                </c:pt>
-                <c:pt idx="18">
-                  <c:v>9.6083652083528553E-5</c:v>
-                </c:pt>
-                <c:pt idx="19">
-                  <c:v>9.6083652132769709E-5</c:v>
-                </c:pt>
-                <c:pt idx="20">
-                  <c:v>9.6083652217818688E-5</c:v>
-                </c:pt>
-                <c:pt idx="21">
-                  <c:v>9.6083652364672585E-5</c:v>
-                </c:pt>
-                <c:pt idx="22">
-                  <c:v>9.6083652618128763E-5</c:v>
-                </c:pt>
-                <c:pt idx="23">
-                  <c:v>9.6083653055291845E-5</c:v>
-                </c:pt>
-                <c:pt idx="24">
-                  <c:v>9.6083653808698406E-5</c:v>
-                </c:pt>
-                <c:pt idx="25">
-                  <c:v>9.6083655105824563E-5</c:v>
-                </c:pt>
-                <c:pt idx="26">
-                  <c:v>9.6083657336415126E-5</c:v>
-                </c:pt>
-                <c:pt idx="27">
-                  <c:v>9.608366116692898E-5</c:v>
-                </c:pt>
-                <c:pt idx="28">
-                  <c:v>9.6083667734481255E-5</c:v>
-                </c:pt>
-                <c:pt idx="29">
-                  <c:v>9.6083678974414949E-5</c:v>
-                </c:pt>
-                <c:pt idx="30">
-                  <c:v>9.6083698171521648E-5</c:v>
-                </c:pt>
-                <c:pt idx="31">
-                  <c:v>9.6083730883804089E-5</c:v>
-                </c:pt>
-                <c:pt idx="32">
-                  <c:v>9.6083786483537592E-5</c:v>
-                </c:pt>
-                <c:pt idx="33">
-                  <c:v>9.6083880715279888E-5</c:v>
-                </c:pt>
-                <c:pt idx="34">
-                  <c:v>9.6084039918549176E-5</c:v>
-                </c:pt>
-                <c:pt idx="35">
-                  <c:v>9.6084307956368031E-5</c:v>
-                </c:pt>
-                <c:pt idx="36">
-                  <c:v>9.6084757508309399E-5</c:v>
-                </c:pt>
-                <c:pt idx="37">
-                  <c:v>9.6085508344037843E-5</c:v>
-                </c:pt>
-                <c:pt idx="38">
-                  <c:v>9.6086756658014891E-5</c:v>
-                </c:pt>
-                <c:pt idx="39">
-                  <c:v>9.6088821753473542E-5</c:v>
-                </c:pt>
-                <c:pt idx="40">
-                  <c:v>9.6092219634372824E-5</c:v>
-                </c:pt>
-                <c:pt idx="41">
-                  <c:v>9.6097777816111661E-5</c:v>
-                </c:pt>
-                <c:pt idx="42">
-                  <c:v>9.6106812414662512E-5</c:v>
-                </c:pt>
-                <c:pt idx="43">
-                  <c:v>9.6121397901554313E-5</c:v>
-                </c:pt>
-                <c:pt idx="44">
-                  <c:v>9.6144772380180342E-5</c:v>
-                </c:pt>
-                <c:pt idx="45">
-                  <c:v>9.6181937202771857E-5</c:v>
-                </c:pt>
-                <c:pt idx="46">
-                  <c:v>9.6240529014165739E-5</c:v>
-                </c:pt>
-                <c:pt idx="47">
-                  <c:v>9.6332063558345638E-5</c:v>
-                </c:pt>
-                <c:pt idx="48">
-                  <c:v>9.6473670460134334E-5</c:v>
-                </c:pt>
-                <c:pt idx="49">
-                  <c:v>9.6690449965380925E-5</c:v>
-                </c:pt>
-                <c:pt idx="50">
-                  <c:v>9.701857434065457E-5</c:v>
-                </c:pt>
-                <c:pt idx="51">
-                  <c:v>9.7509208800264382E-5</c:v>
-                </c:pt>
-                <c:pt idx="52">
-                  <c:v>9.8233209744124134E-5</c:v>
-                </c:pt>
-                <c:pt idx="53">
-                  <c:v>9.9286329346682465E-5</c:v>
-                </c:pt>
-                <c:pt idx="54">
-                  <c:v>1.0079425858119279E-4</c:v>
-                </c:pt>
-                <c:pt idx="55">
-                  <c:v>1.029162060698188E-4</c:v>
-                </c:pt>
-                <c:pt idx="56">
-                  <c:v>1.058447613164063E-4</c:v>
-                </c:pt>
-                <c:pt idx="57">
-                  <c:v>1.097984587176959E-4</c:v>
-                </c:pt>
-                <c:pt idx="58">
-                  <c:v>1.150017069516339E-4</c:v>
-                </c:pt>
-                <c:pt idx="59">
-                  <c:v>1.2164461405498594E-4</c:v>
-                </c:pt>
-                <c:pt idx="60">
-                  <c:v>1.2981288950903569E-4</c:v>
-                </c:pt>
-                <c:pt idx="61">
-                  <c:v>1.3937581095398399E-4</c:v>
-                </c:pt>
-                <c:pt idx="62">
-                  <c:v>1.4981885381935102E-4</c:v>
-                </c:pt>
-                <c:pt idx="63">
-                  <c:v>1.6000798789440201E-4</c:v>
-                </c:pt>
-                <c:pt idx="64">
-                  <c:v>1.6787619346670887E-4</c:v>
-                </c:pt>
-                <c:pt idx="65">
-                  <c:v>1.7003106769214005E-4</c:v>
-                </c:pt>
-                <c:pt idx="66">
-                  <c:v>1.6129715639529984E-4</c:v>
-                </c:pt>
-                <c:pt idx="67">
-                  <c:v>1.3422915354868031E-4</c:v>
-                </c:pt>
-                <c:pt idx="68">
-                  <c:v>7.8662612385410786E-5</c:v>
-                </c:pt>
-                <c:pt idx="69">
-                  <c:v>1.8594346626920125E-5</c:v>
-                </c:pt>
-                <c:pt idx="70">
-                  <c:v>1.7378616269500026E-4</c:v>
-                </c:pt>
-                <c:pt idx="71">
-                  <c:v>4.0577719212970056E-4</c:v>
-                </c:pt>
-                <c:pt idx="72">
-                  <c:v>7.349723461445995E-4</c:v>
-                </c:pt>
-                <c:pt idx="73">
-                  <c:v>1.1814204933400033E-3</c:v>
-                </c:pt>
-                <c:pt idx="74">
-                  <c:v>1.7619964297945004E-3</c:v>
-                </c:pt>
-                <c:pt idx="75">
-                  <c:v>2.4866827785434004E-3</c:v>
-                </c:pt>
-                <c:pt idx="76">
-                  <c:v>3.3541600095912949E-3</c:v>
-                </c:pt>
-                <c:pt idx="77">
-                  <c:v>4.3471476503280093E-3</c:v>
-                </c:pt>
-                <c:pt idx="78">
-                  <c:v>5.4281898292060093E-3</c:v>
-                </c:pt>
-                <c:pt idx="79">
-                  <c:v>6.5367906732250181E-3</c:v>
-                </c:pt>
-                <c:pt idx="80">
-                  <c:v>7.5889126938200047E-3</c:v>
-                </c:pt>
-                <c:pt idx="81">
-                  <c:v>8.4797860453320051E-3</c:v>
-                </c:pt>
-                <c:pt idx="82">
-                  <c:v>9.0906884172010649E-3</c:v>
-                </c:pt>
-                <c:pt idx="83">
-                  <c:v>9.299833306422034E-3</c:v>
-                </c:pt>
-                <c:pt idx="84">
-                  <c:v>8.9967926134419951E-3</c:v>
-                </c:pt>
-                <c:pt idx="85">
-                  <c:v>8.0990815586901022E-3</c:v>
-                </c:pt>
-                <c:pt idx="86">
-                  <c:v>6.5688011225200071E-3</c:v>
-                </c:pt>
-                <c:pt idx="87">
-                  <c:v>4.4267364428398626E-3</c:v>
-                </c:pt>
-                <c:pt idx="88">
-                  <c:v>1.761200733710222E-3</c:v>
-                </c:pt>
-                <c:pt idx="89">
-                  <c:v>1.2707132393301457E-3</c:v>
-                </c:pt>
-                <c:pt idx="90">
-                  <c:v>4.4509529264900038E-3</c:v>
-                </c:pt>
-                <c:pt idx="91">
-                  <c:v>7.5176244002799208E-3</c:v>
-                </c:pt>
-                <c:pt idx="92">
-                  <c:v>1.019017749949036E-2</c:v>
-                </c:pt>
-                <c:pt idx="93">
-                  <c:v>1.2200002754029882E-2</c:v>
-                </c:pt>
-                <c:pt idx="94">
-                  <c:v>1.3322657914020652E-2</c:v>
-                </c:pt>
-                <c:pt idx="95">
-                  <c:v>1.3407335813620413E-2</c:v>
-                </c:pt>
-                <c:pt idx="96">
-                  <c:v>1.2399246079580095E-2</c:v>
-                </c:pt>
-                <c:pt idx="97">
-                  <c:v>1.0351345336639284E-2</c:v>
-                </c:pt>
-                <c:pt idx="98">
-                  <c:v>7.4232255083508392E-3</c:v>
-                </c:pt>
-                <c:pt idx="99">
-                  <c:v>3.8667567923997836E-3</c:v>
-                </c:pt>
-                <c:pt idx="100">
-                  <c:v>0</c:v>
-                </c:pt>
-              </c:numCache>
-            </c:numRef>
-          </c:yVal>
-          <c:smooth val="0"/>
-          <c:extLst>
-            <c:ext xmlns:c16="http://schemas.microsoft.com/office/drawing/2014/chart" uri="{C3380CC4-5D6E-409C-BE32-E72D297353CC}">
-              <c16:uniqueId val="{00000000-D254-4B42-ADAB-068A33DC0D2A}"/>
-            </c:ext>
-          </c:extLst>
-        </c:ser>
-        <c:dLbls>
-          <c:showLegendKey val="0"/>
-          <c:showVal val="0"/>
-          <c:showCatName val="0"/>
-          <c:showSerName val="0"/>
-          <c:showPercent val="0"/>
-          <c:showBubbleSize val="0"/>
-        </c:dLbls>
-        <c:axId val="1661928191"/>
-        <c:axId val="1206215520"/>
-      </c:scatterChart>
-      <c:valAx>
-        <c:axId val="1661928191"/>
-        <c:scaling>
-          <c:orientation val="minMax"/>
-        </c:scaling>
-        <c:delete val="0"/>
-        <c:axPos val="b"/>
-        <c:majorGridlines>
-          <c:spPr>
-            <a:ln w="9525" cap="flat" cmpd="sng" algn="ctr">
-              <a:solidFill>
-                <a:schemeClr val="tx1">
-                  <a:lumMod val="15000"/>
-                  <a:lumOff val="85000"/>
-                </a:schemeClr>
-              </a:solidFill>
-              <a:round/>
-            </a:ln>
-            <a:effectLst/>
-          </c:spPr>
-        </c:majorGridlines>
-        <c:title>
-          <c:tx>
-            <c:rich>
-              <a:bodyPr rot="0" spcFirstLastPara="1" vertOverflow="ellipsis" vert="horz" wrap="square" anchor="ctr" anchorCtr="1"/>
-              <a:lstStyle/>
-              <a:p>
-                <a:pPr>
-                  <a:defRPr sz="1000" b="0" i="0" u="none" strike="noStrike" kern="1200" baseline="0">
-                    <a:solidFill>
-                      <a:schemeClr val="tx1">
-                        <a:lumMod val="65000"/>
-                        <a:lumOff val="35000"/>
-                      </a:schemeClr>
-                    </a:solidFill>
-                    <a:latin typeface="+mn-lt"/>
-                    <a:ea typeface="+mn-ea"/>
-                    <a:cs typeface="+mn-cs"/>
-                  </a:defRPr>
-                </a:pPr>
-                <a:r>
-                  <a:rPr lang="fr-CA"/>
-                  <a:t>r[m]</a:t>
-                </a:r>
-              </a:p>
-            </c:rich>
-          </c:tx>
-          <c:overlay val="0"/>
-          <c:spPr>
-            <a:noFill/>
-            <a:ln>
-              <a:noFill/>
-            </a:ln>
-            <a:effectLst/>
-          </c:spPr>
-          <c:txPr>
-            <a:bodyPr rot="0" spcFirstLastPara="1" vertOverflow="ellipsis" vert="horz" wrap="square" anchor="ctr" anchorCtr="1"/>
-            <a:lstStyle/>
-            <a:p>
-              <a:pPr>
-                <a:defRPr sz="1000" b="0" i="0" u="none" strike="noStrike" kern="1200" baseline="0">
-                  <a:solidFill>
-                    <a:schemeClr val="tx1">
-                      <a:lumMod val="65000"/>
-                      <a:lumOff val="35000"/>
-                    </a:schemeClr>
-                  </a:solidFill>
-                  <a:latin typeface="+mn-lt"/>
-                  <a:ea typeface="+mn-ea"/>
-                  <a:cs typeface="+mn-cs"/>
-                </a:defRPr>
-              </a:pPr>
-              <a:endParaRPr lang="en-US"/>
-            </a:p>
-          </c:txPr>
-        </c:title>
-        <c:numFmt formatCode="General" sourceLinked="1"/>
-        <c:majorTickMark val="none"/>
-        <c:minorTickMark val="none"/>
-        <c:tickLblPos val="nextTo"/>
-        <c:spPr>
-          <a:noFill/>
-          <a:ln w="9525" cap="flat" cmpd="sng" algn="ctr">
-            <a:solidFill>
-              <a:schemeClr val="tx1">
-                <a:lumMod val="25000"/>
-                <a:lumOff val="75000"/>
-              </a:schemeClr>
-            </a:solidFill>
-            <a:round/>
-          </a:ln>
-          <a:effectLst/>
-        </c:spPr>
-        <c:txPr>
-          <a:bodyPr rot="-60000000" spcFirstLastPara="1" vertOverflow="ellipsis" vert="horz" wrap="square" anchor="ctr" anchorCtr="1"/>
-          <a:lstStyle/>
-          <a:p>
-            <a:pPr>
-              <a:defRPr sz="900" b="0" i="0" u="none" strike="noStrike" kern="1200" baseline="0">
-                <a:solidFill>
-                  <a:schemeClr val="tx1">
-                    <a:lumMod val="65000"/>
-                    <a:lumOff val="35000"/>
-                  </a:schemeClr>
-                </a:solidFill>
-                <a:latin typeface="+mn-lt"/>
-                <a:ea typeface="+mn-ea"/>
-                <a:cs typeface="+mn-cs"/>
-              </a:defRPr>
-            </a:pPr>
-            <a:endParaRPr lang="en-US"/>
-          </a:p>
-        </c:txPr>
-        <c:crossAx val="1206215520"/>
-        <c:crosses val="autoZero"/>
-        <c:crossBetween val="midCat"/>
-      </c:valAx>
-      <c:valAx>
-        <c:axId val="1206215520"/>
+        <c:axId val="1046066975"/>
         <c:scaling>
           <c:orientation val="minMax"/>
         </c:scaling>
@@ -2796,7 +2899,14 @@
                   </a:defRPr>
                 </a:pPr>
                 <a:r>
-                  <a:rPr lang="fr-CA"/>
+                  <a:rPr lang="fr-CA" sz="1000" b="0" i="0" u="none" strike="noStrike" kern="1200" baseline="0" dirty="0">
+                    <a:solidFill>
+                      <a:prstClr val="black">
+                        <a:lumMod val="65000"/>
+                        <a:lumOff val="35000"/>
+                      </a:prstClr>
+                    </a:solidFill>
+                  </a:rPr>
                   <a:t>Erreur  [mol/m^3]</a:t>
                 </a:r>
               </a:p>
@@ -2827,7 +2937,7 @@
                   <a:cs typeface="+mn-cs"/>
                 </a:defRPr>
               </a:pPr>
-              <a:endParaRPr lang="en-US"/>
+              <a:endParaRPr lang="fr-FR"/>
             </a:p>
           </c:txPr>
         </c:title>
@@ -2865,10 +2975,10 @@
                 <a:cs typeface="+mn-cs"/>
               </a:defRPr>
             </a:pPr>
-            <a:endParaRPr lang="en-US"/>
+            <a:endParaRPr lang="fr-FR"/>
           </a:p>
         </c:txPr>
-        <c:crossAx val="1661928191"/>
+        <c:crossAx val="1770020943"/>
         <c:crosses val="autoZero"/>
         <c:crossBetween val="midCat"/>
       </c:valAx>
@@ -2905,7 +3015,7 @@
       <a:pPr>
         <a:defRPr/>
       </a:pPr>
-      <a:endParaRPr lang="en-US"/>
+      <a:endParaRPr lang="fr-FR"/>
     </a:p>
   </c:txPr>
   <c:externalData r:id="rId3">
@@ -4267,7 +4377,7 @@
           <a:p>
             <a:fld id="{603E9730-38DB-4F77-A139-6CE923099591}" type="slidenum">
               <a:rPr lang="en-CA" smtClean="0"/>
-              <a:t>‹#›</a:t>
+              <a:t>‹N°›</a:t>
             </a:fld>
             <a:endParaRPr lang="en-CA"/>
           </a:p>
@@ -4579,7 +4689,7 @@
           <a:p>
             <a:fld id="{4BD3201E-7DF8-462B-AC18-61E63795AE0D}" type="slidenum">
               <a:rPr lang="en-CA" smtClean="0"/>
-              <a:t>‹#›</a:t>
+              <a:t>‹N°›</a:t>
             </a:fld>
             <a:endParaRPr lang="en-CA"/>
           </a:p>
@@ -4779,7 +4889,7 @@
           <a:p>
             <a:fld id="{4BD3201E-7DF8-462B-AC18-61E63795AE0D}" type="slidenum">
               <a:rPr lang="en-CA" smtClean="0"/>
-              <a:t>‹#›</a:t>
+              <a:t>‹N°›</a:t>
             </a:fld>
             <a:endParaRPr lang="en-CA"/>
           </a:p>
@@ -4989,7 +5099,7 @@
           <a:p>
             <a:fld id="{4BD3201E-7DF8-462B-AC18-61E63795AE0D}" type="slidenum">
               <a:rPr lang="en-CA" smtClean="0"/>
-              <a:t>‹#›</a:t>
+              <a:t>‹N°›</a:t>
             </a:fld>
             <a:endParaRPr lang="en-CA"/>
           </a:p>
@@ -5189,7 +5299,7 @@
           <a:p>
             <a:fld id="{4BD3201E-7DF8-462B-AC18-61E63795AE0D}" type="slidenum">
               <a:rPr lang="en-CA" smtClean="0"/>
-              <a:t>‹#›</a:t>
+              <a:t>‹N°›</a:t>
             </a:fld>
             <a:endParaRPr lang="en-CA"/>
           </a:p>
@@ -5465,7 +5575,7 @@
           <a:p>
             <a:fld id="{4BD3201E-7DF8-462B-AC18-61E63795AE0D}" type="slidenum">
               <a:rPr lang="en-CA" smtClean="0"/>
-              <a:t>‹#›</a:t>
+              <a:t>‹N°›</a:t>
             </a:fld>
             <a:endParaRPr lang="en-CA"/>
           </a:p>
@@ -5733,7 +5843,7 @@
           <a:p>
             <a:fld id="{4BD3201E-7DF8-462B-AC18-61E63795AE0D}" type="slidenum">
               <a:rPr lang="en-CA" smtClean="0"/>
-              <a:t>‹#›</a:t>
+              <a:t>‹N°›</a:t>
             </a:fld>
             <a:endParaRPr lang="en-CA"/>
           </a:p>
@@ -6148,7 +6258,7 @@
           <a:p>
             <a:fld id="{4BD3201E-7DF8-462B-AC18-61E63795AE0D}" type="slidenum">
               <a:rPr lang="en-CA" smtClean="0"/>
-              <a:t>‹#›</a:t>
+              <a:t>‹N°›</a:t>
             </a:fld>
             <a:endParaRPr lang="en-CA"/>
           </a:p>
@@ -6290,7 +6400,7 @@
           <a:p>
             <a:fld id="{4BD3201E-7DF8-462B-AC18-61E63795AE0D}" type="slidenum">
               <a:rPr lang="en-CA" smtClean="0"/>
-              <a:t>‹#›</a:t>
+              <a:t>‹N°›</a:t>
             </a:fld>
             <a:endParaRPr lang="en-CA"/>
           </a:p>
@@ -6403,7 +6513,7 @@
           <a:p>
             <a:fld id="{4BD3201E-7DF8-462B-AC18-61E63795AE0D}" type="slidenum">
               <a:rPr lang="en-CA" smtClean="0"/>
-              <a:t>‹#›</a:t>
+              <a:t>‹N°›</a:t>
             </a:fld>
             <a:endParaRPr lang="en-CA"/>
           </a:p>
@@ -6716,7 +6826,7 @@
           <a:p>
             <a:fld id="{4BD3201E-7DF8-462B-AC18-61E63795AE0D}" type="slidenum">
               <a:rPr lang="en-CA" smtClean="0"/>
-              <a:t>‹#›</a:t>
+              <a:t>‹N°›</a:t>
             </a:fld>
             <a:endParaRPr lang="en-CA"/>
           </a:p>
@@ -7005,7 +7115,7 @@
           <a:p>
             <a:fld id="{4BD3201E-7DF8-462B-AC18-61E63795AE0D}" type="slidenum">
               <a:rPr lang="en-CA" smtClean="0"/>
-              <a:t>‹#›</a:t>
+              <a:t>‹N°›</a:t>
             </a:fld>
             <a:endParaRPr lang="en-CA"/>
           </a:p>
@@ -7284,7 +7394,7 @@
           <a:p>
             <a:fld id="{4BD3201E-7DF8-462B-AC18-61E63795AE0D}" type="slidenum">
               <a:rPr lang="en-CA" smtClean="0"/>
-              <a:t>‹#›</a:t>
+              <a:t>‹N°›</a:t>
             </a:fld>
             <a:endParaRPr lang="en-CA"/>
           </a:p>
@@ -9096,10 +9206,10 @@
       </p:sp>
       <p:graphicFrame>
         <p:nvGraphicFramePr>
-          <p:cNvPr id="10" name="Espace réservé du contenu 9">
+          <p:cNvPr id="5" name="Espace réservé du contenu 4">
             <a:extLst>
               <a:ext uri="{FF2B5EF4-FFF2-40B4-BE49-F238E27FC236}">
-                <a16:creationId xmlns:a16="http://schemas.microsoft.com/office/drawing/2014/main" id="{094E9A4B-AD00-3924-3363-EF562330F6C4}"/>
+                <a16:creationId xmlns:a16="http://schemas.microsoft.com/office/drawing/2014/main" id="{C7D741D0-4715-943A-B4E1-6AC0BE1CA614}"/>
               </a:ext>
             </a:extLst>
           </p:cNvPr>
@@ -9108,11 +9218,6 @@
           </p:cNvGraphicFramePr>
           <p:nvPr>
             <p:ph idx="1"/>
-            <p:extLst>
-              <p:ext uri="{D42A27DB-BD31-4B8C-83A1-F6EECF244321}">
-                <p14:modId xmlns:p14="http://schemas.microsoft.com/office/powerpoint/2010/main" val="43829521"/>
-              </p:ext>
-            </p:extLst>
           </p:nvPr>
         </p:nvGraphicFramePr>
         <p:xfrm>
@@ -9201,10 +9306,10 @@
       </p:sp>
       <p:graphicFrame>
         <p:nvGraphicFramePr>
-          <p:cNvPr id="5" name="Espace réservé du contenu 4">
+          <p:cNvPr id="6" name="Espace réservé du contenu 5">
             <a:extLst>
               <a:ext uri="{FF2B5EF4-FFF2-40B4-BE49-F238E27FC236}">
-                <a16:creationId xmlns:a16="http://schemas.microsoft.com/office/drawing/2014/main" id="{D79B47EE-0925-832D-7DE6-AA39CE555D8D}"/>
+                <a16:creationId xmlns:a16="http://schemas.microsoft.com/office/drawing/2014/main" id="{FC397B37-E644-4F73-FBE7-D8DDD1D5E616}"/>
               </a:ext>
             </a:extLst>
           </p:cNvPr>
@@ -13358,8 +13463,8 @@
           <a:chExt cx="0" cy="0"/>
         </a:xfrm>
       </p:grpSpPr>
-      <mc:AlternateContent xmlns:mc="http://schemas.openxmlformats.org/markup-compatibility/2006">
-        <mc:Choice xmlns:a14="http://schemas.microsoft.com/office/drawing/2010/main" Requires="a14">
+      <mc:AlternateContent xmlns:mc="http://schemas.openxmlformats.org/markup-compatibility/2006" xmlns:a14="http://schemas.microsoft.com/office/drawing/2010/main">
+        <mc:Choice Requires="a14">
           <p:sp>
             <p:nvSpPr>
               <p:cNvPr id="3" name="Content Placeholder 2">
@@ -16572,7 +16677,7 @@
             </p:txBody>
           </p:sp>
         </mc:Choice>
-        <mc:Fallback>
+        <mc:Fallback xmlns="">
           <p:sp>
             <p:nvSpPr>
               <p:cNvPr id="3" name="Content Placeholder 2">

</xml_diff>

<commit_message>
mise en commun des codes + résultats etude de convergence 04/03/2024
</commit_message>
<xml_diff>
--- a/Devoir_2.pptx
+++ b/Devoir_2.pptx
@@ -5,7 +5,7 @@
     <p:sldMasterId id="2147483648" r:id="rId1"/>
   </p:sldMasterIdLst>
   <p:notesMasterIdLst>
-    <p:notesMasterId r:id="rId14"/>
+    <p:notesMasterId r:id="rId17"/>
   </p:notesMasterIdLst>
   <p:sldIdLst>
     <p:sldId id="256" r:id="rId2"/>
@@ -19,7 +19,10 @@
     <p:sldId id="282" r:id="rId10"/>
     <p:sldId id="287" r:id="rId11"/>
     <p:sldId id="284" r:id="rId12"/>
-    <p:sldId id="285" r:id="rId13"/>
+    <p:sldId id="292" r:id="rId13"/>
+    <p:sldId id="291" r:id="rId14"/>
+    <p:sldId id="290" r:id="rId15"/>
+    <p:sldId id="285" r:id="rId16"/>
   </p:sldIdLst>
   <p:sldSz cx="12192000" cy="6858000"/>
   <p:notesSz cx="6858000" cy="9144000"/>
@@ -4108,7 +4111,7 @@
           <a:p>
             <a:fld id="{DAB5DE69-65B2-445A-B9D2-BC2BC199D49F}" type="datetimeFigureOut">
               <a:rPr lang="en-CA" smtClean="0"/>
-              <a:t>2024-03-03</a:t>
+              <a:t>2024-03-04</a:t>
             </a:fld>
             <a:endParaRPr lang="en-CA"/>
           </a:p>
@@ -4525,7 +4528,7 @@
           <a:p>
             <a:fld id="{CF633E34-DD75-4254-AB88-C9D2090F6CC5}" type="datetimeFigureOut">
               <a:rPr lang="en-CA" smtClean="0"/>
-              <a:t>2024-03-03</a:t>
+              <a:t>2024-03-04</a:t>
             </a:fld>
             <a:endParaRPr lang="en-CA"/>
           </a:p>
@@ -4725,7 +4728,7 @@
           <a:p>
             <a:fld id="{CF633E34-DD75-4254-AB88-C9D2090F6CC5}" type="datetimeFigureOut">
               <a:rPr lang="en-CA" smtClean="0"/>
-              <a:t>2024-03-03</a:t>
+              <a:t>2024-03-04</a:t>
             </a:fld>
             <a:endParaRPr lang="en-CA"/>
           </a:p>
@@ -4935,7 +4938,7 @@
           <a:p>
             <a:fld id="{CF633E34-DD75-4254-AB88-C9D2090F6CC5}" type="datetimeFigureOut">
               <a:rPr lang="en-CA" smtClean="0"/>
-              <a:t>2024-03-03</a:t>
+              <a:t>2024-03-04</a:t>
             </a:fld>
             <a:endParaRPr lang="en-CA"/>
           </a:p>
@@ -5135,7 +5138,7 @@
           <a:p>
             <a:fld id="{CF633E34-DD75-4254-AB88-C9D2090F6CC5}" type="datetimeFigureOut">
               <a:rPr lang="en-CA" smtClean="0"/>
-              <a:t>2024-03-03</a:t>
+              <a:t>2024-03-04</a:t>
             </a:fld>
             <a:endParaRPr lang="en-CA"/>
           </a:p>
@@ -5411,7 +5414,7 @@
           <a:p>
             <a:fld id="{CF633E34-DD75-4254-AB88-C9D2090F6CC5}" type="datetimeFigureOut">
               <a:rPr lang="en-CA" smtClean="0"/>
-              <a:t>2024-03-03</a:t>
+              <a:t>2024-03-04</a:t>
             </a:fld>
             <a:endParaRPr lang="en-CA"/>
           </a:p>
@@ -5679,7 +5682,7 @@
           <a:p>
             <a:fld id="{CF633E34-DD75-4254-AB88-C9D2090F6CC5}" type="datetimeFigureOut">
               <a:rPr lang="en-CA" smtClean="0"/>
-              <a:t>2024-03-03</a:t>
+              <a:t>2024-03-04</a:t>
             </a:fld>
             <a:endParaRPr lang="en-CA"/>
           </a:p>
@@ -6094,7 +6097,7 @@
           <a:p>
             <a:fld id="{CF633E34-DD75-4254-AB88-C9D2090F6CC5}" type="datetimeFigureOut">
               <a:rPr lang="en-CA" smtClean="0"/>
-              <a:t>2024-03-03</a:t>
+              <a:t>2024-03-04</a:t>
             </a:fld>
             <a:endParaRPr lang="en-CA"/>
           </a:p>
@@ -6236,7 +6239,7 @@
           <a:p>
             <a:fld id="{CF633E34-DD75-4254-AB88-C9D2090F6CC5}" type="datetimeFigureOut">
               <a:rPr lang="en-CA" smtClean="0"/>
-              <a:t>2024-03-03</a:t>
+              <a:t>2024-03-04</a:t>
             </a:fld>
             <a:endParaRPr lang="en-CA"/>
           </a:p>
@@ -6349,7 +6352,7 @@
           <a:p>
             <a:fld id="{CF633E34-DD75-4254-AB88-C9D2090F6CC5}" type="datetimeFigureOut">
               <a:rPr lang="en-CA" smtClean="0"/>
-              <a:t>2024-03-03</a:t>
+              <a:t>2024-03-04</a:t>
             </a:fld>
             <a:endParaRPr lang="en-CA"/>
           </a:p>
@@ -6662,7 +6665,7 @@
           <a:p>
             <a:fld id="{CF633E34-DD75-4254-AB88-C9D2090F6CC5}" type="datetimeFigureOut">
               <a:rPr lang="en-CA" smtClean="0"/>
-              <a:t>2024-03-03</a:t>
+              <a:t>2024-03-04</a:t>
             </a:fld>
             <a:endParaRPr lang="en-CA"/>
           </a:p>
@@ -6951,7 +6954,7 @@
           <a:p>
             <a:fld id="{CF633E34-DD75-4254-AB88-C9D2090F6CC5}" type="datetimeFigureOut">
               <a:rPr lang="en-CA" smtClean="0"/>
-              <a:t>2024-03-03</a:t>
+              <a:t>2024-03-04</a:t>
             </a:fld>
             <a:endParaRPr lang="en-CA"/>
           </a:p>
@@ -7194,7 +7197,7 @@
           <a:p>
             <a:fld id="{CF633E34-DD75-4254-AB88-C9D2090F6CC5}" type="datetimeFigureOut">
               <a:rPr lang="en-CA" smtClean="0"/>
-              <a:t>2024-03-03</a:t>
+              <a:t>2024-03-04</a:t>
             </a:fld>
             <a:endParaRPr lang="en-CA"/>
           </a:p>
@@ -8072,43 +8075,47 @@
                 </a:r>
                 <a:r>
                   <a:rPr lang="en-CA" sz="1600" b="1" dirty="0"/>
-                  <a:t> 1 (condition de Neumann)</a:t>
-                </a:r>
-                <a:r>
-                  <a:rPr lang="en-CA" sz="1600" b="1" dirty="0">
-                    <a:highlight>
-                      <a:srgbClr val="FFFF00"/>
-                    </a:highlight>
-                  </a:rPr>
+                  <a:t> 1 (condition de Neumann) </a:t>
+                </a:r>
+                <a:r>
+                  <a:rPr lang="en-CA" sz="1600" b="1" dirty="0" err="1"/>
+                  <a:t>maintient</a:t>
+                </a:r>
+                <a:r>
+                  <a:rPr lang="en-CA" sz="1600" b="1" dirty="0"/>
+                  <a:t> de la </a:t>
+                </a:r>
+                <a:r>
+                  <a:rPr lang="en-CA" sz="1600" b="1" dirty="0" err="1"/>
+                  <a:t>même</a:t>
+                </a:r>
+                <a:r>
+                  <a:rPr lang="en-CA" sz="1600" b="1" dirty="0"/>
+                  <a:t> condition qui </a:t>
+                </a:r>
+                <a:r>
+                  <a:rPr lang="en-CA" sz="1600" b="1" dirty="0" err="1"/>
+                  <a:t>représentait</a:t>
+                </a:r>
+                <a:r>
+                  <a:rPr lang="en-CA" sz="1600" b="1" dirty="0"/>
                   <a:t> </a:t>
                 </a:r>
                 <a:r>
-                  <a:rPr lang="en-CA" sz="1600" b="1" dirty="0" err="1">
-                    <a:highlight>
-                      <a:srgbClr val="FFFF00"/>
-                    </a:highlight>
-                  </a:rPr>
+                  <a:rPr lang="en-CA" sz="1600" b="1" dirty="0" err="1"/>
                   <a:t>l’axisymétrie</a:t>
                 </a:r>
                 <a:r>
-                  <a:rPr lang="en-CA" sz="1600" b="1" dirty="0">
-                    <a:highlight>
-                      <a:srgbClr val="FFFF00"/>
-                    </a:highlight>
-                  </a:rPr>
-                  <a:t> </a:t>
-                </a:r>
-                <a:r>
-                  <a:rPr lang="en-CA" sz="1600" b="1" dirty="0" err="1">
-                    <a:highlight>
-                      <a:srgbClr val="FFFF00"/>
-                    </a:highlight>
-                  </a:rPr>
-                  <a:t>demeure</a:t>
-                </a:r>
-                <a:r>
                   <a:rPr lang="en-CA" sz="1600" b="1" dirty="0"/>
-                  <a:t>:</a:t>
+                  <a:t> dans le </a:t>
+                </a:r>
+                <a:r>
+                  <a:rPr lang="en-CA" sz="1600" b="1" dirty="0" err="1"/>
+                  <a:t>problème</a:t>
+                </a:r>
+                <a:r>
+                  <a:rPr lang="en-CA" sz="1600" b="1" dirty="0"/>
+                  <a:t> reel:</a:t>
                 </a:r>
               </a:p>
               <a:p>
@@ -8741,7 +8748,7 @@
                 </a14:m>
                 <a:r>
                   <a:rPr lang="en-CA" sz="1600" dirty="0"/>
-                  <a:t>:</a:t>
+                  <a:t>donné:</a:t>
                 </a:r>
               </a:p>
               <a:p>
@@ -10069,7 +10076,6 @@
                 </a:endParaRPr>
               </a:p>
               <a:p>
-                <a:pPr/>
                 <a:r>
                   <a:rPr lang="en-CA" sz="1600" b="1" dirty="0"/>
                   <a:t>Noeud n (condition de Dirichlet): </a:t>
@@ -10215,7 +10221,6 @@
                 <a:endParaRPr lang="en-CA" sz="1600" dirty="0"/>
               </a:p>
               <a:p>
-                <a:pPr/>
                 <a:endParaRPr lang="en-CA" sz="1600" dirty="0"/>
               </a:p>
               <a:p>
@@ -10228,7 +10233,23 @@
                 </a:r>
                 <a:r>
                   <a:rPr lang="en-CA" sz="1600" dirty="0"/>
-                  <a:t>dans la redaction de la function MMS, </a:t>
+                  <a:t>dans la </a:t>
+                </a:r>
+                <a:r>
+                  <a:rPr lang="en-CA" sz="1600" dirty="0" err="1"/>
+                  <a:t>rédaction</a:t>
+                </a:r>
+                <a:r>
+                  <a:rPr lang="en-CA" sz="1600" dirty="0"/>
+                  <a:t> de la </a:t>
+                </a:r>
+                <a:r>
+                  <a:rPr lang="en-CA" sz="1600" dirty="0" err="1"/>
+                  <a:t>fonction</a:t>
+                </a:r>
+                <a:r>
+                  <a:rPr lang="en-CA" sz="1600" dirty="0"/>
+                  <a:t> MMS, </a:t>
                 </a:r>
                 <a:r>
                   <a:rPr lang="en-CA" sz="1600" dirty="0" err="1"/>
@@ -10651,12 +10672,1550 @@
           <a:chExt cx="0" cy="0"/>
         </a:xfrm>
       </p:grpSpPr>
+      <mc:AlternateContent xmlns:mc="http://schemas.openxmlformats.org/markup-compatibility/2006">
+        <mc:Choice xmlns:a14="http://schemas.microsoft.com/office/drawing/2010/main" Requires="a14">
+          <p:sp>
+            <p:nvSpPr>
+              <p:cNvPr id="3" name="Content Placeholder 2">
+                <a:extLst>
+                  <a:ext uri="{FF2B5EF4-FFF2-40B4-BE49-F238E27FC236}">
+                    <a16:creationId xmlns:a16="http://schemas.microsoft.com/office/drawing/2014/main" id="{AB8F23B5-92F2-64E3-1494-F0465D25937A}"/>
+                  </a:ext>
+                </a:extLst>
+              </p:cNvPr>
+              <p:cNvSpPr>
+                <a:spLocks noGrp="1"/>
+              </p:cNvSpPr>
+              <p:nvPr>
+                <p:ph idx="1"/>
+              </p:nvPr>
+            </p:nvSpPr>
+            <p:spPr>
+              <a:xfrm>
+                <a:off x="248783" y="954957"/>
+                <a:ext cx="11844894" cy="1325563"/>
+              </a:xfrm>
+            </p:spPr>
+            <p:txBody>
+              <a:bodyPr>
+                <a:normAutofit fontScale="77500" lnSpcReduction="20000"/>
+              </a:bodyPr>
+              <a:lstStyle/>
+              <a:p>
+                <a:pPr marL="0" indent="0">
+                  <a:buNone/>
+                </a:pPr>
+                <a:r>
+                  <a:rPr lang="en-CA" sz="1500" b="1" dirty="0"/>
+                  <a:t>Convergence </a:t>
+                </a:r>
+                <a:r>
+                  <a:rPr lang="en-CA" sz="1500" b="1" dirty="0" err="1"/>
+                  <a:t>en</a:t>
+                </a:r>
+                <a:r>
+                  <a:rPr lang="en-CA" sz="1500" b="1" dirty="0"/>
+                  <a:t> </a:t>
+                </a:r>
+                <a:r>
+                  <a:rPr lang="en-CA" sz="1500" b="1" dirty="0" err="1"/>
+                  <a:t>espace</a:t>
+                </a:r>
+                <a:r>
+                  <a:rPr lang="en-CA" sz="1500" b="1" dirty="0"/>
+                  <a:t>:</a:t>
+                </a:r>
+              </a:p>
+              <a:p>
+                <a:pPr marL="0" indent="0">
+                  <a:lnSpc>
+                    <a:spcPct val="110000"/>
+                  </a:lnSpc>
+                  <a:buNone/>
+                </a:pPr>
+                <a:r>
+                  <a:rPr lang="en-CA" sz="1500" dirty="0" err="1"/>
+                  <a:t>L’étude</a:t>
+                </a:r>
+                <a:r>
+                  <a:rPr lang="en-CA" sz="1500" dirty="0"/>
+                  <a:t> a </a:t>
+                </a:r>
+                <a:r>
+                  <a:rPr lang="en-CA" sz="1500" dirty="0" err="1"/>
+                  <a:t>été</a:t>
+                </a:r>
+                <a:r>
+                  <a:rPr lang="en-CA" sz="1500" dirty="0"/>
+                  <a:t> </a:t>
+                </a:r>
+                <a:r>
+                  <a:rPr lang="en-CA" sz="1500" dirty="0" err="1"/>
+                  <a:t>menée</a:t>
+                </a:r>
+                <a:r>
+                  <a:rPr lang="en-CA" sz="1500" dirty="0"/>
+                  <a:t> au temps </a:t>
+                </a:r>
+                <a14:m>
+                  <m:oMath xmlns:m="http://schemas.openxmlformats.org/officeDocument/2006/math">
+                    <m:sSub>
+                      <m:sSubPr>
+                        <m:ctrlPr>
+                          <a:rPr lang="en-CA" sz="1500" b="0" i="1" smtClean="0">
+                            <a:latin typeface="Cambria Math" panose="02040503050406030204" pitchFamily="18" charset="0"/>
+                          </a:rPr>
+                        </m:ctrlPr>
+                      </m:sSubPr>
+                      <m:e>
+                        <m:r>
+                          <a:rPr lang="en-CA" sz="1500" b="0" i="1" smtClean="0">
+                            <a:latin typeface="Cambria Math" panose="02040503050406030204" pitchFamily="18" charset="0"/>
+                          </a:rPr>
+                          <m:t>𝑡</m:t>
+                        </m:r>
+                      </m:e>
+                      <m:sub>
+                        <m:r>
+                          <a:rPr lang="en-CA" sz="1500" b="0" i="1" smtClean="0">
+                            <a:latin typeface="Cambria Math" panose="02040503050406030204" pitchFamily="18" charset="0"/>
+                          </a:rPr>
+                          <m:t>𝑓𝑖𝑛𝑎𝑙</m:t>
+                        </m:r>
+                      </m:sub>
+                    </m:sSub>
+                    <m:r>
+                      <a:rPr lang="en-CA" sz="1500" b="0" i="1" smtClean="0">
+                        <a:latin typeface="Cambria Math" panose="02040503050406030204" pitchFamily="18" charset="0"/>
+                      </a:rPr>
+                      <m:t>=</m:t>
+                    </m:r>
+                    <m:sSup>
+                      <m:sSupPr>
+                        <m:ctrlPr>
+                          <a:rPr lang="en-CA" sz="1500" b="0" i="1" smtClean="0">
+                            <a:latin typeface="Cambria Math" panose="02040503050406030204" pitchFamily="18" charset="0"/>
+                          </a:rPr>
+                        </m:ctrlPr>
+                      </m:sSupPr>
+                      <m:e>
+                        <m:r>
+                          <a:rPr lang="en-CA" sz="1500" b="0" i="1" smtClean="0">
+                            <a:latin typeface="Cambria Math" panose="02040503050406030204" pitchFamily="18" charset="0"/>
+                          </a:rPr>
+                          <m:t>1.10</m:t>
+                        </m:r>
+                      </m:e>
+                      <m:sup>
+                        <m:r>
+                          <a:rPr lang="en-CA" sz="1500" b="0" i="1" smtClean="0">
+                            <a:latin typeface="Cambria Math" panose="02040503050406030204" pitchFamily="18" charset="0"/>
+                          </a:rPr>
+                          <m:t>9</m:t>
+                        </m:r>
+                      </m:sup>
+                    </m:sSup>
+                  </m:oMath>
+                </a14:m>
+                <a:r>
+                  <a:rPr lang="en-CA" sz="1500" dirty="0"/>
+                  <a:t>secondes, début  du </a:t>
+                </a:r>
+                <a:r>
+                  <a:rPr lang="en-CA" sz="1500" dirty="0" err="1"/>
+                  <a:t>régime</a:t>
+                </a:r>
+                <a:r>
+                  <a:rPr lang="en-CA" sz="1500" dirty="0"/>
+                  <a:t> permanent et le pas </a:t>
+                </a:r>
+                <a:r>
+                  <a:rPr lang="en-CA" sz="1500" dirty="0" err="1"/>
+                  <a:t>en</a:t>
+                </a:r>
+                <a:r>
+                  <a:rPr lang="en-CA" sz="1500" dirty="0"/>
+                  <a:t> temps a </a:t>
+                </a:r>
+                <a:r>
+                  <a:rPr lang="en-CA" sz="1500" dirty="0" err="1"/>
+                  <a:t>été</a:t>
+                </a:r>
+                <a:r>
+                  <a:rPr lang="en-CA" sz="1500" dirty="0"/>
+                  <a:t> </a:t>
+                </a:r>
+                <a:r>
+                  <a:rPr lang="en-CA" sz="1500" dirty="0" err="1"/>
+                  <a:t>fixé</a:t>
+                </a:r>
+                <a:r>
+                  <a:rPr lang="en-CA" sz="1500" dirty="0"/>
+                  <a:t> à </a:t>
+                </a:r>
+                <a14:m>
+                  <m:oMath xmlns:m="http://schemas.openxmlformats.org/officeDocument/2006/math">
+                    <m:r>
+                      <m:rPr>
+                        <m:sty m:val="p"/>
+                      </m:rPr>
+                      <a:rPr lang="en-CA" sz="1500" smtClean="0">
+                        <a:latin typeface="Cambria Math" panose="02040503050406030204" pitchFamily="18" charset="0"/>
+                      </a:rPr>
+                      <m:t>Δ</m:t>
+                    </m:r>
+                    <m:r>
+                      <a:rPr lang="en-CA" sz="1500" i="1">
+                        <a:latin typeface="Cambria Math" panose="02040503050406030204" pitchFamily="18" charset="0"/>
+                      </a:rPr>
+                      <m:t>𝑡</m:t>
+                    </m:r>
+                    <m:r>
+                      <a:rPr lang="en-CA" sz="1500" b="0" i="1" smtClean="0">
+                        <a:latin typeface="Cambria Math" panose="02040503050406030204" pitchFamily="18" charset="0"/>
+                      </a:rPr>
+                      <m:t>=5000 </m:t>
+                    </m:r>
+                    <m:r>
+                      <a:rPr lang="en-CA" sz="1500" b="0" i="1" smtClean="0">
+                        <a:latin typeface="Cambria Math" panose="02040503050406030204" pitchFamily="18" charset="0"/>
+                      </a:rPr>
+                      <m:t>𝑠𝑒𝑐</m:t>
+                    </m:r>
+                    <m:r>
+                      <a:rPr lang="en-CA" sz="1500" b="0" i="1" smtClean="0">
+                        <a:latin typeface="Cambria Math" panose="02040503050406030204" pitchFamily="18" charset="0"/>
+                      </a:rPr>
+                      <m:t>. </m:t>
+                    </m:r>
+                  </m:oMath>
+                </a14:m>
+                <a:r>
+                  <a:rPr lang="en-CA" sz="1500" dirty="0" err="1"/>
+                  <a:t>en</a:t>
+                </a:r>
+                <a:r>
+                  <a:rPr lang="en-CA" sz="1500" dirty="0"/>
+                  <a:t> </a:t>
+                </a:r>
+                <a:r>
+                  <a:rPr lang="en-CA" sz="1500" dirty="0" err="1"/>
+                  <a:t>fonction</a:t>
+                </a:r>
+                <a:r>
+                  <a:rPr lang="en-CA" sz="1500" dirty="0"/>
+                  <a:t> d’un pas </a:t>
+                </a:r>
+                <a:r>
+                  <a:rPr lang="en-CA" sz="1500" dirty="0" err="1"/>
+                  <a:t>en</a:t>
+                </a:r>
+                <a:r>
+                  <a:rPr lang="en-CA" sz="1500" dirty="0"/>
+                  <a:t> </a:t>
+                </a:r>
+                <a:r>
+                  <a:rPr lang="en-CA" sz="1500" dirty="0" err="1"/>
+                  <a:t>espace</a:t>
+                </a:r>
+                <a:r>
+                  <a:rPr lang="en-CA" sz="1500" dirty="0"/>
+                  <a:t> </a:t>
+                </a:r>
+                <a:r>
+                  <a:rPr lang="en-CA" sz="1500" dirty="0" err="1"/>
+                  <a:t>suffisamment</a:t>
+                </a:r>
+                <a:r>
+                  <a:rPr lang="en-CA" sz="1500" dirty="0"/>
+                  <a:t> fin </a:t>
+                </a:r>
+                <a14:m>
+                  <m:oMath xmlns:m="http://schemas.openxmlformats.org/officeDocument/2006/math">
+                    <m:r>
+                      <m:rPr>
+                        <m:sty m:val="p"/>
+                      </m:rPr>
+                      <a:rPr lang="en-CA" sz="1500">
+                        <a:latin typeface="Cambria Math" panose="02040503050406030204" pitchFamily="18" charset="0"/>
+                      </a:rPr>
+                      <m:t>Δ</m:t>
+                    </m:r>
+                    <m:r>
+                      <a:rPr lang="en-CA" sz="1500" b="0" i="1" smtClean="0">
+                        <a:latin typeface="Cambria Math" panose="02040503050406030204" pitchFamily="18" charset="0"/>
+                      </a:rPr>
+                      <m:t>𝑟</m:t>
+                    </m:r>
+                    <m:r>
+                      <a:rPr lang="en-CA" sz="1500" b="0" i="1" smtClean="0">
+                        <a:latin typeface="Cambria Math" panose="02040503050406030204" pitchFamily="18" charset="0"/>
+                      </a:rPr>
+                      <m:t>=0.01</m:t>
+                    </m:r>
+                    <m:r>
+                      <a:rPr lang="en-CA" sz="1500" b="0" i="1" smtClean="0">
+                        <a:latin typeface="Cambria Math" panose="02040503050406030204" pitchFamily="18" charset="0"/>
+                      </a:rPr>
+                      <m:t>𝑚</m:t>
+                    </m:r>
+                    <m:r>
+                      <a:rPr lang="en-CA" sz="1500" i="1">
+                        <a:latin typeface="Cambria Math" panose="02040503050406030204" pitchFamily="18" charset="0"/>
+                      </a:rPr>
+                      <m:t> </m:t>
+                    </m:r>
+                  </m:oMath>
+                </a14:m>
+                <a:r>
+                  <a:rPr lang="en-CA" sz="1500" dirty="0"/>
+                  <a:t>car </a:t>
+                </a:r>
+                <a14:m>
+                  <m:oMath xmlns:m="http://schemas.openxmlformats.org/officeDocument/2006/math">
+                    <m:r>
+                      <m:rPr>
+                        <m:sty m:val="p"/>
+                      </m:rPr>
+                      <a:rPr lang="en-CA" sz="1500">
+                        <a:latin typeface="Cambria Math" panose="02040503050406030204" pitchFamily="18" charset="0"/>
+                      </a:rPr>
+                      <m:t>Δ</m:t>
+                    </m:r>
+                    <m:r>
+                      <a:rPr lang="en-CA" sz="1500" b="0" i="1" smtClean="0">
+                        <a:latin typeface="Cambria Math" panose="02040503050406030204" pitchFamily="18" charset="0"/>
+                      </a:rPr>
+                      <m:t>𝑡</m:t>
+                    </m:r>
+                    <m:r>
+                      <a:rPr lang="en-CA" sz="1500" i="1">
+                        <a:latin typeface="Cambria Math" panose="02040503050406030204" pitchFamily="18" charset="0"/>
+                      </a:rPr>
+                      <m:t> </m:t>
+                    </m:r>
+                    <m:r>
+                      <m:rPr>
+                        <m:sty m:val="p"/>
+                      </m:rPr>
+                      <a:rPr lang="en-CA" sz="1500" b="0" i="0" smtClean="0">
+                        <a:latin typeface="Cambria Math" panose="02040503050406030204" pitchFamily="18" charset="0"/>
+                      </a:rPr>
+                      <m:t>et</m:t>
+                    </m:r>
+                    <m:r>
+                      <a:rPr lang="en-CA" sz="1500" b="0" i="0" smtClean="0">
+                        <a:latin typeface="Cambria Math" panose="02040503050406030204" pitchFamily="18" charset="0"/>
+                      </a:rPr>
+                      <m:t> </m:t>
+                    </m:r>
+                    <m:r>
+                      <m:rPr>
+                        <m:sty m:val="p"/>
+                      </m:rPr>
+                      <a:rPr lang="en-CA" sz="1500">
+                        <a:latin typeface="Cambria Math" panose="02040503050406030204" pitchFamily="18" charset="0"/>
+                      </a:rPr>
+                      <m:t>Δ</m:t>
+                    </m:r>
+                    <m:r>
+                      <a:rPr lang="en-CA" sz="1500" i="1">
+                        <a:latin typeface="Cambria Math" panose="02040503050406030204" pitchFamily="18" charset="0"/>
+                      </a:rPr>
+                      <m:t>𝑟</m:t>
+                    </m:r>
+                    <m:r>
+                      <a:rPr lang="en-CA" sz="1500" i="1">
+                        <a:latin typeface="Cambria Math" panose="02040503050406030204" pitchFamily="18" charset="0"/>
+                      </a:rPr>
+                      <m:t> </m:t>
+                    </m:r>
+                  </m:oMath>
+                </a14:m>
+                <a:r>
+                  <a:rPr lang="en-CA" sz="1500" dirty="0" err="1"/>
+                  <a:t>sont</a:t>
+                </a:r>
+                <a:r>
+                  <a:rPr lang="en-CA" sz="1500" dirty="0"/>
+                  <a:t> </a:t>
+                </a:r>
+                <a:r>
+                  <a:rPr lang="en-CA" sz="1500" dirty="0" err="1"/>
+                  <a:t>reliés</a:t>
+                </a:r>
+                <a:r>
+                  <a:rPr lang="en-CA" sz="1500" dirty="0"/>
+                  <a:t> par la </a:t>
+                </a:r>
+                <a:r>
+                  <a:rPr lang="en-CA" sz="1500" dirty="0" err="1"/>
+                  <a:t>contrainte</a:t>
+                </a:r>
+                <a:r>
+                  <a:rPr lang="en-CA" sz="1500" dirty="0"/>
+                  <a:t>: </a:t>
+                </a:r>
+                <a14:m>
+                  <m:oMath xmlns:m="http://schemas.openxmlformats.org/officeDocument/2006/math">
+                    <m:r>
+                      <m:rPr>
+                        <m:sty m:val="p"/>
+                      </m:rPr>
+                      <a:rPr lang="en-CA" sz="1500">
+                        <a:latin typeface="Cambria Math" panose="02040503050406030204" pitchFamily="18" charset="0"/>
+                      </a:rPr>
+                      <m:t>Δ</m:t>
+                    </m:r>
+                    <m:r>
+                      <a:rPr lang="en-CA" sz="1500" i="1">
+                        <a:latin typeface="Cambria Math" panose="02040503050406030204" pitchFamily="18" charset="0"/>
+                      </a:rPr>
+                      <m:t>𝑡</m:t>
+                    </m:r>
+                    <m:r>
+                      <a:rPr lang="en-CA" sz="1500" b="0" i="1" smtClean="0">
+                        <a:latin typeface="Cambria Math" panose="02040503050406030204" pitchFamily="18" charset="0"/>
+                      </a:rPr>
+                      <m:t>≥</m:t>
+                    </m:r>
+                    <m:f>
+                      <m:fPr>
+                        <m:ctrlPr>
+                          <a:rPr lang="en-CA" sz="1500" i="1">
+                            <a:latin typeface="Cambria Math" panose="02040503050406030204" pitchFamily="18" charset="0"/>
+                          </a:rPr>
+                        </m:ctrlPr>
+                      </m:fPr>
+                      <m:num>
+                        <m:r>
+                          <a:rPr lang="en-CA" sz="1500" b="0" i="1" smtClean="0">
+                            <a:latin typeface="Cambria Math" panose="02040503050406030204" pitchFamily="18" charset="0"/>
+                          </a:rPr>
+                          <m:t>0.5</m:t>
+                        </m:r>
+                        <m:r>
+                          <m:rPr>
+                            <m:sty m:val="p"/>
+                          </m:rPr>
+                          <a:rPr lang="en-CA" sz="1500">
+                            <a:latin typeface="Cambria Math" panose="02040503050406030204" pitchFamily="18" charset="0"/>
+                          </a:rPr>
+                          <m:t>Δ</m:t>
+                        </m:r>
+                        <m:sSup>
+                          <m:sSupPr>
+                            <m:ctrlPr>
+                              <a:rPr lang="en-CA" sz="1500" i="1">
+                                <a:latin typeface="Cambria Math" panose="02040503050406030204" pitchFamily="18" charset="0"/>
+                              </a:rPr>
+                            </m:ctrlPr>
+                          </m:sSupPr>
+                          <m:e>
+                            <m:r>
+                              <a:rPr lang="en-CA" sz="1500" i="1">
+                                <a:latin typeface="Cambria Math" panose="02040503050406030204" pitchFamily="18" charset="0"/>
+                              </a:rPr>
+                              <m:t>𝑟</m:t>
+                            </m:r>
+                          </m:e>
+                          <m:sup>
+                            <m:r>
+                              <a:rPr lang="en-CA" sz="1500" i="1">
+                                <a:latin typeface="Cambria Math" panose="02040503050406030204" pitchFamily="18" charset="0"/>
+                              </a:rPr>
+                              <m:t>2</m:t>
+                            </m:r>
+                          </m:sup>
+                        </m:sSup>
+                      </m:num>
+                      <m:den>
+                        <m:sSub>
+                          <m:sSubPr>
+                            <m:ctrlPr>
+                              <a:rPr lang="en-CA" sz="1500" i="1">
+                                <a:latin typeface="Cambria Math" panose="02040503050406030204" pitchFamily="18" charset="0"/>
+                              </a:rPr>
+                            </m:ctrlPr>
+                          </m:sSubPr>
+                          <m:e>
+                            <m:r>
+                              <a:rPr lang="en-CA" sz="1500" i="1">
+                                <a:latin typeface="Cambria Math" panose="02040503050406030204" pitchFamily="18" charset="0"/>
+                              </a:rPr>
+                              <m:t>10</m:t>
+                            </m:r>
+                            <m:r>
+                              <a:rPr lang="en-CA" sz="1500" b="0" i="1" smtClean="0">
+                                <a:latin typeface="Cambria Math" panose="02040503050406030204" pitchFamily="18" charset="0"/>
+                              </a:rPr>
+                              <m:t> </m:t>
+                            </m:r>
+                            <m:r>
+                              <a:rPr lang="en-CA" sz="1500" i="1">
+                                <a:latin typeface="Cambria Math" panose="02040503050406030204" pitchFamily="18" charset="0"/>
+                              </a:rPr>
+                              <m:t>𝐷</m:t>
+                            </m:r>
+                          </m:e>
+                          <m:sub>
+                            <m:r>
+                              <a:rPr lang="en-CA" sz="1500" i="1">
+                                <a:latin typeface="Cambria Math" panose="02040503050406030204" pitchFamily="18" charset="0"/>
+                              </a:rPr>
+                              <m:t>𝑒𝑓𝑓</m:t>
+                            </m:r>
+                          </m:sub>
+                        </m:sSub>
+                      </m:den>
+                    </m:f>
+                  </m:oMath>
+                </a14:m>
+                <a:endParaRPr lang="en-CA" sz="1500" dirty="0"/>
+              </a:p>
+              <a:p>
+                <a:pPr marL="0" indent="0">
+                  <a:lnSpc>
+                    <a:spcPct val="110000"/>
+                  </a:lnSpc>
+                  <a:buNone/>
+                </a:pPr>
+                <a:r>
+                  <a:rPr lang="en-CA" sz="1500" dirty="0"/>
+                  <a:t>On observe sur le </a:t>
+                </a:r>
+                <a:r>
+                  <a:rPr lang="en-CA" sz="1500" dirty="0" err="1"/>
+                  <a:t>graphe</a:t>
+                </a:r>
+                <a:r>
+                  <a:rPr lang="en-CA" sz="1500" dirty="0"/>
+                  <a:t> de gauche que la </a:t>
+                </a:r>
+                <a:r>
+                  <a:rPr lang="en-CA" sz="1500" dirty="0" err="1"/>
+                  <a:t>courbe</a:t>
+                </a:r>
+                <a:r>
+                  <a:rPr lang="en-CA" sz="1500" dirty="0"/>
+                  <a:t> numérique ne commence à se </a:t>
+                </a:r>
+                <a:r>
+                  <a:rPr lang="en-CA" sz="1500" dirty="0" err="1"/>
+                  <a:t>rapprocher</a:t>
+                </a:r>
+                <a:r>
+                  <a:rPr lang="en-CA" sz="1500" dirty="0"/>
+                  <a:t> de la </a:t>
+                </a:r>
+                <a:r>
+                  <a:rPr lang="en-CA" sz="1500" dirty="0" err="1"/>
+                  <a:t>courbe</a:t>
+                </a:r>
+                <a:r>
+                  <a:rPr lang="en-CA" sz="1500" dirty="0"/>
+                  <a:t> </a:t>
+                </a:r>
+                <a:r>
+                  <a:rPr lang="en-CA" sz="1500" dirty="0" err="1"/>
+                  <a:t>analytique</a:t>
+                </a:r>
+                <a:r>
+                  <a:rPr lang="en-CA" sz="1500" dirty="0"/>
+                  <a:t> (MMS) </a:t>
+                </a:r>
+                <a:r>
+                  <a:rPr lang="en-CA" sz="1500" dirty="0" err="1"/>
+                  <a:t>qu’à</a:t>
+                </a:r>
+                <a:r>
+                  <a:rPr lang="en-CA" sz="1500" dirty="0"/>
+                  <a:t> </a:t>
+                </a:r>
+                <a:r>
+                  <a:rPr lang="en-CA" sz="1500" dirty="0" err="1"/>
+                  <a:t>partir</a:t>
+                </a:r>
+                <a:r>
+                  <a:rPr lang="en-CA" sz="1500" dirty="0"/>
+                  <a:t> de </a:t>
+                </a:r>
+                <a14:m>
+                  <m:oMath xmlns:m="http://schemas.openxmlformats.org/officeDocument/2006/math">
+                    <m:r>
+                      <m:rPr>
+                        <m:sty m:val="p"/>
+                      </m:rPr>
+                      <a:rPr lang="en-CA" sz="1500" smtClean="0">
+                        <a:latin typeface="Cambria Math" panose="02040503050406030204" pitchFamily="18" charset="0"/>
+                      </a:rPr>
+                      <m:t>Δ</m:t>
+                    </m:r>
+                    <m:r>
+                      <a:rPr lang="en-CA" sz="1500" b="0" i="1" smtClean="0">
+                        <a:latin typeface="Cambria Math" panose="02040503050406030204" pitchFamily="18" charset="0"/>
+                      </a:rPr>
+                      <m:t>𝑟</m:t>
+                    </m:r>
+                    <m:r>
+                      <a:rPr lang="en-CA" sz="1500" b="0" i="1" smtClean="0">
+                        <a:latin typeface="Cambria Math" panose="02040503050406030204" pitchFamily="18" charset="0"/>
+                      </a:rPr>
+                      <m:t>=0.01</m:t>
+                    </m:r>
+                    <m:r>
+                      <a:rPr lang="en-CA" sz="1500" b="0" i="1" smtClean="0">
+                        <a:latin typeface="Cambria Math" panose="02040503050406030204" pitchFamily="18" charset="0"/>
+                      </a:rPr>
+                      <m:t>𝑚</m:t>
+                    </m:r>
+                    <m:r>
+                      <a:rPr lang="en-CA" sz="1500" i="1">
+                        <a:latin typeface="Cambria Math" panose="02040503050406030204" pitchFamily="18" charset="0"/>
+                      </a:rPr>
+                      <m:t> </m:t>
+                    </m:r>
+                  </m:oMath>
+                </a14:m>
+                <a:r>
+                  <a:rPr lang="en-CA" sz="1500" dirty="0"/>
+                  <a:t>, </a:t>
+                </a:r>
+                <a:r>
+                  <a:rPr lang="en-CA" sz="1500" dirty="0" err="1"/>
+                  <a:t>ce</a:t>
+                </a:r>
+                <a:r>
+                  <a:rPr lang="en-CA" sz="1500" dirty="0"/>
+                  <a:t> qui correspond à 51 </a:t>
+                </a:r>
+                <a:r>
+                  <a:rPr lang="en-CA" sz="1500" dirty="0" err="1"/>
+                  <a:t>noeuds</a:t>
+                </a:r>
+                <a:r>
+                  <a:rPr lang="en-CA" sz="1500" dirty="0"/>
+                  <a:t> et </a:t>
+                </a:r>
+                <a:r>
+                  <a:rPr lang="en-CA" sz="1500" dirty="0" err="1"/>
+                  <a:t>d’apres</a:t>
+                </a:r>
+                <a:r>
+                  <a:rPr lang="en-CA" sz="1500" dirty="0"/>
+                  <a:t> la </a:t>
+                </a:r>
+                <a:r>
+                  <a:rPr lang="en-CA" sz="1500" dirty="0" err="1"/>
+                  <a:t>vue</a:t>
+                </a:r>
+                <a:r>
+                  <a:rPr lang="en-CA" sz="1500" dirty="0"/>
+                  <a:t> </a:t>
+                </a:r>
+                <a:r>
+                  <a:rPr lang="en-CA" sz="1500" dirty="0" err="1"/>
+                  <a:t>aggrandie</a:t>
+                </a:r>
+                <a:r>
+                  <a:rPr lang="en-CA" sz="1500" dirty="0"/>
+                  <a:t> (</a:t>
+                </a:r>
+                <a:r>
+                  <a:rPr lang="en-CA" sz="1500" dirty="0" err="1"/>
+                  <a:t>graphe</a:t>
+                </a:r>
+                <a:r>
+                  <a:rPr lang="en-CA" sz="1500" dirty="0"/>
+                  <a:t> de droite) on </a:t>
+                </a:r>
+                <a:r>
+                  <a:rPr lang="en-CA" sz="1500" dirty="0" err="1"/>
+                  <a:t>voit</a:t>
+                </a:r>
+                <a:r>
+                  <a:rPr lang="en-CA" sz="1500" dirty="0"/>
+                  <a:t> que plus le pas </a:t>
+                </a:r>
+                <a:r>
+                  <a:rPr lang="en-CA" sz="1500" dirty="0" err="1"/>
+                  <a:t>diminue</a:t>
+                </a:r>
+                <a:r>
+                  <a:rPr lang="en-CA" sz="1500" dirty="0"/>
+                  <a:t> plus la </a:t>
+                </a:r>
+                <a:r>
+                  <a:rPr lang="en-CA" sz="1500" dirty="0" err="1"/>
+                  <a:t>courbe</a:t>
+                </a:r>
+                <a:r>
+                  <a:rPr lang="en-CA" sz="1500" dirty="0"/>
+                  <a:t> numérique continue de se </a:t>
+                </a:r>
+                <a:r>
+                  <a:rPr lang="en-CA" sz="1500" dirty="0" err="1"/>
+                  <a:t>rapprocher</a:t>
+                </a:r>
+                <a:r>
+                  <a:rPr lang="en-CA" sz="1500" dirty="0"/>
+                  <a:t> de la </a:t>
+                </a:r>
+                <a:r>
+                  <a:rPr lang="en-CA" sz="1500" dirty="0" err="1"/>
+                  <a:t>courbe</a:t>
+                </a:r>
+                <a:r>
+                  <a:rPr lang="en-CA" sz="1500" dirty="0"/>
+                  <a:t> MMS.</a:t>
+                </a:r>
+              </a:p>
+              <a:p>
+                <a:pPr marL="0" indent="0">
+                  <a:lnSpc>
+                    <a:spcPct val="110000"/>
+                  </a:lnSpc>
+                  <a:buNone/>
+                </a:pPr>
+                <a:endParaRPr lang="en-CA" sz="1800" dirty="0"/>
+              </a:p>
+              <a:p>
+                <a:pPr marL="0" indent="0">
+                  <a:buNone/>
+                </a:pPr>
+                <a:endParaRPr lang="en-CA" dirty="0">
+                  <a:highlight>
+                    <a:srgbClr val="FFFF00"/>
+                  </a:highlight>
+                </a:endParaRPr>
+              </a:p>
+            </p:txBody>
+          </p:sp>
+        </mc:Choice>
+        <mc:Fallback>
+          <p:sp>
+            <p:nvSpPr>
+              <p:cNvPr id="3" name="Content Placeholder 2">
+                <a:extLst>
+                  <a:ext uri="{FF2B5EF4-FFF2-40B4-BE49-F238E27FC236}">
+                    <a16:creationId xmlns:a16="http://schemas.microsoft.com/office/drawing/2014/main" id="{AB8F23B5-92F2-64E3-1494-F0465D25937A}"/>
+                  </a:ext>
+                </a:extLst>
+              </p:cNvPr>
+              <p:cNvSpPr>
+                <a:spLocks noGrp="1" noRot="1" noChangeAspect="1" noMove="1" noResize="1" noEditPoints="1" noAdjustHandles="1" noChangeArrowheads="1" noChangeShapeType="1" noTextEdit="1"/>
+              </p:cNvSpPr>
+              <p:nvPr>
+                <p:ph idx="1"/>
+              </p:nvPr>
+            </p:nvSpPr>
+            <p:spPr>
+              <a:xfrm>
+                <a:off x="248783" y="954957"/>
+                <a:ext cx="11844894" cy="1325563"/>
+              </a:xfrm>
+              <a:blipFill>
+                <a:blip r:embed="rId2"/>
+                <a:stretch>
+                  <a:fillRect l="-51" t="-3687" b="-461"/>
+                </a:stretch>
+              </a:blipFill>
+            </p:spPr>
+            <p:txBody>
+              <a:bodyPr/>
+              <a:lstStyle/>
+              <a:p>
+                <a:r>
+                  <a:rPr lang="en-CA">
+                    <a:noFill/>
+                  </a:rPr>
+                  <a:t> </a:t>
+                </a:r>
+              </a:p>
+            </p:txBody>
+          </p:sp>
+        </mc:Fallback>
+      </mc:AlternateContent>
+      <p:sp>
+        <p:nvSpPr>
+          <p:cNvPr id="4" name="Title 1">
+            <a:extLst>
+              <a:ext uri="{FF2B5EF4-FFF2-40B4-BE49-F238E27FC236}">
+                <a16:creationId xmlns:a16="http://schemas.microsoft.com/office/drawing/2014/main" id="{9F7D0384-5D6F-E25A-E330-866BC1D2EE1B}"/>
+              </a:ext>
+            </a:extLst>
+          </p:cNvPr>
+          <p:cNvSpPr txBox="1">
+            <a:spLocks/>
+          </p:cNvSpPr>
+          <p:nvPr/>
+        </p:nvSpPr>
+        <p:spPr>
+          <a:xfrm>
+            <a:off x="990600" y="0"/>
+            <a:ext cx="10515600" cy="1325563"/>
+          </a:xfrm>
+          <a:prstGeom prst="rect">
+            <a:avLst/>
+          </a:prstGeom>
+        </p:spPr>
+        <p:txBody>
+          <a:bodyPr vert="horz" lIns="91440" tIns="45720" rIns="91440" bIns="45720" rtlCol="0" anchor="ctr">
+            <a:normAutofit/>
+          </a:bodyPr>
+          <a:lstStyle>
+            <a:lvl1pPr algn="l" defTabSz="914400" rtl="0" eaLnBrk="1" latinLnBrk="0" hangingPunct="1">
+              <a:lnSpc>
+                <a:spcPct val="90000"/>
+              </a:lnSpc>
+              <a:spcBef>
+                <a:spcPct val="0"/>
+              </a:spcBef>
+              <a:buNone/>
+              <a:defRPr sz="4400" kern="1200">
+                <a:solidFill>
+                  <a:schemeClr val="tx1"/>
+                </a:solidFill>
+                <a:latin typeface="+mj-lt"/>
+                <a:ea typeface="+mj-ea"/>
+                <a:cs typeface="+mj-cs"/>
+              </a:defRPr>
+            </a:lvl1pPr>
+          </a:lstStyle>
+          <a:p>
+            <a:r>
+              <a:rPr lang="en-CA" sz="3600" dirty="0"/>
+              <a:t>B-c) MMS: </a:t>
+            </a:r>
+            <a:r>
+              <a:rPr lang="en-CA" sz="3600" dirty="0" err="1"/>
+              <a:t>vérification</a:t>
+            </a:r>
+            <a:r>
+              <a:rPr lang="en-CA" sz="3600" dirty="0"/>
+              <a:t> et discussion</a:t>
+            </a:r>
+          </a:p>
+        </p:txBody>
+      </p:sp>
+      <p:pic>
+        <p:nvPicPr>
+          <p:cNvPr id="7" name="Picture 6" descr="A graph of a function&#10;&#10;Description automatically generated">
+            <a:extLst>
+              <a:ext uri="{FF2B5EF4-FFF2-40B4-BE49-F238E27FC236}">
+                <a16:creationId xmlns:a16="http://schemas.microsoft.com/office/drawing/2014/main" id="{AE285EBC-8CBD-03ED-6F3E-F4ED77CE9DEA}"/>
+              </a:ext>
+            </a:extLst>
+          </p:cNvPr>
+          <p:cNvPicPr>
+            <a:picLocks noChangeAspect="1"/>
+          </p:cNvPicPr>
+          <p:nvPr/>
+        </p:nvPicPr>
+        <p:blipFill rotWithShape="1">
+          <a:blip r:embed="rId3">
+            <a:extLst>
+              <a:ext uri="{28A0092B-C50C-407E-A947-70E740481C1C}">
+                <a14:useLocalDpi xmlns:a14="http://schemas.microsoft.com/office/drawing/2010/main" val="0"/>
+              </a:ext>
+            </a:extLst>
+          </a:blip>
+          <a:srcRect l="4678" t="7790" r="8397" b="5297"/>
+          <a:stretch/>
+        </p:blipFill>
+        <p:spPr>
+          <a:xfrm>
+            <a:off x="384037" y="2280520"/>
+            <a:ext cx="6124918" cy="4577480"/>
+          </a:xfrm>
+          <a:prstGeom prst="rect">
+            <a:avLst/>
+          </a:prstGeom>
+        </p:spPr>
+      </p:pic>
+      <p:pic>
+        <p:nvPicPr>
+          <p:cNvPr id="9" name="Picture 8" descr="A graph of a graph&#10;&#10;Description automatically generated">
+            <a:extLst>
+              <a:ext uri="{FF2B5EF4-FFF2-40B4-BE49-F238E27FC236}">
+                <a16:creationId xmlns:a16="http://schemas.microsoft.com/office/drawing/2014/main" id="{671A1227-0C55-D79E-8EE8-C9C7D2EB9A9D}"/>
+              </a:ext>
+            </a:extLst>
+          </p:cNvPr>
+          <p:cNvPicPr>
+            <a:picLocks noChangeAspect="1"/>
+          </p:cNvPicPr>
+          <p:nvPr/>
+        </p:nvPicPr>
+        <p:blipFill rotWithShape="1">
+          <a:blip r:embed="rId4">
+            <a:extLst>
+              <a:ext uri="{28A0092B-C50C-407E-A947-70E740481C1C}">
+                <a14:useLocalDpi xmlns:a14="http://schemas.microsoft.com/office/drawing/2010/main" val="0"/>
+              </a:ext>
+            </a:extLst>
+          </a:blip>
+          <a:srcRect l="8361" t="7547" r="7850" b="4946"/>
+          <a:stretch/>
+        </p:blipFill>
+        <p:spPr>
+          <a:xfrm>
+            <a:off x="6508955" y="2363788"/>
+            <a:ext cx="5393656" cy="4494212"/>
+          </a:xfrm>
+          <a:prstGeom prst="rect">
+            <a:avLst/>
+          </a:prstGeom>
+        </p:spPr>
+      </p:pic>
+    </p:spTree>
+    <p:extLst>
+      <p:ext uri="{BB962C8B-B14F-4D97-AF65-F5344CB8AC3E}">
+        <p14:creationId xmlns:p14="http://schemas.microsoft.com/office/powerpoint/2010/main" val="1685626482"/>
+      </p:ext>
+    </p:extLst>
+  </p:cSld>
+  <p:clrMapOvr>
+    <a:masterClrMapping/>
+  </p:clrMapOvr>
+</p:sld>
+</file>
+
+<file path=ppt/slides/slide12.xml><?xml version="1.0" encoding="utf-8"?>
+<p:sld xmlns:a="http://schemas.openxmlformats.org/drawingml/2006/main" xmlns:r="http://schemas.openxmlformats.org/officeDocument/2006/relationships" xmlns:p="http://schemas.openxmlformats.org/presentationml/2006/main">
+  <p:cSld>
+    <p:spTree>
+      <p:nvGrpSpPr>
+        <p:cNvPr id="1" name="">
+          <a:extLst>
+            <a:ext uri="{FF2B5EF4-FFF2-40B4-BE49-F238E27FC236}">
+              <a16:creationId xmlns:a16="http://schemas.microsoft.com/office/drawing/2014/main" id="{15517876-9067-A027-6359-45F74C9DE71A}"/>
+            </a:ext>
+          </a:extLst>
+        </p:cNvPr>
+        <p:cNvGrpSpPr/>
+        <p:nvPr/>
+      </p:nvGrpSpPr>
+      <p:grpSpPr>
+        <a:xfrm>
+          <a:off x="0" y="0"/>
+          <a:ext cx="0" cy="0"/>
+          <a:chOff x="0" y="0"/>
+          <a:chExt cx="0" cy="0"/>
+        </a:xfrm>
+      </p:grpSpPr>
+      <mc:AlternateContent xmlns:mc="http://schemas.openxmlformats.org/markup-compatibility/2006">
+        <mc:Choice xmlns:a14="http://schemas.microsoft.com/office/drawing/2010/main" Requires="a14">
+          <p:sp>
+            <p:nvSpPr>
+              <p:cNvPr id="3" name="Content Placeholder 2">
+                <a:extLst>
+                  <a:ext uri="{FF2B5EF4-FFF2-40B4-BE49-F238E27FC236}">
+                    <a16:creationId xmlns:a16="http://schemas.microsoft.com/office/drawing/2014/main" id="{EA9526C6-8489-A737-D29B-13052E64EAB3}"/>
+                  </a:ext>
+                </a:extLst>
+              </p:cNvPr>
+              <p:cNvSpPr>
+                <a:spLocks noGrp="1"/>
+              </p:cNvSpPr>
+              <p:nvPr>
+                <p:ph idx="1"/>
+              </p:nvPr>
+            </p:nvSpPr>
+            <p:spPr>
+              <a:xfrm>
+                <a:off x="294969" y="922475"/>
+                <a:ext cx="11720050" cy="602943"/>
+              </a:xfrm>
+            </p:spPr>
+            <p:txBody>
+              <a:bodyPr>
+                <a:normAutofit/>
+              </a:bodyPr>
+              <a:lstStyle/>
+              <a:p>
+                <a:pPr marL="0" indent="0">
+                  <a:buNone/>
+                </a:pPr>
+                <a:r>
+                  <a:rPr lang="en-CA" sz="1500" dirty="0"/>
+                  <a:t>Apres </a:t>
+                </a:r>
+                <a:r>
+                  <a:rPr lang="en-CA" sz="1500" dirty="0" err="1"/>
+                  <a:t>calcul</a:t>
+                </a:r>
+                <a:r>
+                  <a:rPr lang="en-CA" sz="1500" dirty="0"/>
+                  <a:t> des </a:t>
+                </a:r>
+                <a:r>
+                  <a:rPr lang="en-CA" sz="1500" dirty="0" err="1"/>
+                  <a:t>erreurs</a:t>
+                </a:r>
+                <a:r>
+                  <a:rPr lang="en-CA" sz="1500" dirty="0"/>
+                  <a:t> L1, L2 et </a:t>
+                </a:r>
+                <a:r>
+                  <a:rPr lang="en-CA" sz="1500" dirty="0" err="1"/>
+                  <a:t>L_inf</a:t>
+                </a:r>
+                <a:r>
+                  <a:rPr lang="en-CA" sz="1500" dirty="0"/>
+                  <a:t>, on observe que la zone de convergence </a:t>
+                </a:r>
+                <a:r>
+                  <a:rPr lang="en-CA" sz="1500" dirty="0" err="1"/>
+                  <a:t>asymptotique</a:t>
+                </a:r>
+                <a:r>
+                  <a:rPr lang="en-CA" sz="1500" dirty="0"/>
+                  <a:t> commence à </a:t>
+                </a:r>
+                <a:r>
+                  <a:rPr lang="en-CA" sz="1500" dirty="0" err="1"/>
+                  <a:t>partir</a:t>
+                </a:r>
+                <a:r>
+                  <a:rPr lang="en-CA" sz="1500" dirty="0"/>
+                  <a:t> de </a:t>
+                </a:r>
+                <a14:m>
+                  <m:oMath xmlns:m="http://schemas.openxmlformats.org/officeDocument/2006/math">
+                    <m:r>
+                      <m:rPr>
+                        <m:sty m:val="p"/>
+                      </m:rPr>
+                      <a:rPr lang="en-CA" sz="1500" smtClean="0">
+                        <a:latin typeface="Cambria Math" panose="02040503050406030204" pitchFamily="18" charset="0"/>
+                      </a:rPr>
+                      <m:t>Δ</m:t>
+                    </m:r>
+                    <m:r>
+                      <a:rPr lang="en-CA" sz="1500" b="0" i="1" smtClean="0">
+                        <a:latin typeface="Cambria Math" panose="02040503050406030204" pitchFamily="18" charset="0"/>
+                      </a:rPr>
+                      <m:t>𝑟</m:t>
+                    </m:r>
+                    <m:r>
+                      <a:rPr lang="en-CA" sz="1500" b="0" i="1" smtClean="0">
+                        <a:latin typeface="Cambria Math" panose="02040503050406030204" pitchFamily="18" charset="0"/>
+                      </a:rPr>
+                      <m:t>≅ </m:t>
+                    </m:r>
+                    <m:r>
+                      <a:rPr lang="en-CA" sz="1500" b="0" i="1" smtClean="0">
+                        <a:latin typeface="Cambria Math" panose="02040503050406030204" pitchFamily="18" charset="0"/>
+                      </a:rPr>
+                      <m:t>0.01</m:t>
+                    </m:r>
+                    <m:r>
+                      <a:rPr lang="en-CA" sz="1500" b="0" i="1" smtClean="0">
+                        <a:latin typeface="Cambria Math" panose="02040503050406030204" pitchFamily="18" charset="0"/>
+                      </a:rPr>
+                      <m:t>𝑚</m:t>
+                    </m:r>
+                  </m:oMath>
+                </a14:m>
+                <a:r>
+                  <a:rPr lang="en-CA" sz="1500" dirty="0"/>
+                  <a:t> </a:t>
+                </a:r>
+                <a:r>
+                  <a:rPr lang="en-CA" sz="1500" dirty="0" err="1"/>
+                  <a:t>donc</a:t>
+                </a:r>
+                <a:r>
+                  <a:rPr lang="en-CA" sz="1500" dirty="0"/>
+                  <a:t> </a:t>
+                </a:r>
+                <a:r>
+                  <a:rPr lang="en-CA" sz="1500" dirty="0" err="1"/>
+                  <a:t>en</a:t>
+                </a:r>
+                <a:r>
+                  <a:rPr lang="en-CA" sz="1500" dirty="0"/>
+                  <a:t> </a:t>
+                </a:r>
+                <a:r>
+                  <a:rPr lang="en-CA" sz="1500" dirty="0" err="1"/>
+                  <a:t>traçant</a:t>
+                </a:r>
+                <a:r>
+                  <a:rPr lang="en-CA" sz="1500" dirty="0"/>
+                  <a:t> la droite de regression, on </a:t>
+                </a:r>
+                <a:r>
+                  <a:rPr lang="en-CA" sz="1500" dirty="0" err="1"/>
+                  <a:t>trouve</a:t>
+                </a:r>
+                <a:r>
+                  <a:rPr lang="en-CA" sz="1500" dirty="0"/>
+                  <a:t> un </a:t>
+                </a:r>
+                <a:r>
+                  <a:rPr lang="en-CA" sz="1500" dirty="0" err="1"/>
+                  <a:t>ordre</a:t>
+                </a:r>
+                <a:r>
+                  <a:rPr lang="en-CA" sz="1500" dirty="0"/>
+                  <a:t> de convergence </a:t>
+                </a:r>
+                <a:r>
+                  <a:rPr lang="en-CA" sz="1500" dirty="0" err="1"/>
+                  <a:t>observé</a:t>
+                </a:r>
+                <a:r>
+                  <a:rPr lang="en-CA" sz="1500" dirty="0"/>
+                  <a:t> de 1.99444 ~ 2</a:t>
+                </a:r>
+              </a:p>
+            </p:txBody>
+          </p:sp>
+        </mc:Choice>
+        <mc:Fallback>
+          <p:sp>
+            <p:nvSpPr>
+              <p:cNvPr id="3" name="Content Placeholder 2">
+                <a:extLst>
+                  <a:ext uri="{FF2B5EF4-FFF2-40B4-BE49-F238E27FC236}">
+                    <a16:creationId xmlns:a16="http://schemas.microsoft.com/office/drawing/2014/main" id="{EA9526C6-8489-A737-D29B-13052E64EAB3}"/>
+                  </a:ext>
+                </a:extLst>
+              </p:cNvPr>
+              <p:cNvSpPr>
+                <a:spLocks noGrp="1" noRot="1" noChangeAspect="1" noMove="1" noResize="1" noEditPoints="1" noAdjustHandles="1" noChangeArrowheads="1" noChangeShapeType="1" noTextEdit="1"/>
+              </p:cNvSpPr>
+              <p:nvPr>
+                <p:ph idx="1"/>
+              </p:nvPr>
+            </p:nvSpPr>
+            <p:spPr>
+              <a:xfrm>
+                <a:off x="294969" y="922475"/>
+                <a:ext cx="11720050" cy="602943"/>
+              </a:xfrm>
+              <a:blipFill>
+                <a:blip r:embed="rId2"/>
+                <a:stretch>
+                  <a:fillRect l="-208" t="-5051"/>
+                </a:stretch>
+              </a:blipFill>
+            </p:spPr>
+            <p:txBody>
+              <a:bodyPr/>
+              <a:lstStyle/>
+              <a:p>
+                <a:r>
+                  <a:rPr lang="en-CA">
+                    <a:noFill/>
+                  </a:rPr>
+                  <a:t> </a:t>
+                </a:r>
+              </a:p>
+            </p:txBody>
+          </p:sp>
+        </mc:Fallback>
+      </mc:AlternateContent>
+      <p:sp>
+        <p:nvSpPr>
+          <p:cNvPr id="4" name="Title 1">
+            <a:extLst>
+              <a:ext uri="{FF2B5EF4-FFF2-40B4-BE49-F238E27FC236}">
+                <a16:creationId xmlns:a16="http://schemas.microsoft.com/office/drawing/2014/main" id="{0BF8544E-2668-8003-DD32-550ECA8F1BF4}"/>
+              </a:ext>
+            </a:extLst>
+          </p:cNvPr>
+          <p:cNvSpPr txBox="1">
+            <a:spLocks/>
+          </p:cNvSpPr>
+          <p:nvPr/>
+        </p:nvSpPr>
+        <p:spPr>
+          <a:xfrm>
+            <a:off x="990600" y="0"/>
+            <a:ext cx="10515600" cy="1325563"/>
+          </a:xfrm>
+          <a:prstGeom prst="rect">
+            <a:avLst/>
+          </a:prstGeom>
+        </p:spPr>
+        <p:txBody>
+          <a:bodyPr vert="horz" lIns="91440" tIns="45720" rIns="91440" bIns="45720" rtlCol="0" anchor="ctr">
+            <a:normAutofit/>
+          </a:bodyPr>
+          <a:lstStyle>
+            <a:lvl1pPr algn="l" defTabSz="914400" rtl="0" eaLnBrk="1" latinLnBrk="0" hangingPunct="1">
+              <a:lnSpc>
+                <a:spcPct val="90000"/>
+              </a:lnSpc>
+              <a:spcBef>
+                <a:spcPct val="0"/>
+              </a:spcBef>
+              <a:buNone/>
+              <a:defRPr sz="4400" kern="1200">
+                <a:solidFill>
+                  <a:schemeClr val="tx1"/>
+                </a:solidFill>
+                <a:latin typeface="+mj-lt"/>
+                <a:ea typeface="+mj-ea"/>
+                <a:cs typeface="+mj-cs"/>
+              </a:defRPr>
+            </a:lvl1pPr>
+          </a:lstStyle>
+          <a:p>
+            <a:r>
+              <a:rPr lang="en-CA" sz="3600" dirty="0"/>
+              <a:t>B-c) MMS: </a:t>
+            </a:r>
+            <a:r>
+              <a:rPr lang="en-CA" sz="3600" dirty="0" err="1"/>
+              <a:t>vérification</a:t>
+            </a:r>
+            <a:r>
+              <a:rPr lang="en-CA" sz="3600" dirty="0"/>
+              <a:t> et discussion</a:t>
+            </a:r>
+          </a:p>
+        </p:txBody>
+      </p:sp>
+      <p:pic>
+        <p:nvPicPr>
+          <p:cNvPr id="5" name="Picture 4" descr="A graph of a function&#10;&#10;Description automatically generated">
+            <a:extLst>
+              <a:ext uri="{FF2B5EF4-FFF2-40B4-BE49-F238E27FC236}">
+                <a16:creationId xmlns:a16="http://schemas.microsoft.com/office/drawing/2014/main" id="{89F526AA-5449-4505-6457-765CA7BE21DF}"/>
+              </a:ext>
+            </a:extLst>
+          </p:cNvPr>
+          <p:cNvPicPr>
+            <a:picLocks noChangeAspect="1"/>
+          </p:cNvPicPr>
+          <p:nvPr/>
+        </p:nvPicPr>
+        <p:blipFill rotWithShape="1">
+          <a:blip r:embed="rId3">
+            <a:extLst>
+              <a:ext uri="{28A0092B-C50C-407E-A947-70E740481C1C}">
+                <a14:useLocalDpi xmlns:a14="http://schemas.microsoft.com/office/drawing/2010/main" val="0"/>
+              </a:ext>
+            </a:extLst>
+          </a:blip>
+          <a:srcRect l="5089" t="3297" r="8494" b="4660"/>
+          <a:stretch/>
+        </p:blipFill>
+        <p:spPr>
+          <a:xfrm>
+            <a:off x="6017342" y="1418643"/>
+            <a:ext cx="5997677" cy="5439358"/>
+          </a:xfrm>
+          <a:prstGeom prst="rect">
+            <a:avLst/>
+          </a:prstGeom>
+        </p:spPr>
+      </p:pic>
+      <p:pic>
+        <p:nvPicPr>
+          <p:cNvPr id="11" name="Picture 10" descr="A graph of a function&#10;&#10;Description automatically generated">
+            <a:extLst>
+              <a:ext uri="{FF2B5EF4-FFF2-40B4-BE49-F238E27FC236}">
+                <a16:creationId xmlns:a16="http://schemas.microsoft.com/office/drawing/2014/main" id="{D8B528E2-0BE7-6F80-985C-7E4A9B539B6F}"/>
+              </a:ext>
+            </a:extLst>
+          </p:cNvPr>
+          <p:cNvPicPr>
+            <a:picLocks noChangeAspect="1"/>
+          </p:cNvPicPr>
+          <p:nvPr/>
+        </p:nvPicPr>
+        <p:blipFill rotWithShape="1">
+          <a:blip r:embed="rId4">
+            <a:extLst>
+              <a:ext uri="{28A0092B-C50C-407E-A947-70E740481C1C}">
+                <a14:useLocalDpi xmlns:a14="http://schemas.microsoft.com/office/drawing/2010/main" val="0"/>
+              </a:ext>
+            </a:extLst>
+          </a:blip>
+          <a:srcRect l="5112" t="6972" r="8950" b="3384"/>
+          <a:stretch/>
+        </p:blipFill>
+        <p:spPr>
+          <a:xfrm>
+            <a:off x="0" y="1978512"/>
+            <a:ext cx="6017342" cy="4901841"/>
+          </a:xfrm>
+          <a:prstGeom prst="rect">
+            <a:avLst/>
+          </a:prstGeom>
+        </p:spPr>
+      </p:pic>
+    </p:spTree>
+    <p:extLst>
+      <p:ext uri="{BB962C8B-B14F-4D97-AF65-F5344CB8AC3E}">
+        <p14:creationId xmlns:p14="http://schemas.microsoft.com/office/powerpoint/2010/main" val="603429436"/>
+      </p:ext>
+    </p:extLst>
+  </p:cSld>
+  <p:clrMapOvr>
+    <a:masterClrMapping/>
+  </p:clrMapOvr>
+</p:sld>
+</file>
+
+<file path=ppt/slides/slide13.xml><?xml version="1.0" encoding="utf-8"?>
+<p:sld xmlns:a="http://schemas.openxmlformats.org/drawingml/2006/main" xmlns:r="http://schemas.openxmlformats.org/officeDocument/2006/relationships" xmlns:p="http://schemas.openxmlformats.org/presentationml/2006/main">
+  <p:cSld>
+    <p:spTree>
+      <p:nvGrpSpPr>
+        <p:cNvPr id="1" name="">
+          <a:extLst>
+            <a:ext uri="{FF2B5EF4-FFF2-40B4-BE49-F238E27FC236}">
+              <a16:creationId xmlns:a16="http://schemas.microsoft.com/office/drawing/2014/main" id="{AA4F988C-D914-7C14-7668-DCAF1957013D}"/>
+            </a:ext>
+          </a:extLst>
+        </p:cNvPr>
+        <p:cNvGrpSpPr/>
+        <p:nvPr/>
+      </p:nvGrpSpPr>
+      <p:grpSpPr>
+        <a:xfrm>
+          <a:off x="0" y="0"/>
+          <a:ext cx="0" cy="0"/>
+          <a:chOff x="0" y="0"/>
+          <a:chExt cx="0" cy="0"/>
+        </a:xfrm>
+      </p:grpSpPr>
       <p:sp>
         <p:nvSpPr>
           <p:cNvPr id="3" name="Content Placeholder 2">
             <a:extLst>
               <a:ext uri="{FF2B5EF4-FFF2-40B4-BE49-F238E27FC236}">
-                <a16:creationId xmlns:a16="http://schemas.microsoft.com/office/drawing/2014/main" id="{AB8F23B5-92F2-64E3-1494-F0465D25937A}"/>
+                <a16:creationId xmlns:a16="http://schemas.microsoft.com/office/drawing/2014/main" id="{013F7F86-9791-8551-B22D-0DE6285762C4}"/>
+              </a:ext>
+            </a:extLst>
+          </p:cNvPr>
+          <p:cNvSpPr>
+            <a:spLocks noGrp="1"/>
+          </p:cNvSpPr>
+          <p:nvPr>
+            <p:ph idx="1"/>
+          </p:nvPr>
+        </p:nvSpPr>
+        <p:spPr>
+          <a:xfrm>
+            <a:off x="1000432" y="930889"/>
+            <a:ext cx="10515600" cy="602943"/>
+          </a:xfrm>
+        </p:spPr>
+        <p:txBody>
+          <a:bodyPr>
+            <a:normAutofit/>
+          </a:bodyPr>
+          <a:lstStyle/>
+          <a:p>
+            <a:pPr marL="0" indent="0">
+              <a:buNone/>
+            </a:pPr>
+            <a:r>
+              <a:rPr lang="en-CA" sz="1800" dirty="0"/>
+              <a:t>Convergence </a:t>
+            </a:r>
+            <a:r>
+              <a:rPr lang="en-CA" sz="1800" dirty="0" err="1"/>
+              <a:t>en</a:t>
+            </a:r>
+            <a:r>
+              <a:rPr lang="en-CA" sz="1800" dirty="0"/>
+              <a:t> temps:</a:t>
+            </a:r>
+          </a:p>
+          <a:p>
+            <a:pPr marL="0" indent="0">
+              <a:buNone/>
+            </a:pPr>
+            <a:endParaRPr lang="en-CA" dirty="0">
+              <a:highlight>
+                <a:srgbClr val="FFFF00"/>
+              </a:highlight>
+            </a:endParaRPr>
+          </a:p>
+        </p:txBody>
+      </p:sp>
+      <p:sp>
+        <p:nvSpPr>
+          <p:cNvPr id="4" name="Title 1">
+            <a:extLst>
+              <a:ext uri="{FF2B5EF4-FFF2-40B4-BE49-F238E27FC236}">
+                <a16:creationId xmlns:a16="http://schemas.microsoft.com/office/drawing/2014/main" id="{534C400C-DAB6-1736-E844-392B42B9EF01}"/>
+              </a:ext>
+            </a:extLst>
+          </p:cNvPr>
+          <p:cNvSpPr txBox="1">
+            <a:spLocks/>
+          </p:cNvSpPr>
+          <p:nvPr/>
+        </p:nvSpPr>
+        <p:spPr>
+          <a:xfrm>
+            <a:off x="1000432" y="-13007"/>
+            <a:ext cx="10515600" cy="1325563"/>
+          </a:xfrm>
+          <a:prstGeom prst="rect">
+            <a:avLst/>
+          </a:prstGeom>
+        </p:spPr>
+        <p:txBody>
+          <a:bodyPr vert="horz" lIns="91440" tIns="45720" rIns="91440" bIns="45720" rtlCol="0" anchor="ctr">
+            <a:normAutofit/>
+          </a:bodyPr>
+          <a:lstStyle>
+            <a:lvl1pPr algn="l" defTabSz="914400" rtl="0" eaLnBrk="1" latinLnBrk="0" hangingPunct="1">
+              <a:lnSpc>
+                <a:spcPct val="90000"/>
+              </a:lnSpc>
+              <a:spcBef>
+                <a:spcPct val="0"/>
+              </a:spcBef>
+              <a:buNone/>
+              <a:defRPr sz="4400" kern="1200">
+                <a:solidFill>
+                  <a:schemeClr val="tx1"/>
+                </a:solidFill>
+                <a:latin typeface="+mj-lt"/>
+                <a:ea typeface="+mj-ea"/>
+                <a:cs typeface="+mj-cs"/>
+              </a:defRPr>
+            </a:lvl1pPr>
+          </a:lstStyle>
+          <a:p>
+            <a:r>
+              <a:rPr lang="en-CA" sz="3600" dirty="0"/>
+              <a:t>B-c) MMS: </a:t>
+            </a:r>
+            <a:r>
+              <a:rPr lang="en-CA" sz="3600" dirty="0" err="1"/>
+              <a:t>vérification</a:t>
+            </a:r>
+            <a:r>
+              <a:rPr lang="en-CA" sz="3600" dirty="0"/>
+              <a:t> et discussion</a:t>
+            </a:r>
+          </a:p>
+        </p:txBody>
+      </p:sp>
+      <p:pic>
+        <p:nvPicPr>
+          <p:cNvPr id="5" name="Picture 4" descr="A graph of a function&#10;&#10;Description automatically generated">
+            <a:extLst>
+              <a:ext uri="{FF2B5EF4-FFF2-40B4-BE49-F238E27FC236}">
+                <a16:creationId xmlns:a16="http://schemas.microsoft.com/office/drawing/2014/main" id="{5F50B54F-2F7A-E29D-2884-09DD6D40921F}"/>
+              </a:ext>
+            </a:extLst>
+          </p:cNvPr>
+          <p:cNvPicPr>
+            <a:picLocks noChangeAspect="1"/>
+          </p:cNvPicPr>
+          <p:nvPr/>
+        </p:nvPicPr>
+        <p:blipFill rotWithShape="1">
+          <a:blip r:embed="rId2">
+            <a:extLst>
+              <a:ext uri="{28A0092B-C50C-407E-A947-70E740481C1C}">
+                <a14:useLocalDpi xmlns:a14="http://schemas.microsoft.com/office/drawing/2010/main" val="0"/>
+              </a:ext>
+            </a:extLst>
+          </a:blip>
+          <a:srcRect l="3465" t="6458" r="8163" b="3221"/>
+          <a:stretch/>
+        </p:blipFill>
+        <p:spPr>
+          <a:xfrm>
+            <a:off x="6041710" y="1425677"/>
+            <a:ext cx="5676098" cy="5432324"/>
+          </a:xfrm>
+          <a:prstGeom prst="rect">
+            <a:avLst/>
+          </a:prstGeom>
+        </p:spPr>
+      </p:pic>
+      <p:pic>
+        <p:nvPicPr>
+          <p:cNvPr id="7" name="Picture 6" descr="A graph of a function&#10;&#10;Description automatically generated">
+            <a:extLst>
+              <a:ext uri="{FF2B5EF4-FFF2-40B4-BE49-F238E27FC236}">
+                <a16:creationId xmlns:a16="http://schemas.microsoft.com/office/drawing/2014/main" id="{6E87A84A-AE1E-4577-6154-7C9F99712A50}"/>
+              </a:ext>
+            </a:extLst>
+          </p:cNvPr>
+          <p:cNvPicPr>
+            <a:picLocks noChangeAspect="1"/>
+          </p:cNvPicPr>
+          <p:nvPr/>
+        </p:nvPicPr>
+        <p:blipFill rotWithShape="1">
+          <a:blip r:embed="rId3">
+            <a:extLst>
+              <a:ext uri="{28A0092B-C50C-407E-A947-70E740481C1C}">
+                <a14:useLocalDpi xmlns:a14="http://schemas.microsoft.com/office/drawing/2010/main" val="0"/>
+              </a:ext>
+            </a:extLst>
+          </a:blip>
+          <a:srcRect l="5021" t="7456" r="7464" b="5109"/>
+          <a:stretch/>
+        </p:blipFill>
+        <p:spPr>
+          <a:xfrm>
+            <a:off x="217753" y="1612491"/>
+            <a:ext cx="5516110" cy="5072114"/>
+          </a:xfrm>
+          <a:prstGeom prst="rect">
+            <a:avLst/>
+          </a:prstGeom>
+        </p:spPr>
+      </p:pic>
+    </p:spTree>
+    <p:extLst>
+      <p:ext uri="{BB962C8B-B14F-4D97-AF65-F5344CB8AC3E}">
+        <p14:creationId xmlns:p14="http://schemas.microsoft.com/office/powerpoint/2010/main" val="2765143414"/>
+      </p:ext>
+    </p:extLst>
+  </p:cSld>
+  <p:clrMapOvr>
+    <a:masterClrMapping/>
+  </p:clrMapOvr>
+</p:sld>
+</file>
+
+<file path=ppt/slides/slide14.xml><?xml version="1.0" encoding="utf-8"?>
+<p:sld xmlns:a="http://schemas.openxmlformats.org/drawingml/2006/main" xmlns:r="http://schemas.openxmlformats.org/officeDocument/2006/relationships" xmlns:p="http://schemas.openxmlformats.org/presentationml/2006/main">
+  <p:cSld>
+    <p:spTree>
+      <p:nvGrpSpPr>
+        <p:cNvPr id="1" name="">
+          <a:extLst>
+            <a:ext uri="{FF2B5EF4-FFF2-40B4-BE49-F238E27FC236}">
+              <a16:creationId xmlns:a16="http://schemas.microsoft.com/office/drawing/2014/main" id="{4B8EF6B3-441A-C6AC-95DA-18C16332F4FD}"/>
+            </a:ext>
+          </a:extLst>
+        </p:cNvPr>
+        <p:cNvGrpSpPr/>
+        <p:nvPr/>
+      </p:nvGrpSpPr>
+      <p:grpSpPr>
+        <a:xfrm>
+          <a:off x="0" y="0"/>
+          <a:ext cx="0" cy="0"/>
+          <a:chOff x="0" y="0"/>
+          <a:chExt cx="0" cy="0"/>
+        </a:xfrm>
+      </p:grpSpPr>
+      <p:sp>
+        <p:nvSpPr>
+          <p:cNvPr id="3" name="Content Placeholder 2">
+            <a:extLst>
+              <a:ext uri="{FF2B5EF4-FFF2-40B4-BE49-F238E27FC236}">
+                <a16:creationId xmlns:a16="http://schemas.microsoft.com/office/drawing/2014/main" id="{8E9C3C12-6DE9-2EF0-C9D5-C3225439A0DA}"/>
               </a:ext>
             </a:extLst>
           </p:cNvPr>
@@ -10669,7 +12228,9 @@
         </p:nvSpPr>
         <p:spPr/>
         <p:txBody>
-          <a:bodyPr/>
+          <a:bodyPr>
+            <a:normAutofit lnSpcReduction="10000"/>
+          </a:bodyPr>
           <a:lstStyle/>
           <a:p>
             <a:pPr marL="0" indent="0">
@@ -10697,8 +12258,316 @@
                   <a:srgbClr val="FFFF00"/>
                 </a:highlight>
               </a:rPr>
+              <a:t> à t=0 &gt; </a:t>
+            </a:r>
+            <a:r>
+              <a:rPr lang="en-CA" dirty="0" err="1">
+                <a:highlight>
+                  <a:srgbClr val="FFFF00"/>
+                </a:highlight>
+              </a:rPr>
+              <a:t>erreur</a:t>
+            </a:r>
+            <a:r>
+              <a:rPr lang="en-CA" dirty="0">
+                <a:highlight>
+                  <a:srgbClr val="FFFF00"/>
+                </a:highlight>
+              </a:rPr>
+              <a:t> L2 </a:t>
+            </a:r>
+            <a:r>
+              <a:rPr lang="en-CA" dirty="0" err="1">
+                <a:highlight>
+                  <a:srgbClr val="FFFF00"/>
+                </a:highlight>
+              </a:rPr>
+              <a:t>en</a:t>
+            </a:r>
+            <a:r>
+              <a:rPr lang="en-CA" dirty="0">
+                <a:highlight>
+                  <a:srgbClr val="FFFF00"/>
+                </a:highlight>
+              </a:rPr>
               <a:t> </a:t>
             </a:r>
+            <a:r>
+              <a:rPr lang="en-CA" dirty="0" err="1">
+                <a:highlight>
+                  <a:srgbClr val="FFFF00"/>
+                </a:highlight>
+              </a:rPr>
+              <a:t>tps</a:t>
+            </a:r>
+            <a:r>
+              <a:rPr lang="en-CA" dirty="0">
+                <a:highlight>
+                  <a:srgbClr val="FFFF00"/>
+                </a:highlight>
+              </a:rPr>
+              <a:t> et </a:t>
+            </a:r>
+            <a:r>
+              <a:rPr lang="en-CA" dirty="0" err="1">
+                <a:highlight>
+                  <a:srgbClr val="FFFF00"/>
+                </a:highlight>
+              </a:rPr>
+              <a:t>en</a:t>
+            </a:r>
+            <a:r>
+              <a:rPr lang="en-CA" dirty="0">
+                <a:highlight>
+                  <a:srgbClr val="FFFF00"/>
+                </a:highlight>
+              </a:rPr>
+              <a:t> </a:t>
+            </a:r>
+            <a:r>
+              <a:rPr lang="en-CA" dirty="0" err="1">
+                <a:highlight>
+                  <a:srgbClr val="FFFF00"/>
+                </a:highlight>
+              </a:rPr>
+              <a:t>espace</a:t>
+            </a:r>
+            <a:r>
+              <a:rPr lang="en-CA" dirty="0">
+                <a:highlight>
+                  <a:srgbClr val="FFFF00"/>
+                </a:highlight>
+              </a:rPr>
+              <a:t> </a:t>
+            </a:r>
+          </a:p>
+          <a:p>
+            <a:pPr marL="0" indent="0">
+              <a:buNone/>
+            </a:pPr>
+            <a:r>
+              <a:rPr lang="en-CA" dirty="0">
+                <a:highlight>
+                  <a:srgbClr val="FFFF00"/>
+                </a:highlight>
+              </a:rPr>
+              <a:t>+ </a:t>
+            </a:r>
+            <a:r>
+              <a:rPr lang="en-CA" dirty="0" err="1">
+                <a:highlight>
+                  <a:srgbClr val="FFFF00"/>
+                </a:highlight>
+              </a:rPr>
+              <a:t>graphes</a:t>
+            </a:r>
+            <a:r>
+              <a:rPr lang="en-CA" dirty="0">
+                <a:highlight>
+                  <a:srgbClr val="FFFF00"/>
+                </a:highlight>
+              </a:rPr>
+              <a:t> à t=? (RT) &gt; </a:t>
+            </a:r>
+            <a:r>
+              <a:rPr lang="en-CA" dirty="0" err="1">
+                <a:highlight>
+                  <a:srgbClr val="FFFF00"/>
+                </a:highlight>
+              </a:rPr>
+              <a:t>erreur</a:t>
+            </a:r>
+            <a:r>
+              <a:rPr lang="en-CA" dirty="0">
+                <a:highlight>
+                  <a:srgbClr val="FFFF00"/>
+                </a:highlight>
+              </a:rPr>
+              <a:t> L2 </a:t>
+            </a:r>
+            <a:r>
+              <a:rPr lang="en-CA" dirty="0" err="1">
+                <a:highlight>
+                  <a:srgbClr val="FFFF00"/>
+                </a:highlight>
+              </a:rPr>
+              <a:t>en</a:t>
+            </a:r>
+            <a:r>
+              <a:rPr lang="en-CA" dirty="0">
+                <a:highlight>
+                  <a:srgbClr val="FFFF00"/>
+                </a:highlight>
+              </a:rPr>
+              <a:t> </a:t>
+            </a:r>
+            <a:r>
+              <a:rPr lang="en-CA" dirty="0" err="1">
+                <a:highlight>
+                  <a:srgbClr val="FFFF00"/>
+                </a:highlight>
+              </a:rPr>
+              <a:t>tps</a:t>
+            </a:r>
+            <a:r>
+              <a:rPr lang="en-CA" dirty="0">
+                <a:highlight>
+                  <a:srgbClr val="FFFF00"/>
+                </a:highlight>
+              </a:rPr>
+              <a:t> et </a:t>
+            </a:r>
+            <a:r>
+              <a:rPr lang="en-CA" dirty="0" err="1">
+                <a:highlight>
+                  <a:srgbClr val="FFFF00"/>
+                </a:highlight>
+              </a:rPr>
+              <a:t>en</a:t>
+            </a:r>
+            <a:r>
+              <a:rPr lang="en-CA" dirty="0">
+                <a:highlight>
+                  <a:srgbClr val="FFFF00"/>
+                </a:highlight>
+              </a:rPr>
+              <a:t> </a:t>
+            </a:r>
+            <a:r>
+              <a:rPr lang="en-CA" dirty="0" err="1">
+                <a:highlight>
+                  <a:srgbClr val="FFFF00"/>
+                </a:highlight>
+              </a:rPr>
+              <a:t>espace</a:t>
+            </a:r>
+            <a:r>
+              <a:rPr lang="en-CA" dirty="0">
+                <a:highlight>
+                  <a:srgbClr val="FFFF00"/>
+                </a:highlight>
+              </a:rPr>
+              <a:t> </a:t>
+            </a:r>
+          </a:p>
+          <a:p>
+            <a:pPr marL="0" indent="0">
+              <a:buNone/>
+            </a:pPr>
+            <a:r>
+              <a:rPr lang="en-CA" dirty="0">
+                <a:highlight>
+                  <a:srgbClr val="FFFF00"/>
+                </a:highlight>
+              </a:rPr>
+              <a:t>+ </a:t>
+            </a:r>
+            <a:r>
+              <a:rPr lang="en-CA" dirty="0" err="1">
+                <a:highlight>
+                  <a:srgbClr val="FFFF00"/>
+                </a:highlight>
+              </a:rPr>
+              <a:t>graphes</a:t>
+            </a:r>
+            <a:r>
+              <a:rPr lang="en-CA" dirty="0">
+                <a:highlight>
+                  <a:srgbClr val="FFFF00"/>
+                </a:highlight>
+              </a:rPr>
+              <a:t> à t=1e9 (RP) &gt; </a:t>
+            </a:r>
+            <a:r>
+              <a:rPr lang="en-CA" dirty="0" err="1">
+                <a:highlight>
+                  <a:srgbClr val="FFFF00"/>
+                </a:highlight>
+              </a:rPr>
+              <a:t>erreur</a:t>
+            </a:r>
+            <a:r>
+              <a:rPr lang="en-CA" dirty="0">
+                <a:highlight>
+                  <a:srgbClr val="FFFF00"/>
+                </a:highlight>
+              </a:rPr>
+              <a:t> L2 </a:t>
+            </a:r>
+            <a:r>
+              <a:rPr lang="en-CA" dirty="0" err="1">
+                <a:highlight>
+                  <a:srgbClr val="FFFF00"/>
+                </a:highlight>
+              </a:rPr>
+              <a:t>en</a:t>
+            </a:r>
+            <a:r>
+              <a:rPr lang="en-CA" dirty="0">
+                <a:highlight>
+                  <a:srgbClr val="FFFF00"/>
+                </a:highlight>
+              </a:rPr>
+              <a:t> </a:t>
+            </a:r>
+            <a:r>
+              <a:rPr lang="en-CA" dirty="0" err="1">
+                <a:highlight>
+                  <a:srgbClr val="FFFF00"/>
+                </a:highlight>
+              </a:rPr>
+              <a:t>tps</a:t>
+            </a:r>
+            <a:r>
+              <a:rPr lang="en-CA" dirty="0">
+                <a:highlight>
+                  <a:srgbClr val="FFFF00"/>
+                </a:highlight>
+              </a:rPr>
+              <a:t> et </a:t>
+            </a:r>
+            <a:r>
+              <a:rPr lang="en-CA" dirty="0" err="1">
+                <a:highlight>
+                  <a:srgbClr val="FFFF00"/>
+                </a:highlight>
+              </a:rPr>
+              <a:t>en</a:t>
+            </a:r>
+            <a:r>
+              <a:rPr lang="en-CA" dirty="0">
+                <a:highlight>
+                  <a:srgbClr val="FFFF00"/>
+                </a:highlight>
+              </a:rPr>
+              <a:t> </a:t>
+            </a:r>
+            <a:r>
+              <a:rPr lang="en-CA" dirty="0" err="1">
+                <a:highlight>
+                  <a:srgbClr val="FFFF00"/>
+                </a:highlight>
+              </a:rPr>
+              <a:t>espace</a:t>
+            </a:r>
+            <a:r>
+              <a:rPr lang="en-CA" dirty="0">
+                <a:highlight>
+                  <a:srgbClr val="FFFF00"/>
+                </a:highlight>
+              </a:rPr>
+              <a:t> </a:t>
+            </a:r>
+          </a:p>
+          <a:p>
+            <a:pPr marL="0" indent="0">
+              <a:buNone/>
+            </a:pPr>
+            <a:endParaRPr lang="en-CA" dirty="0">
+              <a:highlight>
+                <a:srgbClr val="FFFF00"/>
+              </a:highlight>
+            </a:endParaRPr>
           </a:p>
           <a:p>
             <a:pPr marL="0" indent="0">
@@ -10781,7 +12650,7 @@
           <p:cNvPr id="4" name="Title 1">
             <a:extLst>
               <a:ext uri="{FF2B5EF4-FFF2-40B4-BE49-F238E27FC236}">
-                <a16:creationId xmlns:a16="http://schemas.microsoft.com/office/drawing/2014/main" id="{9F7D0384-5D6F-E25A-E330-866BC1D2EE1B}"/>
+                <a16:creationId xmlns:a16="http://schemas.microsoft.com/office/drawing/2014/main" id="{721D8834-7CBA-8DE6-B6F4-CCB53AE0DA20}"/>
               </a:ext>
             </a:extLst>
           </p:cNvPr>
@@ -10841,7 +12710,7 @@
     </p:spTree>
     <p:extLst>
       <p:ext uri="{BB962C8B-B14F-4D97-AF65-F5344CB8AC3E}">
-        <p14:creationId xmlns:p14="http://schemas.microsoft.com/office/powerpoint/2010/main" val="1685626482"/>
+        <p14:creationId xmlns:p14="http://schemas.microsoft.com/office/powerpoint/2010/main" val="1607358301"/>
       </p:ext>
     </p:extLst>
   </p:cSld>
@@ -10851,7 +12720,7 @@
 </p:sld>
 </file>
 
-<file path=ppt/slides/slide12.xml><?xml version="1.0" encoding="utf-8"?>
+<file path=ppt/slides/slide15.xml><?xml version="1.0" encoding="utf-8"?>
 <p:sld xmlns:a="http://schemas.openxmlformats.org/drawingml/2006/main" xmlns:r="http://schemas.openxmlformats.org/officeDocument/2006/relationships" xmlns:p="http://schemas.openxmlformats.org/presentationml/2006/main">
   <p:cSld>
     <p:spTree>
@@ -11265,8 +13134,8 @@
           </a:p>
         </p:txBody>
       </p:sp>
-      <mc:AlternateContent xmlns:mc="http://schemas.openxmlformats.org/markup-compatibility/2006" xmlns:a14="http://schemas.microsoft.com/office/drawing/2010/main">
-        <mc:Choice Requires="a14">
+      <mc:AlternateContent xmlns:mc="http://schemas.openxmlformats.org/markup-compatibility/2006">
+        <mc:Choice xmlns:a14="http://schemas.microsoft.com/office/drawing/2010/main" Requires="a14">
           <p:sp>
             <p:nvSpPr>
               <p:cNvPr id="4" name="Espace réservé du contenu 3">
@@ -11290,15 +13159,7 @@
               <a:p>
                 <a:r>
                   <a:rPr lang="fr-FR" dirty="0"/>
-                  <a:t>Pour cette partie de vérification une comparaison code à code a été réalisé pour un maillage </a:t>
-                </a:r>
-                <a:r>
-                  <a:rPr lang="fr-FR" dirty="0" err="1"/>
-                  <a:t>telque</a:t>
-                </a:r>
-                <a:r>
-                  <a:rPr lang="fr-FR" dirty="0"/>
-                  <a:t> </a:t>
+                  <a:t>Pour cette partie de vérification une comparaison code à code a été réalisé pour un maillage tel que </a:t>
                 </a:r>
                 <a:r>
                   <a:rPr lang="el-GR" dirty="0"/>
@@ -11470,7 +13331,7 @@
             </p:txBody>
           </p:sp>
         </mc:Choice>
-        <mc:Fallback xmlns="">
+        <mc:Fallback>
           <p:sp>
             <p:nvSpPr>
               <p:cNvPr id="4" name="Espace réservé du contenu 3">
@@ -11500,7 +13361,7 @@
               <a:lstStyle/>
               <a:p>
                 <a:r>
-                  <a:rPr lang="fr-CA">
+                  <a:rPr lang="en-CA">
                     <a:noFill/>
                   </a:rPr>
                   <a:t> </a:t>
@@ -11745,8 +13606,8 @@
           <a:chExt cx="0" cy="0"/>
         </a:xfrm>
       </p:grpSpPr>
-      <mc:AlternateContent xmlns:mc="http://schemas.openxmlformats.org/markup-compatibility/2006">
-        <mc:Choice xmlns:a14="http://schemas.microsoft.com/office/drawing/2010/main" Requires="a14">
+      <mc:AlternateContent xmlns:mc="http://schemas.openxmlformats.org/markup-compatibility/2006" xmlns:a14="http://schemas.microsoft.com/office/drawing/2010/main">
+        <mc:Choice Requires="a14">
           <p:sp>
             <p:nvSpPr>
               <p:cNvPr id="3" name="Content Placeholder 2">
@@ -11953,7 +13814,7 @@
             </p:txBody>
           </p:sp>
         </mc:Choice>
-        <mc:Fallback>
+        <mc:Fallback xmlns="">
           <p:sp>
             <p:nvSpPr>
               <p:cNvPr id="3" name="Content Placeholder 2">
@@ -12207,7 +14068,15 @@
                 </a:r>
                 <a:r>
                   <a:rPr lang="en-CA" sz="1600" dirty="0"/>
-                  <a:t> de simplifier le (1/r) precedent le </a:t>
+                  <a:t> de simplifier le (1/r) </a:t>
+                </a:r>
+                <a:r>
+                  <a:rPr lang="en-CA" sz="1600" dirty="0" err="1"/>
+                  <a:t>précédant</a:t>
+                </a:r>
+                <a:r>
+                  <a:rPr lang="en-CA" sz="1600" dirty="0"/>
+                  <a:t> le </a:t>
                 </a:r>
                 <a:r>
                   <a:rPr lang="en-CA" sz="1600" dirty="0" err="1"/>
@@ -12482,7 +14351,28 @@
                       <a:srgbClr val="FFFF00"/>
                     </a:highlight>
                   </a:rPr>
-                  <a:t> t à </a:t>
+                  <a:t> </a:t>
+                </a:r>
+                <a14:m>
+                  <m:oMath xmlns:m="http://schemas.openxmlformats.org/officeDocument/2006/math">
+                    <m:r>
+                      <a:rPr lang="en-CA" sz="1600" b="0" i="1" smtClean="0">
+                        <a:highlight>
+                          <a:srgbClr val="FFFF00"/>
+                        </a:highlight>
+                        <a:latin typeface="Cambria Math" panose="02040503050406030204" pitchFamily="18" charset="0"/>
+                      </a:rPr>
+                      <m:t>𝑡</m:t>
+                    </m:r>
+                  </m:oMath>
+                </a14:m>
+                <a:r>
+                  <a:rPr lang="en-CA" sz="1600" dirty="0">
+                    <a:highlight>
+                      <a:srgbClr val="FFFF00"/>
+                    </a:highlight>
+                  </a:rPr>
+                  <a:t> à </a:t>
                 </a:r>
                 <a:r>
                   <a:rPr lang="en-CA" sz="1600" dirty="0" err="1">
@@ -12514,7 +14404,7 @@
                       <a:srgbClr val="FFFF00"/>
                     </a:highlight>
                   </a:rPr>
-                  <a:t> aide a controller le fait que la solution </a:t>
+                  <a:t> aide a </a:t>
                 </a:r>
                 <a:r>
                   <a:rPr lang="en-CA" sz="1600" dirty="0" err="1">
@@ -12522,7 +14412,23 @@
                       <a:srgbClr val="FFFF00"/>
                     </a:highlight>
                   </a:rPr>
-                  <a:t>manufcaturee</a:t>
+                  <a:t>contrôler</a:t>
+                </a:r>
+                <a:r>
+                  <a:rPr lang="en-CA" sz="1600" dirty="0">
+                    <a:highlight>
+                      <a:srgbClr val="FFFF00"/>
+                    </a:highlight>
+                  </a:rPr>
+                  <a:t> le fait que la solution </a:t>
+                </a:r>
+                <a:r>
+                  <a:rPr lang="en-CA" sz="1600" dirty="0" err="1">
+                    <a:highlight>
+                      <a:srgbClr val="FFFF00"/>
+                    </a:highlight>
+                  </a:rPr>
+                  <a:t>manufacturée</a:t>
                 </a:r>
                 <a:r>
                   <a:rPr lang="en-CA" sz="1600" dirty="0">
@@ -12562,7 +14468,37 @@
                       <a:srgbClr val="FFFF00"/>
                     </a:highlight>
                   </a:rPr>
-                  <a:t> t=0, et que le </a:t>
+                  <a:t> </a:t>
+                </a:r>
+                <a14:m>
+                  <m:oMath xmlns:m="http://schemas.openxmlformats.org/officeDocument/2006/math">
+                    <m:r>
+                      <a:rPr lang="en-CA" sz="1600" b="0" i="1" smtClean="0">
+                        <a:highlight>
+                          <a:srgbClr val="FFFF00"/>
+                        </a:highlight>
+                        <a:latin typeface="Cambria Math" panose="02040503050406030204" pitchFamily="18" charset="0"/>
+                      </a:rPr>
+                      <m:t>𝑡</m:t>
+                    </m:r>
+                    <m:r>
+                      <a:rPr lang="en-CA" sz="1600" b="0" i="1" smtClean="0">
+                        <a:highlight>
+                          <a:srgbClr val="FFFF00"/>
+                        </a:highlight>
+                        <a:latin typeface="Cambria Math" panose="02040503050406030204" pitchFamily="18" charset="0"/>
+                      </a:rPr>
+                      <m:t>=0</m:t>
+                    </m:r>
+                  </m:oMath>
+                </a14:m>
+                <a:r>
+                  <a:rPr lang="en-CA" sz="1600" dirty="0">
+                    <a:highlight>
+                      <a:srgbClr val="FFFF00"/>
+                    </a:highlight>
+                  </a:rPr>
+                  <a:t>, et que le </a:t>
                 </a:r>
                 <a:r>
                   <a:rPr lang="en-CA" sz="1600" dirty="0" err="1">
@@ -12642,7 +14578,7 @@
                       <a:srgbClr val="FFFF00"/>
                     </a:highlight>
                   </a:rPr>
-                  <a:t>  pour </a:t>
+                  <a:t>  pour que </a:t>
                 </a:r>
                 <a:r>
                   <a:rPr lang="en-CA" sz="1600" dirty="0" err="1">
@@ -12650,7 +14586,7 @@
                       <a:srgbClr val="FFFF00"/>
                     </a:highlight>
                   </a:rPr>
-                  <a:t>quecette</a:t>
+                  <a:t>cette</a:t>
                 </a:r>
                 <a:r>
                   <a:rPr lang="en-CA" sz="1600" dirty="0">
@@ -12810,7 +14746,7 @@
                       <a:srgbClr val="FFFF00"/>
                     </a:highlight>
                   </a:rPr>
-                  <a:t>temre</a:t>
+                  <a:t>terme</a:t>
                 </a:r>
                 <a:r>
                   <a:rPr lang="en-CA" sz="1600" dirty="0">
@@ -12834,812 +14770,1161 @@
                 </a:r>
               </a:p>
               <a:p>
-                <a:pPr marL="0" indent="0">
-                  <a:buNone/>
-                </a:pPr>
+                <a:pPr/>
                 <a14:m>
-                  <m:oMathPara xmlns:m="http://schemas.openxmlformats.org/officeDocument/2006/math">
-                    <m:oMathParaPr>
-                      <m:jc m:val="left"/>
-                    </m:oMathParaPr>
-                    <m:oMath xmlns:m="http://schemas.openxmlformats.org/officeDocument/2006/math">
-                      <m:f>
-                        <m:fPr>
-                          <m:ctrlPr>
-                            <a:rPr lang="en-CA" sz="1600" b="0" i="1" smtClean="0">
-                              <a:latin typeface="Cambria Math" panose="02040503050406030204" pitchFamily="18" charset="0"/>
-                            </a:rPr>
-                          </m:ctrlPr>
-                        </m:fPr>
-                        <m:num>
-                          <m:r>
-                            <a:rPr lang="en-CA" sz="1600" b="0" i="1" smtClean="0">
-                              <a:latin typeface="Cambria Math" panose="02040503050406030204" pitchFamily="18" charset="0"/>
-                            </a:rPr>
-                            <m:t>𝜕</m:t>
-                          </m:r>
-                          <m:acc>
-                            <m:accPr>
-                              <m:chr m:val="̂"/>
-                              <m:ctrlPr>
-                                <a:rPr lang="en-CA" sz="1600" i="1">
-                                  <a:latin typeface="Cambria Math" panose="02040503050406030204" pitchFamily="18" charset="0"/>
-                                </a:rPr>
-                              </m:ctrlPr>
-                            </m:accPr>
-                            <m:e>
-                              <m:r>
-                                <a:rPr lang="en-CA" sz="1600" i="1">
-                                  <a:latin typeface="Cambria Math" panose="02040503050406030204" pitchFamily="18" charset="0"/>
-                                </a:rPr>
-                                <m:t>𝐶</m:t>
-                              </m:r>
-                            </m:e>
-                          </m:acc>
-                        </m:num>
-                        <m:den>
-                          <m:r>
-                            <a:rPr lang="en-CA" sz="1600" b="0" i="1" smtClean="0">
-                              <a:latin typeface="Cambria Math" panose="02040503050406030204" pitchFamily="18" charset="0"/>
-                            </a:rPr>
-                            <m:t>𝜕</m:t>
-                          </m:r>
-                          <m:r>
-                            <a:rPr lang="en-CA" sz="1600" b="0" i="1" smtClean="0">
-                              <a:latin typeface="Cambria Math" panose="02040503050406030204" pitchFamily="18" charset="0"/>
-                            </a:rPr>
-                            <m:t>𝑡</m:t>
-                          </m:r>
-                        </m:den>
-                      </m:f>
-                      <m:r>
-                        <a:rPr lang="en-CA" sz="1600" b="0" i="1" smtClean="0">
-                          <a:latin typeface="Cambria Math" panose="02040503050406030204" pitchFamily="18" charset="0"/>
-                        </a:rPr>
-                        <m:t>=−</m:t>
-                      </m:r>
-                      <m:sSub>
-                        <m:sSubPr>
-                          <m:ctrlPr>
-                            <a:rPr lang="en-CA" sz="1600" b="0" i="1" smtClean="0">
-                              <a:latin typeface="Cambria Math" panose="02040503050406030204" pitchFamily="18" charset="0"/>
-                            </a:rPr>
-                          </m:ctrlPr>
-                        </m:sSubPr>
-                        <m:e>
-                          <m:r>
-                            <a:rPr lang="en-CA" sz="1600" b="0" i="1" smtClean="0">
-                              <a:latin typeface="Cambria Math" panose="02040503050406030204" pitchFamily="18" charset="0"/>
-                            </a:rPr>
-                            <m:t>𝐷</m:t>
-                          </m:r>
-                        </m:e>
-                        <m:sub>
-                          <m:r>
-                            <a:rPr lang="en-CA" sz="1600" b="0" i="1" smtClean="0">
-                              <a:latin typeface="Cambria Math" panose="02040503050406030204" pitchFamily="18" charset="0"/>
-                            </a:rPr>
-                            <m:t>𝑒𝑓𝑓</m:t>
-                          </m:r>
-                        </m:sub>
-                      </m:sSub>
-                      <m:sSup>
-                        <m:sSupPr>
-                          <m:ctrlPr>
-                            <a:rPr lang="en-CA" sz="1600" b="0" i="1" smtClean="0">
-                              <a:latin typeface="Cambria Math" panose="02040503050406030204" pitchFamily="18" charset="0"/>
-                            </a:rPr>
-                          </m:ctrlPr>
-                        </m:sSupPr>
-                        <m:e>
-                          <m:r>
-                            <a:rPr lang="en-CA" sz="1600" b="0" i="1" smtClean="0">
-                              <a:latin typeface="Cambria Math" panose="02040503050406030204" pitchFamily="18" charset="0"/>
-                            </a:rPr>
-                            <m:t>𝑟</m:t>
-                          </m:r>
-                        </m:e>
-                        <m:sup>
-                          <m:r>
-                            <a:rPr lang="en-CA" sz="1600" b="0" i="1" smtClean="0">
-                              <a:latin typeface="Cambria Math" panose="02040503050406030204" pitchFamily="18" charset="0"/>
-                            </a:rPr>
-                            <m:t>2</m:t>
-                          </m:r>
-                        </m:sup>
-                      </m:sSup>
-                      <m:r>
-                        <a:rPr lang="en-CA" sz="1600" b="0" i="1" smtClean="0">
-                          <a:latin typeface="Cambria Math" panose="02040503050406030204" pitchFamily="18" charset="0"/>
-                        </a:rPr>
-                        <m:t>𝑡</m:t>
-                      </m:r>
-                      <m:d>
-                        <m:dPr>
-                          <m:ctrlPr>
-                            <a:rPr lang="en-CA" sz="1600" b="0" i="1" smtClean="0">
-                              <a:latin typeface="Cambria Math" panose="02040503050406030204" pitchFamily="18" charset="0"/>
-                            </a:rPr>
-                          </m:ctrlPr>
-                        </m:dPr>
-                        <m:e>
-                          <m:r>
-                            <a:rPr lang="en-CA" sz="1600" b="0" i="1" smtClean="0">
-                              <a:latin typeface="Cambria Math" panose="02040503050406030204" pitchFamily="18" charset="0"/>
-                            </a:rPr>
-                            <m:t>𝑅</m:t>
-                          </m:r>
-                          <m:r>
-                            <a:rPr lang="en-CA" sz="1600" b="0" i="1" smtClean="0">
-                              <a:latin typeface="Cambria Math" panose="02040503050406030204" pitchFamily="18" charset="0"/>
-                            </a:rPr>
-                            <m:t>−</m:t>
-                          </m:r>
-                          <m:r>
-                            <a:rPr lang="en-CA" sz="1600" b="0" i="1" smtClean="0">
-                              <a:latin typeface="Cambria Math" panose="02040503050406030204" pitchFamily="18" charset="0"/>
-                            </a:rPr>
-                            <m:t>𝑟</m:t>
-                          </m:r>
-                        </m:e>
-                      </m:d>
-                      <m:func>
-                        <m:funcPr>
-                          <m:ctrlPr>
-                            <a:rPr lang="en-CA" sz="1600" b="0" i="1" smtClean="0">
-                              <a:latin typeface="Cambria Math" panose="02040503050406030204" pitchFamily="18" charset="0"/>
-                            </a:rPr>
-                          </m:ctrlPr>
-                        </m:funcPr>
-                        <m:fName>
-                          <m:r>
-                            <m:rPr>
-                              <m:sty m:val="p"/>
-                            </m:rPr>
-                            <a:rPr lang="en-CA" sz="1600" b="0" i="0" smtClean="0">
-                              <a:latin typeface="Cambria Math" panose="02040503050406030204" pitchFamily="18" charset="0"/>
-                            </a:rPr>
-                            <m:t>exp</m:t>
-                          </m:r>
-                        </m:fName>
-                        <m:e>
-                          <m:d>
-                            <m:dPr>
-                              <m:ctrlPr>
-                                <a:rPr lang="en-CA" sz="1600" b="0" i="1" smtClean="0">
-                                  <a:latin typeface="Cambria Math" panose="02040503050406030204" pitchFamily="18" charset="0"/>
-                                </a:rPr>
-                              </m:ctrlPr>
-                            </m:dPr>
-                            <m:e>
-                              <m:r>
-                                <a:rPr lang="en-CA" sz="1600" b="0" i="1" smtClean="0">
-                                  <a:latin typeface="Cambria Math" panose="02040503050406030204" pitchFamily="18" charset="0"/>
-                                </a:rPr>
-                                <m:t>−</m:t>
-                              </m:r>
-                              <m:sSub>
-                                <m:sSubPr>
-                                  <m:ctrlPr>
-                                    <a:rPr lang="en-CA" sz="1600" b="0" i="1" smtClean="0">
-                                      <a:latin typeface="Cambria Math" panose="02040503050406030204" pitchFamily="18" charset="0"/>
-                                    </a:rPr>
-                                  </m:ctrlPr>
-                                </m:sSubPr>
-                                <m:e>
-                                  <m:r>
-                                    <a:rPr lang="en-CA" sz="1600" b="0" i="1" smtClean="0">
-                                      <a:latin typeface="Cambria Math" panose="02040503050406030204" pitchFamily="18" charset="0"/>
-                                    </a:rPr>
-                                    <m:t>𝐷</m:t>
-                                  </m:r>
-                                </m:e>
-                                <m:sub>
-                                  <m:r>
-                                    <a:rPr lang="en-CA" sz="1600" b="0" i="1" smtClean="0">
-                                      <a:latin typeface="Cambria Math" panose="02040503050406030204" pitchFamily="18" charset="0"/>
-                                    </a:rPr>
-                                    <m:t>𝑒𝑓𝑓</m:t>
-                                  </m:r>
-                                </m:sub>
-                              </m:sSub>
-                              <m:r>
-                                <a:rPr lang="en-CA" sz="1600" b="0" i="1" smtClean="0">
-                                  <a:latin typeface="Cambria Math" panose="02040503050406030204" pitchFamily="18" charset="0"/>
-                                </a:rPr>
-                                <m:t>.</m:t>
-                              </m:r>
-                              <m:r>
-                                <a:rPr lang="en-CA" sz="1600" b="0" i="1" smtClean="0">
-                                  <a:latin typeface="Cambria Math" panose="02040503050406030204" pitchFamily="18" charset="0"/>
-                                </a:rPr>
-                                <m:t>𝑡</m:t>
-                              </m:r>
-                            </m:e>
-                          </m:d>
-                        </m:e>
-                      </m:func>
-                      <m:r>
-                        <a:rPr lang="en-CA" sz="1600" b="0" i="1" smtClean="0">
-                          <a:latin typeface="Cambria Math" panose="02040503050406030204" pitchFamily="18" charset="0"/>
-                        </a:rPr>
-                        <m:t>+</m:t>
-                      </m:r>
-                      <m:sSup>
-                        <m:sSupPr>
-                          <m:ctrlPr>
-                            <a:rPr lang="en-CA" sz="1600" i="1">
-                              <a:latin typeface="Cambria Math" panose="02040503050406030204" pitchFamily="18" charset="0"/>
-                            </a:rPr>
-                          </m:ctrlPr>
-                        </m:sSupPr>
-                        <m:e>
-                          <m:r>
-                            <a:rPr lang="en-CA" sz="1600" i="1">
-                              <a:latin typeface="Cambria Math" panose="02040503050406030204" pitchFamily="18" charset="0"/>
-                            </a:rPr>
-                            <m:t>𝑟</m:t>
-                          </m:r>
-                        </m:e>
-                        <m:sup>
-                          <m:r>
-                            <a:rPr lang="en-CA" sz="1600" i="1">
-                              <a:latin typeface="Cambria Math" panose="02040503050406030204" pitchFamily="18" charset="0"/>
-                            </a:rPr>
-                            <m:t>2</m:t>
-                          </m:r>
-                        </m:sup>
-                      </m:sSup>
-                      <m:d>
-                        <m:dPr>
-                          <m:ctrlPr>
-                            <a:rPr lang="en-CA" sz="1600" i="1">
-                              <a:latin typeface="Cambria Math" panose="02040503050406030204" pitchFamily="18" charset="0"/>
-                            </a:rPr>
-                          </m:ctrlPr>
-                        </m:dPr>
-                        <m:e>
-                          <m:r>
-                            <a:rPr lang="en-CA" sz="1600" i="1">
-                              <a:latin typeface="Cambria Math" panose="02040503050406030204" pitchFamily="18" charset="0"/>
-                            </a:rPr>
-                            <m:t>𝑅</m:t>
-                          </m:r>
-                          <m:r>
-                            <a:rPr lang="en-CA" sz="1600" i="1">
-                              <a:latin typeface="Cambria Math" panose="02040503050406030204" pitchFamily="18" charset="0"/>
-                            </a:rPr>
-                            <m:t>−</m:t>
-                          </m:r>
-                          <m:r>
-                            <a:rPr lang="en-CA" sz="1600" i="1">
-                              <a:latin typeface="Cambria Math" panose="02040503050406030204" pitchFamily="18" charset="0"/>
-                            </a:rPr>
-                            <m:t>𝑟</m:t>
-                          </m:r>
-                        </m:e>
-                      </m:d>
-                      <m:func>
-                        <m:funcPr>
-                          <m:ctrlPr>
-                            <a:rPr lang="en-CA" sz="1600" i="1">
-                              <a:latin typeface="Cambria Math" panose="02040503050406030204" pitchFamily="18" charset="0"/>
-                            </a:rPr>
-                          </m:ctrlPr>
-                        </m:funcPr>
-                        <m:fName>
-                          <m:r>
-                            <m:rPr>
-                              <m:sty m:val="p"/>
-                            </m:rPr>
-                            <a:rPr lang="en-CA" sz="1600">
-                              <a:latin typeface="Cambria Math" panose="02040503050406030204" pitchFamily="18" charset="0"/>
-                            </a:rPr>
-                            <m:t>exp</m:t>
-                          </m:r>
-                        </m:fName>
-                        <m:e>
-                          <m:d>
-                            <m:dPr>
-                              <m:ctrlPr>
-                                <a:rPr lang="en-CA" sz="1600" i="1">
-                                  <a:latin typeface="Cambria Math" panose="02040503050406030204" pitchFamily="18" charset="0"/>
-                                </a:rPr>
-                              </m:ctrlPr>
-                            </m:dPr>
-                            <m:e>
-                              <m:r>
-                                <a:rPr lang="en-CA" sz="1600" i="1">
-                                  <a:latin typeface="Cambria Math" panose="02040503050406030204" pitchFamily="18" charset="0"/>
-                                </a:rPr>
-                                <m:t>−</m:t>
-                              </m:r>
-                              <m:sSub>
-                                <m:sSubPr>
-                                  <m:ctrlPr>
-                                    <a:rPr lang="en-CA" sz="1600" b="0" i="1" smtClean="0">
-                                      <a:latin typeface="Cambria Math" panose="02040503050406030204" pitchFamily="18" charset="0"/>
-                                    </a:rPr>
-                                  </m:ctrlPr>
-                                </m:sSubPr>
-                                <m:e>
-                                  <m:r>
-                                    <a:rPr lang="en-CA" sz="1600" i="1">
-                                      <a:latin typeface="Cambria Math" panose="02040503050406030204" pitchFamily="18" charset="0"/>
-                                    </a:rPr>
-                                    <m:t>𝐷</m:t>
-                                  </m:r>
-                                </m:e>
-                                <m:sub>
-                                  <m:r>
-                                    <a:rPr lang="en-CA" sz="1600" b="0" i="1" smtClean="0">
-                                      <a:latin typeface="Cambria Math" panose="02040503050406030204" pitchFamily="18" charset="0"/>
-                                    </a:rPr>
-                                    <m:t>𝑒𝑓𝑓</m:t>
-                                  </m:r>
-                                </m:sub>
-                              </m:sSub>
-                              <m:r>
-                                <a:rPr lang="en-CA" sz="1600" b="0" i="1" smtClean="0">
-                                  <a:latin typeface="Cambria Math" panose="02040503050406030204" pitchFamily="18" charset="0"/>
-                                </a:rPr>
-                                <m:t>.</m:t>
-                              </m:r>
-                              <m:r>
-                                <a:rPr lang="en-CA" sz="1600" i="1">
-                                  <a:latin typeface="Cambria Math" panose="02040503050406030204" pitchFamily="18" charset="0"/>
-                                </a:rPr>
-                                <m:t>𝑡</m:t>
-                              </m:r>
-                            </m:e>
-                          </m:d>
-                        </m:e>
-                      </m:func>
-                    </m:oMath>
-                  </m:oMathPara>
+                  <m:oMath xmlns:m="http://schemas.openxmlformats.org/officeDocument/2006/math">
+                    <m:f>
+                      <m:fPr>
+                        <m:ctrlPr>
+                          <a:rPr lang="en-CA" sz="1600" b="0" i="1" smtClean="0">
+                            <a:latin typeface="Cambria Math" panose="02040503050406030204" pitchFamily="18" charset="0"/>
+                          </a:rPr>
+                        </m:ctrlPr>
+                      </m:fPr>
+                      <m:num>
+                        <m:r>
+                          <a:rPr lang="en-CA" sz="1600" b="0" i="1" smtClean="0">
+                            <a:latin typeface="Cambria Math" panose="02040503050406030204" pitchFamily="18" charset="0"/>
+                          </a:rPr>
+                          <m:t>𝜕</m:t>
+                        </m:r>
+                        <m:acc>
+                          <m:accPr>
+                            <m:chr m:val="̂"/>
+                            <m:ctrlPr>
+                              <a:rPr lang="en-CA" sz="1600" i="1">
+                                <a:latin typeface="Cambria Math" panose="02040503050406030204" pitchFamily="18" charset="0"/>
+                              </a:rPr>
+                            </m:ctrlPr>
+                          </m:accPr>
+                          <m:e>
+                            <m:r>
+                              <a:rPr lang="en-CA" sz="1600" i="1">
+                                <a:latin typeface="Cambria Math" panose="02040503050406030204" pitchFamily="18" charset="0"/>
+                              </a:rPr>
+                              <m:t>𝐶</m:t>
+                            </m:r>
+                          </m:e>
+                        </m:acc>
+                      </m:num>
+                      <m:den>
+                        <m:r>
+                          <a:rPr lang="en-CA" sz="1600" b="0" i="1" smtClean="0">
+                            <a:latin typeface="Cambria Math" panose="02040503050406030204" pitchFamily="18" charset="0"/>
+                          </a:rPr>
+                          <m:t>𝜕</m:t>
+                        </m:r>
+                        <m:r>
+                          <a:rPr lang="en-CA" sz="1600" b="0" i="1" smtClean="0">
+                            <a:latin typeface="Cambria Math" panose="02040503050406030204" pitchFamily="18" charset="0"/>
+                          </a:rPr>
+                          <m:t>𝑡</m:t>
+                        </m:r>
+                      </m:den>
+                    </m:f>
+                    <m:r>
+                      <a:rPr lang="en-CA" sz="1600" b="0" i="1" smtClean="0">
+                        <a:latin typeface="Cambria Math" panose="02040503050406030204" pitchFamily="18" charset="0"/>
+                      </a:rPr>
+                      <m:t>=−</m:t>
+                    </m:r>
+                    <m:sSub>
+                      <m:sSubPr>
+                        <m:ctrlPr>
+                          <a:rPr lang="en-CA" sz="1600" b="0" i="1" smtClean="0">
+                            <a:latin typeface="Cambria Math" panose="02040503050406030204" pitchFamily="18" charset="0"/>
+                          </a:rPr>
+                        </m:ctrlPr>
+                      </m:sSubPr>
+                      <m:e>
+                        <m:r>
+                          <a:rPr lang="en-CA" sz="1600" b="0" i="1" smtClean="0">
+                            <a:latin typeface="Cambria Math" panose="02040503050406030204" pitchFamily="18" charset="0"/>
+                          </a:rPr>
+                          <m:t>𝐷</m:t>
+                        </m:r>
+                      </m:e>
+                      <m:sub>
+                        <m:r>
+                          <a:rPr lang="en-CA" sz="1600" b="0" i="1" smtClean="0">
+                            <a:latin typeface="Cambria Math" panose="02040503050406030204" pitchFamily="18" charset="0"/>
+                          </a:rPr>
+                          <m:t>𝑒𝑓𝑓</m:t>
+                        </m:r>
+                      </m:sub>
+                    </m:sSub>
+                    <m:sSup>
+                      <m:sSupPr>
+                        <m:ctrlPr>
+                          <a:rPr lang="en-CA" sz="1600" b="0" i="1" smtClean="0">
+                            <a:latin typeface="Cambria Math" panose="02040503050406030204" pitchFamily="18" charset="0"/>
+                          </a:rPr>
+                        </m:ctrlPr>
+                      </m:sSupPr>
+                      <m:e>
+                        <m:r>
+                          <a:rPr lang="en-CA" sz="1600" b="0" i="1" smtClean="0">
+                            <a:latin typeface="Cambria Math" panose="02040503050406030204" pitchFamily="18" charset="0"/>
+                          </a:rPr>
+                          <m:t>𝑟</m:t>
+                        </m:r>
+                      </m:e>
+                      <m:sup>
+                        <m:r>
+                          <a:rPr lang="en-CA" sz="1600" b="0" i="1" smtClean="0">
+                            <a:latin typeface="Cambria Math" panose="02040503050406030204" pitchFamily="18" charset="0"/>
+                          </a:rPr>
+                          <m:t>2</m:t>
+                        </m:r>
+                      </m:sup>
+                    </m:sSup>
+                    <m:r>
+                      <a:rPr lang="en-CA" sz="1600" b="0" i="1" smtClean="0">
+                        <a:latin typeface="Cambria Math" panose="02040503050406030204" pitchFamily="18" charset="0"/>
+                      </a:rPr>
+                      <m:t>𝑡</m:t>
+                    </m:r>
+                    <m:d>
+                      <m:dPr>
+                        <m:ctrlPr>
+                          <a:rPr lang="en-CA" sz="1600" b="0" i="1" smtClean="0">
+                            <a:latin typeface="Cambria Math" panose="02040503050406030204" pitchFamily="18" charset="0"/>
+                          </a:rPr>
+                        </m:ctrlPr>
+                      </m:dPr>
+                      <m:e>
+                        <m:r>
+                          <a:rPr lang="en-CA" sz="1600" b="0" i="1" smtClean="0">
+                            <a:latin typeface="Cambria Math" panose="02040503050406030204" pitchFamily="18" charset="0"/>
+                          </a:rPr>
+                          <m:t>𝑅</m:t>
+                        </m:r>
+                        <m:r>
+                          <a:rPr lang="en-CA" sz="1600" b="0" i="1" smtClean="0">
+                            <a:latin typeface="Cambria Math" panose="02040503050406030204" pitchFamily="18" charset="0"/>
+                          </a:rPr>
+                          <m:t>−</m:t>
+                        </m:r>
+                        <m:r>
+                          <a:rPr lang="en-CA" sz="1600" b="0" i="1" smtClean="0">
+                            <a:latin typeface="Cambria Math" panose="02040503050406030204" pitchFamily="18" charset="0"/>
+                          </a:rPr>
+                          <m:t>𝑟</m:t>
+                        </m:r>
+                      </m:e>
+                    </m:d>
+                    <m:func>
+                      <m:funcPr>
+                        <m:ctrlPr>
+                          <a:rPr lang="en-CA" sz="1600" b="0" i="1" smtClean="0">
+                            <a:latin typeface="Cambria Math" panose="02040503050406030204" pitchFamily="18" charset="0"/>
+                          </a:rPr>
+                        </m:ctrlPr>
+                      </m:funcPr>
+                      <m:fName>
+                        <m:r>
+                          <m:rPr>
+                            <m:sty m:val="p"/>
+                          </m:rPr>
+                          <a:rPr lang="en-CA" sz="1600" b="0" i="0" smtClean="0">
+                            <a:latin typeface="Cambria Math" panose="02040503050406030204" pitchFamily="18" charset="0"/>
+                          </a:rPr>
+                          <m:t>exp</m:t>
+                        </m:r>
+                      </m:fName>
+                      <m:e>
+                        <m:d>
+                          <m:dPr>
+                            <m:ctrlPr>
+                              <a:rPr lang="en-CA" sz="1600" b="0" i="1" smtClean="0">
+                                <a:latin typeface="Cambria Math" panose="02040503050406030204" pitchFamily="18" charset="0"/>
+                              </a:rPr>
+                            </m:ctrlPr>
+                          </m:dPr>
+                          <m:e>
+                            <m:r>
+                              <a:rPr lang="en-CA" sz="1600" b="0" i="1" smtClean="0">
+                                <a:latin typeface="Cambria Math" panose="02040503050406030204" pitchFamily="18" charset="0"/>
+                              </a:rPr>
+                              <m:t>−</m:t>
+                            </m:r>
+                            <m:sSub>
+                              <m:sSubPr>
+                                <m:ctrlPr>
+                                  <a:rPr lang="en-CA" sz="1600" b="0" i="1" smtClean="0">
+                                    <a:latin typeface="Cambria Math" panose="02040503050406030204" pitchFamily="18" charset="0"/>
+                                  </a:rPr>
+                                </m:ctrlPr>
+                              </m:sSubPr>
+                              <m:e>
+                                <m:r>
+                                  <a:rPr lang="en-CA" sz="1600" b="0" i="1" smtClean="0">
+                                    <a:latin typeface="Cambria Math" panose="02040503050406030204" pitchFamily="18" charset="0"/>
+                                  </a:rPr>
+                                  <m:t>𝐷</m:t>
+                                </m:r>
+                              </m:e>
+                              <m:sub>
+                                <m:r>
+                                  <a:rPr lang="en-CA" sz="1600" b="0" i="1" smtClean="0">
+                                    <a:latin typeface="Cambria Math" panose="02040503050406030204" pitchFamily="18" charset="0"/>
+                                  </a:rPr>
+                                  <m:t>𝑒𝑓𝑓</m:t>
+                                </m:r>
+                              </m:sub>
+                            </m:sSub>
+                            <m:r>
+                              <a:rPr lang="en-CA" sz="1600" b="0" i="1" smtClean="0">
+                                <a:latin typeface="Cambria Math" panose="02040503050406030204" pitchFamily="18" charset="0"/>
+                              </a:rPr>
+                              <m:t>.</m:t>
+                            </m:r>
+                            <m:r>
+                              <a:rPr lang="en-CA" sz="1600" b="0" i="1" smtClean="0">
+                                <a:latin typeface="Cambria Math" panose="02040503050406030204" pitchFamily="18" charset="0"/>
+                              </a:rPr>
+                              <m:t>𝑡</m:t>
+                            </m:r>
+                          </m:e>
+                        </m:d>
+                      </m:e>
+                    </m:func>
+                    <m:r>
+                      <a:rPr lang="en-CA" sz="1600" b="0" i="1" smtClean="0">
+                        <a:latin typeface="Cambria Math" panose="02040503050406030204" pitchFamily="18" charset="0"/>
+                      </a:rPr>
+                      <m:t>+</m:t>
+                    </m:r>
+                    <m:sSup>
+                      <m:sSupPr>
+                        <m:ctrlPr>
+                          <a:rPr lang="en-CA" sz="1600" i="1">
+                            <a:latin typeface="Cambria Math" panose="02040503050406030204" pitchFamily="18" charset="0"/>
+                          </a:rPr>
+                        </m:ctrlPr>
+                      </m:sSupPr>
+                      <m:e>
+                        <m:r>
+                          <a:rPr lang="en-CA" sz="1600" i="1">
+                            <a:latin typeface="Cambria Math" panose="02040503050406030204" pitchFamily="18" charset="0"/>
+                          </a:rPr>
+                          <m:t>𝑟</m:t>
+                        </m:r>
+                      </m:e>
+                      <m:sup>
+                        <m:r>
+                          <a:rPr lang="en-CA" sz="1600" i="1">
+                            <a:latin typeface="Cambria Math" panose="02040503050406030204" pitchFamily="18" charset="0"/>
+                          </a:rPr>
+                          <m:t>2</m:t>
+                        </m:r>
+                      </m:sup>
+                    </m:sSup>
+                    <m:d>
+                      <m:dPr>
+                        <m:ctrlPr>
+                          <a:rPr lang="en-CA" sz="1600" i="1">
+                            <a:latin typeface="Cambria Math" panose="02040503050406030204" pitchFamily="18" charset="0"/>
+                          </a:rPr>
+                        </m:ctrlPr>
+                      </m:dPr>
+                      <m:e>
+                        <m:r>
+                          <a:rPr lang="en-CA" sz="1600" i="1">
+                            <a:latin typeface="Cambria Math" panose="02040503050406030204" pitchFamily="18" charset="0"/>
+                          </a:rPr>
+                          <m:t>𝑅</m:t>
+                        </m:r>
+                        <m:r>
+                          <a:rPr lang="en-CA" sz="1600" i="1">
+                            <a:latin typeface="Cambria Math" panose="02040503050406030204" pitchFamily="18" charset="0"/>
+                          </a:rPr>
+                          <m:t>−</m:t>
+                        </m:r>
+                        <m:r>
+                          <a:rPr lang="en-CA" sz="1600" i="1">
+                            <a:latin typeface="Cambria Math" panose="02040503050406030204" pitchFamily="18" charset="0"/>
+                          </a:rPr>
+                          <m:t>𝑟</m:t>
+                        </m:r>
+                      </m:e>
+                    </m:d>
+                    <m:func>
+                      <m:funcPr>
+                        <m:ctrlPr>
+                          <a:rPr lang="en-CA" sz="1600" i="1">
+                            <a:latin typeface="Cambria Math" panose="02040503050406030204" pitchFamily="18" charset="0"/>
+                          </a:rPr>
+                        </m:ctrlPr>
+                      </m:funcPr>
+                      <m:fName>
+                        <m:r>
+                          <m:rPr>
+                            <m:sty m:val="p"/>
+                          </m:rPr>
+                          <a:rPr lang="en-CA" sz="1600">
+                            <a:latin typeface="Cambria Math" panose="02040503050406030204" pitchFamily="18" charset="0"/>
+                          </a:rPr>
+                          <m:t>exp</m:t>
+                        </m:r>
+                      </m:fName>
+                      <m:e>
+                        <m:d>
+                          <m:dPr>
+                            <m:ctrlPr>
+                              <a:rPr lang="en-CA" sz="1600" i="1">
+                                <a:latin typeface="Cambria Math" panose="02040503050406030204" pitchFamily="18" charset="0"/>
+                              </a:rPr>
+                            </m:ctrlPr>
+                          </m:dPr>
+                          <m:e>
+                            <m:r>
+                              <a:rPr lang="en-CA" sz="1600" i="1">
+                                <a:latin typeface="Cambria Math" panose="02040503050406030204" pitchFamily="18" charset="0"/>
+                              </a:rPr>
+                              <m:t>−</m:t>
+                            </m:r>
+                            <m:sSub>
+                              <m:sSubPr>
+                                <m:ctrlPr>
+                                  <a:rPr lang="en-CA" sz="1600" b="0" i="1" smtClean="0">
+                                    <a:latin typeface="Cambria Math" panose="02040503050406030204" pitchFamily="18" charset="0"/>
+                                  </a:rPr>
+                                </m:ctrlPr>
+                              </m:sSubPr>
+                              <m:e>
+                                <m:r>
+                                  <a:rPr lang="en-CA" sz="1600" i="1">
+                                    <a:latin typeface="Cambria Math" panose="02040503050406030204" pitchFamily="18" charset="0"/>
+                                  </a:rPr>
+                                  <m:t>𝐷</m:t>
+                                </m:r>
+                              </m:e>
+                              <m:sub>
+                                <m:r>
+                                  <a:rPr lang="en-CA" sz="1600" b="0" i="1" smtClean="0">
+                                    <a:latin typeface="Cambria Math" panose="02040503050406030204" pitchFamily="18" charset="0"/>
+                                  </a:rPr>
+                                  <m:t>𝑒𝑓𝑓</m:t>
+                                </m:r>
+                              </m:sub>
+                            </m:sSub>
+                            <m:r>
+                              <a:rPr lang="en-CA" sz="1600" b="0" i="1" smtClean="0">
+                                <a:latin typeface="Cambria Math" panose="02040503050406030204" pitchFamily="18" charset="0"/>
+                              </a:rPr>
+                              <m:t>.</m:t>
+                            </m:r>
+                            <m:r>
+                              <a:rPr lang="en-CA" sz="1600" i="1">
+                                <a:latin typeface="Cambria Math" panose="02040503050406030204" pitchFamily="18" charset="0"/>
+                              </a:rPr>
+                              <m:t>𝑡</m:t>
+                            </m:r>
+                          </m:e>
+                        </m:d>
+                      </m:e>
+                    </m:func>
+                  </m:oMath>
                 </a14:m>
                 <a:endParaRPr lang="en-CA" sz="1600" b="0" dirty="0"/>
               </a:p>
               <a:p>
-                <a:pPr marL="0" indent="0">
-                  <a:buNone/>
-                </a:pPr>
                 <a:endParaRPr lang="en-CA" sz="1600" b="0" dirty="0"/>
               </a:p>
               <a:p>
-                <a:pPr marL="0" indent="0">
-                  <a:buNone/>
-                </a:pPr>
+                <a:pPr/>
                 <a14:m>
-                  <m:oMathPara xmlns:m="http://schemas.openxmlformats.org/officeDocument/2006/math">
-                    <m:oMathParaPr>
-                      <m:jc m:val="left"/>
-                    </m:oMathParaPr>
-                    <m:oMath xmlns:m="http://schemas.openxmlformats.org/officeDocument/2006/math">
-                      <m:f>
-                        <m:fPr>
-                          <m:ctrlPr>
-                            <a:rPr lang="en-CA" sz="1600" b="0" i="1" smtClean="0">
-                              <a:latin typeface="Cambria Math" panose="02040503050406030204" pitchFamily="18" charset="0"/>
-                            </a:rPr>
-                          </m:ctrlPr>
-                        </m:fPr>
-                        <m:num>
-                          <m:r>
-                            <a:rPr lang="en-CA" sz="1600" b="0" i="1" smtClean="0">
-                              <a:latin typeface="Cambria Math" panose="02040503050406030204" pitchFamily="18" charset="0"/>
-                            </a:rPr>
-                            <m:t>𝜕</m:t>
-                          </m:r>
-                          <m:acc>
-                            <m:accPr>
-                              <m:chr m:val="̂"/>
-                              <m:ctrlPr>
-                                <a:rPr lang="en-CA" sz="1600" i="1">
-                                  <a:latin typeface="Cambria Math" panose="02040503050406030204" pitchFamily="18" charset="0"/>
-                                </a:rPr>
-                              </m:ctrlPr>
-                            </m:accPr>
-                            <m:e>
-                              <m:r>
-                                <a:rPr lang="en-CA" sz="1600" i="1">
-                                  <a:latin typeface="Cambria Math" panose="02040503050406030204" pitchFamily="18" charset="0"/>
-                                </a:rPr>
-                                <m:t>𝐶</m:t>
-                              </m:r>
-                            </m:e>
-                          </m:acc>
-                        </m:num>
-                        <m:den>
-                          <m:r>
-                            <a:rPr lang="en-CA" sz="1600" b="0" i="1" smtClean="0">
-                              <a:latin typeface="Cambria Math" panose="02040503050406030204" pitchFamily="18" charset="0"/>
-                            </a:rPr>
-                            <m:t>𝜕</m:t>
-                          </m:r>
-                          <m:r>
-                            <a:rPr lang="en-CA" sz="1600" b="0" i="1" smtClean="0">
-                              <a:latin typeface="Cambria Math" panose="02040503050406030204" pitchFamily="18" charset="0"/>
-                            </a:rPr>
-                            <m:t>𝑟</m:t>
-                          </m:r>
-                        </m:den>
-                      </m:f>
-                      <m:r>
-                        <a:rPr lang="en-CA" sz="1600" b="0" i="1" smtClean="0">
-                          <a:latin typeface="Cambria Math" panose="02040503050406030204" pitchFamily="18" charset="0"/>
-                        </a:rPr>
-                        <m:t>=</m:t>
-                      </m:r>
-                      <m:r>
-                        <a:rPr lang="en-CA" sz="1600" b="0" i="1" smtClean="0">
-                          <a:latin typeface="Cambria Math" panose="02040503050406030204" pitchFamily="18" charset="0"/>
-                        </a:rPr>
-                        <m:t>𝑡</m:t>
-                      </m:r>
-                      <m:d>
-                        <m:dPr>
-                          <m:ctrlPr>
-                            <a:rPr lang="en-CA" sz="1600" b="0" i="1" smtClean="0">
-                              <a:latin typeface="Cambria Math" panose="02040503050406030204" pitchFamily="18" charset="0"/>
-                            </a:rPr>
-                          </m:ctrlPr>
-                        </m:dPr>
-                        <m:e>
-                          <m:r>
-                            <a:rPr lang="en-CA" sz="1600" b="0" i="1" smtClean="0">
-                              <a:latin typeface="Cambria Math" panose="02040503050406030204" pitchFamily="18" charset="0"/>
-                            </a:rPr>
-                            <m:t>2</m:t>
-                          </m:r>
-                          <m:r>
-                            <a:rPr lang="en-CA" sz="1600" b="0" i="1" smtClean="0">
-                              <a:latin typeface="Cambria Math" panose="02040503050406030204" pitchFamily="18" charset="0"/>
-                            </a:rPr>
-                            <m:t>𝑟𝑅</m:t>
-                          </m:r>
-                          <m:r>
-                            <a:rPr lang="en-CA" sz="1600" b="0" i="1" smtClean="0">
-                              <a:latin typeface="Cambria Math" panose="02040503050406030204" pitchFamily="18" charset="0"/>
-                            </a:rPr>
-                            <m:t>−3</m:t>
-                          </m:r>
-                          <m:sSup>
-                            <m:sSupPr>
-                              <m:ctrlPr>
-                                <a:rPr lang="en-CA" sz="1600" b="0" i="1" smtClean="0">
-                                  <a:latin typeface="Cambria Math" panose="02040503050406030204" pitchFamily="18" charset="0"/>
-                                </a:rPr>
-                              </m:ctrlPr>
-                            </m:sSupPr>
-                            <m:e>
-                              <m:r>
-                                <a:rPr lang="en-CA" sz="1600" b="0" i="1" smtClean="0">
-                                  <a:latin typeface="Cambria Math" panose="02040503050406030204" pitchFamily="18" charset="0"/>
-                                </a:rPr>
-                                <m:t>𝑟</m:t>
-                              </m:r>
-                            </m:e>
-                            <m:sup>
-                              <m:r>
-                                <a:rPr lang="en-CA" sz="1600" b="0" i="1" smtClean="0">
-                                  <a:latin typeface="Cambria Math" panose="02040503050406030204" pitchFamily="18" charset="0"/>
-                                </a:rPr>
-                                <m:t>2</m:t>
-                              </m:r>
-                            </m:sup>
-                          </m:sSup>
-                        </m:e>
-                      </m:d>
-                      <m:func>
-                        <m:funcPr>
-                          <m:ctrlPr>
-                            <a:rPr lang="en-CA" sz="1600" b="0" i="1" smtClean="0">
-                              <a:latin typeface="Cambria Math" panose="02040503050406030204" pitchFamily="18" charset="0"/>
-                            </a:rPr>
-                          </m:ctrlPr>
-                        </m:funcPr>
-                        <m:fName>
-                          <m:r>
-                            <m:rPr>
-                              <m:sty m:val="p"/>
-                            </m:rPr>
-                            <a:rPr lang="en-CA" sz="1600" b="0" i="0" smtClean="0">
-                              <a:latin typeface="Cambria Math" panose="02040503050406030204" pitchFamily="18" charset="0"/>
-                            </a:rPr>
-                            <m:t>exp</m:t>
-                          </m:r>
-                        </m:fName>
-                        <m:e>
-                          <m:d>
-                            <m:dPr>
-                              <m:ctrlPr>
-                                <a:rPr lang="en-CA" sz="1600" b="0" i="1" smtClean="0">
-                                  <a:latin typeface="Cambria Math" panose="02040503050406030204" pitchFamily="18" charset="0"/>
-                                </a:rPr>
-                              </m:ctrlPr>
-                            </m:dPr>
-                            <m:e>
-                              <m:r>
-                                <a:rPr lang="en-CA" sz="1600" b="0" i="1" smtClean="0">
-                                  <a:latin typeface="Cambria Math" panose="02040503050406030204" pitchFamily="18" charset="0"/>
-                                </a:rPr>
-                                <m:t>−</m:t>
-                              </m:r>
-                              <m:sSub>
-                                <m:sSubPr>
-                                  <m:ctrlPr>
-                                    <a:rPr lang="en-CA" sz="1600" b="0" i="1" smtClean="0">
-                                      <a:latin typeface="Cambria Math" panose="02040503050406030204" pitchFamily="18" charset="0"/>
-                                    </a:rPr>
-                                  </m:ctrlPr>
-                                </m:sSubPr>
-                                <m:e>
-                                  <m:r>
-                                    <a:rPr lang="en-CA" sz="1600" b="0" i="1" smtClean="0">
-                                      <a:latin typeface="Cambria Math" panose="02040503050406030204" pitchFamily="18" charset="0"/>
-                                    </a:rPr>
-                                    <m:t>𝐷</m:t>
-                                  </m:r>
-                                </m:e>
-                                <m:sub>
-                                  <m:r>
-                                    <a:rPr lang="en-CA" sz="1600" b="0" i="1" smtClean="0">
-                                      <a:latin typeface="Cambria Math" panose="02040503050406030204" pitchFamily="18" charset="0"/>
-                                    </a:rPr>
-                                    <m:t>𝑒𝑓𝑓</m:t>
-                                  </m:r>
-                                </m:sub>
-                              </m:sSub>
-                              <m:r>
-                                <a:rPr lang="en-CA" sz="1600" b="0" i="1" smtClean="0">
-                                  <a:latin typeface="Cambria Math" panose="02040503050406030204" pitchFamily="18" charset="0"/>
-                                </a:rPr>
-                                <m:t>.</m:t>
-                              </m:r>
-                              <m:r>
-                                <a:rPr lang="en-CA" sz="1600" b="0" i="1" smtClean="0">
-                                  <a:latin typeface="Cambria Math" panose="02040503050406030204" pitchFamily="18" charset="0"/>
-                                </a:rPr>
-                                <m:t>𝑡</m:t>
-                              </m:r>
-                            </m:e>
-                          </m:d>
-                        </m:e>
-                      </m:func>
-                    </m:oMath>
-                  </m:oMathPara>
+                  <m:oMath xmlns:m="http://schemas.openxmlformats.org/officeDocument/2006/math">
+                    <m:f>
+                      <m:fPr>
+                        <m:ctrlPr>
+                          <a:rPr lang="en-CA" sz="1600" b="0" i="1" smtClean="0">
+                            <a:latin typeface="Cambria Math" panose="02040503050406030204" pitchFamily="18" charset="0"/>
+                          </a:rPr>
+                        </m:ctrlPr>
+                      </m:fPr>
+                      <m:num>
+                        <m:r>
+                          <a:rPr lang="en-CA" sz="1600" b="0" i="1" smtClean="0">
+                            <a:latin typeface="Cambria Math" panose="02040503050406030204" pitchFamily="18" charset="0"/>
+                          </a:rPr>
+                          <m:t>𝜕</m:t>
+                        </m:r>
+                        <m:acc>
+                          <m:accPr>
+                            <m:chr m:val="̂"/>
+                            <m:ctrlPr>
+                              <a:rPr lang="en-CA" sz="1600" i="1">
+                                <a:latin typeface="Cambria Math" panose="02040503050406030204" pitchFamily="18" charset="0"/>
+                              </a:rPr>
+                            </m:ctrlPr>
+                          </m:accPr>
+                          <m:e>
+                            <m:r>
+                              <a:rPr lang="en-CA" sz="1600" i="1">
+                                <a:latin typeface="Cambria Math" panose="02040503050406030204" pitchFamily="18" charset="0"/>
+                              </a:rPr>
+                              <m:t>𝐶</m:t>
+                            </m:r>
+                          </m:e>
+                        </m:acc>
+                      </m:num>
+                      <m:den>
+                        <m:r>
+                          <a:rPr lang="en-CA" sz="1600" b="0" i="1" smtClean="0">
+                            <a:latin typeface="Cambria Math" panose="02040503050406030204" pitchFamily="18" charset="0"/>
+                          </a:rPr>
+                          <m:t>𝜕</m:t>
+                        </m:r>
+                        <m:r>
+                          <a:rPr lang="en-CA" sz="1600" b="0" i="1" smtClean="0">
+                            <a:latin typeface="Cambria Math" panose="02040503050406030204" pitchFamily="18" charset="0"/>
+                          </a:rPr>
+                          <m:t>𝑟</m:t>
+                        </m:r>
+                      </m:den>
+                    </m:f>
+                    <m:r>
+                      <a:rPr lang="en-CA" sz="1600" b="0" i="1" smtClean="0">
+                        <a:latin typeface="Cambria Math" panose="02040503050406030204" pitchFamily="18" charset="0"/>
+                      </a:rPr>
+                      <m:t>=</m:t>
+                    </m:r>
+                    <m:r>
+                      <a:rPr lang="en-CA" sz="1600" b="0" i="1" smtClean="0">
+                        <a:latin typeface="Cambria Math" panose="02040503050406030204" pitchFamily="18" charset="0"/>
+                      </a:rPr>
+                      <m:t>𝑡</m:t>
+                    </m:r>
+                    <m:d>
+                      <m:dPr>
+                        <m:ctrlPr>
+                          <a:rPr lang="en-CA" sz="1600" b="0" i="1" smtClean="0">
+                            <a:latin typeface="Cambria Math" panose="02040503050406030204" pitchFamily="18" charset="0"/>
+                          </a:rPr>
+                        </m:ctrlPr>
+                      </m:dPr>
+                      <m:e>
+                        <m:r>
+                          <a:rPr lang="en-CA" sz="1600" b="0" i="1" smtClean="0">
+                            <a:latin typeface="Cambria Math" panose="02040503050406030204" pitchFamily="18" charset="0"/>
+                          </a:rPr>
+                          <m:t>2</m:t>
+                        </m:r>
+                        <m:r>
+                          <a:rPr lang="en-CA" sz="1600" b="0" i="1" smtClean="0">
+                            <a:latin typeface="Cambria Math" panose="02040503050406030204" pitchFamily="18" charset="0"/>
+                          </a:rPr>
+                          <m:t>𝑟𝑅</m:t>
+                        </m:r>
+                        <m:r>
+                          <a:rPr lang="en-CA" sz="1600" b="0" i="1" smtClean="0">
+                            <a:latin typeface="Cambria Math" panose="02040503050406030204" pitchFamily="18" charset="0"/>
+                          </a:rPr>
+                          <m:t>−3</m:t>
+                        </m:r>
+                        <m:sSup>
+                          <m:sSupPr>
+                            <m:ctrlPr>
+                              <a:rPr lang="en-CA" sz="1600" b="0" i="1" smtClean="0">
+                                <a:latin typeface="Cambria Math" panose="02040503050406030204" pitchFamily="18" charset="0"/>
+                              </a:rPr>
+                            </m:ctrlPr>
+                          </m:sSupPr>
+                          <m:e>
+                            <m:r>
+                              <a:rPr lang="en-CA" sz="1600" b="0" i="1" smtClean="0">
+                                <a:latin typeface="Cambria Math" panose="02040503050406030204" pitchFamily="18" charset="0"/>
+                              </a:rPr>
+                              <m:t>𝑟</m:t>
+                            </m:r>
+                          </m:e>
+                          <m:sup>
+                            <m:r>
+                              <a:rPr lang="en-CA" sz="1600" b="0" i="1" smtClean="0">
+                                <a:latin typeface="Cambria Math" panose="02040503050406030204" pitchFamily="18" charset="0"/>
+                              </a:rPr>
+                              <m:t>2</m:t>
+                            </m:r>
+                          </m:sup>
+                        </m:sSup>
+                      </m:e>
+                    </m:d>
+                    <m:func>
+                      <m:funcPr>
+                        <m:ctrlPr>
+                          <a:rPr lang="en-CA" sz="1600" b="0" i="1" smtClean="0">
+                            <a:latin typeface="Cambria Math" panose="02040503050406030204" pitchFamily="18" charset="0"/>
+                          </a:rPr>
+                        </m:ctrlPr>
+                      </m:funcPr>
+                      <m:fName>
+                        <m:r>
+                          <m:rPr>
+                            <m:sty m:val="p"/>
+                          </m:rPr>
+                          <a:rPr lang="en-CA" sz="1600" b="0" i="0" smtClean="0">
+                            <a:latin typeface="Cambria Math" panose="02040503050406030204" pitchFamily="18" charset="0"/>
+                          </a:rPr>
+                          <m:t>exp</m:t>
+                        </m:r>
+                      </m:fName>
+                      <m:e>
+                        <m:d>
+                          <m:dPr>
+                            <m:ctrlPr>
+                              <a:rPr lang="en-CA" sz="1600" b="0" i="1" smtClean="0">
+                                <a:latin typeface="Cambria Math" panose="02040503050406030204" pitchFamily="18" charset="0"/>
+                              </a:rPr>
+                            </m:ctrlPr>
+                          </m:dPr>
+                          <m:e>
+                            <m:r>
+                              <a:rPr lang="en-CA" sz="1600" b="0" i="1" smtClean="0">
+                                <a:latin typeface="Cambria Math" panose="02040503050406030204" pitchFamily="18" charset="0"/>
+                              </a:rPr>
+                              <m:t>−</m:t>
+                            </m:r>
+                            <m:sSub>
+                              <m:sSubPr>
+                                <m:ctrlPr>
+                                  <a:rPr lang="en-CA" sz="1600" b="0" i="1" smtClean="0">
+                                    <a:latin typeface="Cambria Math" panose="02040503050406030204" pitchFamily="18" charset="0"/>
+                                  </a:rPr>
+                                </m:ctrlPr>
+                              </m:sSubPr>
+                              <m:e>
+                                <m:r>
+                                  <a:rPr lang="en-CA" sz="1600" b="0" i="1" smtClean="0">
+                                    <a:latin typeface="Cambria Math" panose="02040503050406030204" pitchFamily="18" charset="0"/>
+                                  </a:rPr>
+                                  <m:t>𝐷</m:t>
+                                </m:r>
+                              </m:e>
+                              <m:sub>
+                                <m:r>
+                                  <a:rPr lang="en-CA" sz="1600" b="0" i="1" smtClean="0">
+                                    <a:latin typeface="Cambria Math" panose="02040503050406030204" pitchFamily="18" charset="0"/>
+                                  </a:rPr>
+                                  <m:t>𝑒𝑓𝑓</m:t>
+                                </m:r>
+                              </m:sub>
+                            </m:sSub>
+                            <m:r>
+                              <a:rPr lang="en-CA" sz="1600" b="0" i="1" smtClean="0">
+                                <a:latin typeface="Cambria Math" panose="02040503050406030204" pitchFamily="18" charset="0"/>
+                              </a:rPr>
+                              <m:t>.</m:t>
+                            </m:r>
+                            <m:r>
+                              <a:rPr lang="en-CA" sz="1600" b="0" i="1" smtClean="0">
+                                <a:latin typeface="Cambria Math" panose="02040503050406030204" pitchFamily="18" charset="0"/>
+                              </a:rPr>
+                              <m:t>𝑡</m:t>
+                            </m:r>
+                          </m:e>
+                        </m:d>
+                      </m:e>
+                    </m:func>
+                    <m:r>
+                      <a:rPr lang="en-CA" sz="1600" b="0" i="1" smtClean="0">
+                        <a:latin typeface="Cambria Math" panose="02040503050406030204" pitchFamily="18" charset="0"/>
+                      </a:rPr>
+                      <m:t>   →      </m:t>
+                    </m:r>
+                    <m:f>
+                      <m:fPr>
+                        <m:ctrlPr>
+                          <a:rPr lang="en-CA" sz="1600" b="0" i="1" smtClean="0">
+                            <a:latin typeface="Cambria Math" panose="02040503050406030204" pitchFamily="18" charset="0"/>
+                          </a:rPr>
+                        </m:ctrlPr>
+                      </m:fPr>
+                      <m:num>
+                        <m:r>
+                          <a:rPr lang="en-CA" sz="1600" b="0" i="1" smtClean="0">
+                            <a:latin typeface="Cambria Math" panose="02040503050406030204" pitchFamily="18" charset="0"/>
+                          </a:rPr>
+                          <m:t>1</m:t>
+                        </m:r>
+                      </m:num>
+                      <m:den>
+                        <m:r>
+                          <a:rPr lang="en-CA" sz="1600" b="0" i="1" smtClean="0">
+                            <a:latin typeface="Cambria Math" panose="02040503050406030204" pitchFamily="18" charset="0"/>
+                          </a:rPr>
+                          <m:t>𝑟</m:t>
+                        </m:r>
+                      </m:den>
+                    </m:f>
+                    <m:r>
+                      <a:rPr lang="en-CA" sz="1600" b="0" i="1" smtClean="0">
+                        <a:latin typeface="Cambria Math" panose="02040503050406030204" pitchFamily="18" charset="0"/>
+                      </a:rPr>
+                      <m:t>.</m:t>
+                    </m:r>
+                    <m:f>
+                      <m:fPr>
+                        <m:ctrlPr>
+                          <a:rPr lang="en-CA" sz="1600" i="1">
+                            <a:latin typeface="Cambria Math" panose="02040503050406030204" pitchFamily="18" charset="0"/>
+                          </a:rPr>
+                        </m:ctrlPr>
+                      </m:fPr>
+                      <m:num>
+                        <m:r>
+                          <a:rPr lang="en-CA" sz="1600" i="1">
+                            <a:latin typeface="Cambria Math" panose="02040503050406030204" pitchFamily="18" charset="0"/>
+                          </a:rPr>
+                          <m:t>𝜕</m:t>
+                        </m:r>
+                        <m:acc>
+                          <m:accPr>
+                            <m:chr m:val="̂"/>
+                            <m:ctrlPr>
+                              <a:rPr lang="en-CA" sz="1600" i="1">
+                                <a:latin typeface="Cambria Math" panose="02040503050406030204" pitchFamily="18" charset="0"/>
+                              </a:rPr>
+                            </m:ctrlPr>
+                          </m:accPr>
+                          <m:e>
+                            <m:r>
+                              <a:rPr lang="en-CA" sz="1600" i="1">
+                                <a:latin typeface="Cambria Math" panose="02040503050406030204" pitchFamily="18" charset="0"/>
+                              </a:rPr>
+                              <m:t>𝐶</m:t>
+                            </m:r>
+                          </m:e>
+                        </m:acc>
+                      </m:num>
+                      <m:den>
+                        <m:r>
+                          <a:rPr lang="en-CA" sz="1600" i="1">
+                            <a:latin typeface="Cambria Math" panose="02040503050406030204" pitchFamily="18" charset="0"/>
+                          </a:rPr>
+                          <m:t>𝜕</m:t>
+                        </m:r>
+                        <m:r>
+                          <a:rPr lang="en-CA" sz="1600" i="1">
+                            <a:latin typeface="Cambria Math" panose="02040503050406030204" pitchFamily="18" charset="0"/>
+                          </a:rPr>
+                          <m:t>𝑟</m:t>
+                        </m:r>
+                      </m:den>
+                    </m:f>
+                    <m:r>
+                      <a:rPr lang="en-CA" sz="1600" i="1">
+                        <a:latin typeface="Cambria Math" panose="02040503050406030204" pitchFamily="18" charset="0"/>
+                      </a:rPr>
+                      <m:t>=</m:t>
+                    </m:r>
+                    <m:f>
+                      <m:fPr>
+                        <m:ctrlPr>
+                          <a:rPr lang="en-CA" sz="1600" b="0" i="1" smtClean="0">
+                            <a:latin typeface="Cambria Math" panose="02040503050406030204" pitchFamily="18" charset="0"/>
+                          </a:rPr>
+                        </m:ctrlPr>
+                      </m:fPr>
+                      <m:num>
+                        <m:r>
+                          <a:rPr lang="en-CA" sz="1600" b="0" i="1" smtClean="0">
+                            <a:latin typeface="Cambria Math" panose="02040503050406030204" pitchFamily="18" charset="0"/>
+                          </a:rPr>
+                          <m:t>1</m:t>
+                        </m:r>
+                      </m:num>
+                      <m:den>
+                        <m:r>
+                          <a:rPr lang="en-CA" sz="1600" b="0" i="1" smtClean="0">
+                            <a:latin typeface="Cambria Math" panose="02040503050406030204" pitchFamily="18" charset="0"/>
+                          </a:rPr>
+                          <m:t>𝑟</m:t>
+                        </m:r>
+                      </m:den>
+                    </m:f>
+                    <m:r>
+                      <a:rPr lang="en-CA" sz="1600" i="1">
+                        <a:latin typeface="Cambria Math" panose="02040503050406030204" pitchFamily="18" charset="0"/>
+                      </a:rPr>
+                      <m:t>𝑡</m:t>
+                    </m:r>
+                    <m:d>
+                      <m:dPr>
+                        <m:ctrlPr>
+                          <a:rPr lang="en-CA" sz="1600" i="1">
+                            <a:latin typeface="Cambria Math" panose="02040503050406030204" pitchFamily="18" charset="0"/>
+                          </a:rPr>
+                        </m:ctrlPr>
+                      </m:dPr>
+                      <m:e>
+                        <m:r>
+                          <a:rPr lang="en-CA" sz="1600" i="1">
+                            <a:latin typeface="Cambria Math" panose="02040503050406030204" pitchFamily="18" charset="0"/>
+                          </a:rPr>
+                          <m:t>2</m:t>
+                        </m:r>
+                        <m:r>
+                          <a:rPr lang="en-CA" sz="1600" i="1">
+                            <a:latin typeface="Cambria Math" panose="02040503050406030204" pitchFamily="18" charset="0"/>
+                          </a:rPr>
+                          <m:t>𝑟𝑅</m:t>
+                        </m:r>
+                        <m:r>
+                          <a:rPr lang="en-CA" sz="1600" i="1">
+                            <a:latin typeface="Cambria Math" panose="02040503050406030204" pitchFamily="18" charset="0"/>
+                          </a:rPr>
+                          <m:t>−3</m:t>
+                        </m:r>
+                        <m:sSup>
+                          <m:sSupPr>
+                            <m:ctrlPr>
+                              <a:rPr lang="en-CA" sz="1600" i="1">
+                                <a:latin typeface="Cambria Math" panose="02040503050406030204" pitchFamily="18" charset="0"/>
+                              </a:rPr>
+                            </m:ctrlPr>
+                          </m:sSupPr>
+                          <m:e>
+                            <m:r>
+                              <a:rPr lang="en-CA" sz="1600" i="1">
+                                <a:latin typeface="Cambria Math" panose="02040503050406030204" pitchFamily="18" charset="0"/>
+                              </a:rPr>
+                              <m:t>𝑟</m:t>
+                            </m:r>
+                          </m:e>
+                          <m:sup>
+                            <m:r>
+                              <a:rPr lang="en-CA" sz="1600" i="1">
+                                <a:latin typeface="Cambria Math" panose="02040503050406030204" pitchFamily="18" charset="0"/>
+                              </a:rPr>
+                              <m:t>2</m:t>
+                            </m:r>
+                          </m:sup>
+                        </m:sSup>
+                      </m:e>
+                    </m:d>
+                    <m:func>
+                      <m:funcPr>
+                        <m:ctrlPr>
+                          <a:rPr lang="en-CA" sz="1600" i="1">
+                            <a:latin typeface="Cambria Math" panose="02040503050406030204" pitchFamily="18" charset="0"/>
+                          </a:rPr>
+                        </m:ctrlPr>
+                      </m:funcPr>
+                      <m:fName>
+                        <m:r>
+                          <m:rPr>
+                            <m:sty m:val="p"/>
+                          </m:rPr>
+                          <a:rPr lang="en-CA" sz="1600">
+                            <a:latin typeface="Cambria Math" panose="02040503050406030204" pitchFamily="18" charset="0"/>
+                          </a:rPr>
+                          <m:t>exp</m:t>
+                        </m:r>
+                      </m:fName>
+                      <m:e>
+                        <m:d>
+                          <m:dPr>
+                            <m:ctrlPr>
+                              <a:rPr lang="en-CA" sz="1600" i="1">
+                                <a:latin typeface="Cambria Math" panose="02040503050406030204" pitchFamily="18" charset="0"/>
+                              </a:rPr>
+                            </m:ctrlPr>
+                          </m:dPr>
+                          <m:e>
+                            <m:r>
+                              <a:rPr lang="en-CA" sz="1600" i="1">
+                                <a:latin typeface="Cambria Math" panose="02040503050406030204" pitchFamily="18" charset="0"/>
+                              </a:rPr>
+                              <m:t>−</m:t>
+                            </m:r>
+                            <m:sSub>
+                              <m:sSubPr>
+                                <m:ctrlPr>
+                                  <a:rPr lang="en-CA" sz="1600" i="1">
+                                    <a:latin typeface="Cambria Math" panose="02040503050406030204" pitchFamily="18" charset="0"/>
+                                  </a:rPr>
+                                </m:ctrlPr>
+                              </m:sSubPr>
+                              <m:e>
+                                <m:r>
+                                  <a:rPr lang="en-CA" sz="1600" i="1">
+                                    <a:latin typeface="Cambria Math" panose="02040503050406030204" pitchFamily="18" charset="0"/>
+                                  </a:rPr>
+                                  <m:t>𝐷</m:t>
+                                </m:r>
+                              </m:e>
+                              <m:sub>
+                                <m:r>
+                                  <a:rPr lang="en-CA" sz="1600" i="1">
+                                    <a:latin typeface="Cambria Math" panose="02040503050406030204" pitchFamily="18" charset="0"/>
+                                  </a:rPr>
+                                  <m:t>𝑒𝑓𝑓</m:t>
+                                </m:r>
+                              </m:sub>
+                            </m:sSub>
+                            <m:r>
+                              <a:rPr lang="en-CA" sz="1600" i="1">
+                                <a:latin typeface="Cambria Math" panose="02040503050406030204" pitchFamily="18" charset="0"/>
+                              </a:rPr>
+                              <m:t>.</m:t>
+                            </m:r>
+                            <m:r>
+                              <a:rPr lang="en-CA" sz="1600" i="1">
+                                <a:latin typeface="Cambria Math" panose="02040503050406030204" pitchFamily="18" charset="0"/>
+                              </a:rPr>
+                              <m:t>𝑡</m:t>
+                            </m:r>
+                          </m:e>
+                        </m:d>
+                        <m:r>
+                          <a:rPr lang="en-CA" sz="1600" b="0" i="1" smtClean="0">
+                            <a:latin typeface="Cambria Math" panose="02040503050406030204" pitchFamily="18" charset="0"/>
+                          </a:rPr>
+                          <m:t>=</m:t>
+                        </m:r>
+                        <m:r>
+                          <a:rPr lang="en-CA" sz="1600" i="1">
+                            <a:latin typeface="Cambria Math" panose="02040503050406030204" pitchFamily="18" charset="0"/>
+                          </a:rPr>
+                          <m:t>𝑡</m:t>
+                        </m:r>
+                        <m:d>
+                          <m:dPr>
+                            <m:ctrlPr>
+                              <a:rPr lang="en-CA" sz="1600" i="1">
+                                <a:latin typeface="Cambria Math" panose="02040503050406030204" pitchFamily="18" charset="0"/>
+                              </a:rPr>
+                            </m:ctrlPr>
+                          </m:dPr>
+                          <m:e>
+                            <m:r>
+                              <a:rPr lang="en-CA" sz="1600" i="1">
+                                <a:latin typeface="Cambria Math" panose="02040503050406030204" pitchFamily="18" charset="0"/>
+                              </a:rPr>
+                              <m:t>2</m:t>
+                            </m:r>
+                            <m:r>
+                              <a:rPr lang="en-CA" sz="1600" i="1">
+                                <a:latin typeface="Cambria Math" panose="02040503050406030204" pitchFamily="18" charset="0"/>
+                              </a:rPr>
+                              <m:t>𝑅</m:t>
+                            </m:r>
+                            <m:r>
+                              <a:rPr lang="en-CA" sz="1600" i="1">
+                                <a:latin typeface="Cambria Math" panose="02040503050406030204" pitchFamily="18" charset="0"/>
+                              </a:rPr>
+                              <m:t>−3</m:t>
+                            </m:r>
+                            <m:r>
+                              <a:rPr lang="en-CA" sz="1600" b="0" i="1" smtClean="0">
+                                <a:latin typeface="Cambria Math" panose="02040503050406030204" pitchFamily="18" charset="0"/>
+                              </a:rPr>
+                              <m:t>𝑟</m:t>
+                            </m:r>
+                          </m:e>
+                        </m:d>
+                        <m:func>
+                          <m:funcPr>
+                            <m:ctrlPr>
+                              <a:rPr lang="en-CA" sz="1600" i="1">
+                                <a:latin typeface="Cambria Math" panose="02040503050406030204" pitchFamily="18" charset="0"/>
+                              </a:rPr>
+                            </m:ctrlPr>
+                          </m:funcPr>
+                          <m:fName>
+                            <m:r>
+                              <m:rPr>
+                                <m:sty m:val="p"/>
+                              </m:rPr>
+                              <a:rPr lang="en-CA" sz="1600">
+                                <a:latin typeface="Cambria Math" panose="02040503050406030204" pitchFamily="18" charset="0"/>
+                              </a:rPr>
+                              <m:t>exp</m:t>
+                            </m:r>
+                          </m:fName>
+                          <m:e>
+                            <m:d>
+                              <m:dPr>
+                                <m:ctrlPr>
+                                  <a:rPr lang="en-CA" sz="1600" i="1">
+                                    <a:latin typeface="Cambria Math" panose="02040503050406030204" pitchFamily="18" charset="0"/>
+                                  </a:rPr>
+                                </m:ctrlPr>
+                              </m:dPr>
+                              <m:e>
+                                <m:r>
+                                  <a:rPr lang="en-CA" sz="1600" i="1">
+                                    <a:latin typeface="Cambria Math" panose="02040503050406030204" pitchFamily="18" charset="0"/>
+                                  </a:rPr>
+                                  <m:t>−</m:t>
+                                </m:r>
+                                <m:sSub>
+                                  <m:sSubPr>
+                                    <m:ctrlPr>
+                                      <a:rPr lang="en-CA" sz="1600" i="1">
+                                        <a:latin typeface="Cambria Math" panose="02040503050406030204" pitchFamily="18" charset="0"/>
+                                      </a:rPr>
+                                    </m:ctrlPr>
+                                  </m:sSubPr>
+                                  <m:e>
+                                    <m:r>
+                                      <a:rPr lang="en-CA" sz="1600" i="1">
+                                        <a:latin typeface="Cambria Math" panose="02040503050406030204" pitchFamily="18" charset="0"/>
+                                      </a:rPr>
+                                      <m:t>𝐷</m:t>
+                                    </m:r>
+                                  </m:e>
+                                  <m:sub>
+                                    <m:r>
+                                      <a:rPr lang="en-CA" sz="1600" i="1">
+                                        <a:latin typeface="Cambria Math" panose="02040503050406030204" pitchFamily="18" charset="0"/>
+                                      </a:rPr>
+                                      <m:t>𝑒𝑓𝑓</m:t>
+                                    </m:r>
+                                  </m:sub>
+                                </m:sSub>
+                                <m:r>
+                                  <a:rPr lang="en-CA" sz="1600" i="1">
+                                    <a:latin typeface="Cambria Math" panose="02040503050406030204" pitchFamily="18" charset="0"/>
+                                  </a:rPr>
+                                  <m:t>.</m:t>
+                                </m:r>
+                                <m:r>
+                                  <a:rPr lang="en-CA" sz="1600" i="1">
+                                    <a:latin typeface="Cambria Math" panose="02040503050406030204" pitchFamily="18" charset="0"/>
+                                  </a:rPr>
+                                  <m:t>𝑡</m:t>
+                                </m:r>
+                              </m:e>
+                            </m:d>
+                          </m:e>
+                        </m:func>
+                      </m:e>
+                    </m:func>
+                  </m:oMath>
                 </a14:m>
                 <a:endParaRPr lang="en-CA" sz="1600" b="0" dirty="0"/>
               </a:p>
               <a:p>
-                <a:pPr marL="0" indent="0">
-                  <a:buNone/>
-                </a:pPr>
                 <a:endParaRPr lang="en-CA" sz="1600" dirty="0"/>
               </a:p>
               <a:p>
-                <a:pPr marL="0" indent="0">
-                  <a:buNone/>
-                </a:pPr>
+                <a:pPr/>
                 <a14:m>
-                  <m:oMathPara xmlns:m="http://schemas.openxmlformats.org/officeDocument/2006/math">
-                    <m:oMathParaPr>
-                      <m:jc m:val="left"/>
-                    </m:oMathParaPr>
-                    <m:oMath xmlns:m="http://schemas.openxmlformats.org/officeDocument/2006/math">
-                      <m:f>
-                        <m:fPr>
-                          <m:ctrlPr>
-                            <a:rPr lang="en-CA" sz="1600" b="0" i="1" smtClean="0">
-                              <a:latin typeface="Cambria Math" panose="02040503050406030204" pitchFamily="18" charset="0"/>
-                            </a:rPr>
-                          </m:ctrlPr>
-                        </m:fPr>
-                        <m:num>
-                          <m:sSup>
-                            <m:sSupPr>
-                              <m:ctrlPr>
-                                <a:rPr lang="en-CA" sz="1600" b="0" i="1" smtClean="0">
-                                  <a:latin typeface="Cambria Math" panose="02040503050406030204" pitchFamily="18" charset="0"/>
-                                </a:rPr>
-                              </m:ctrlPr>
-                            </m:sSupPr>
-                            <m:e>
-                              <m:r>
-                                <a:rPr lang="en-CA" sz="1600" b="0" i="1" smtClean="0">
-                                  <a:latin typeface="Cambria Math" panose="02040503050406030204" pitchFamily="18" charset="0"/>
-                                </a:rPr>
-                                <m:t>𝜕</m:t>
-                              </m:r>
-                            </m:e>
-                            <m:sup>
-                              <m:r>
-                                <a:rPr lang="en-CA" sz="1600" b="0" i="1" smtClean="0">
-                                  <a:latin typeface="Cambria Math" panose="02040503050406030204" pitchFamily="18" charset="0"/>
-                                </a:rPr>
-                                <m:t>2</m:t>
-                              </m:r>
-                            </m:sup>
-                          </m:sSup>
-                          <m:acc>
-                            <m:accPr>
-                              <m:chr m:val="̂"/>
-                              <m:ctrlPr>
-                                <a:rPr lang="en-CA" sz="1600" i="1">
-                                  <a:latin typeface="Cambria Math" panose="02040503050406030204" pitchFamily="18" charset="0"/>
-                                </a:rPr>
-                              </m:ctrlPr>
-                            </m:accPr>
-                            <m:e>
-                              <m:r>
-                                <a:rPr lang="en-CA" sz="1600" i="1">
-                                  <a:latin typeface="Cambria Math" panose="02040503050406030204" pitchFamily="18" charset="0"/>
-                                </a:rPr>
-                                <m:t>𝐶</m:t>
-                              </m:r>
-                            </m:e>
-                          </m:acc>
-                        </m:num>
-                        <m:den>
-                          <m:r>
-                            <a:rPr lang="en-CA" sz="1600" b="0" i="1" smtClean="0">
-                              <a:latin typeface="Cambria Math" panose="02040503050406030204" pitchFamily="18" charset="0"/>
-                            </a:rPr>
-                            <m:t>𝜕</m:t>
-                          </m:r>
-                          <m:sSup>
-                            <m:sSupPr>
-                              <m:ctrlPr>
-                                <a:rPr lang="en-CA" sz="1600" b="0" i="1" smtClean="0">
-                                  <a:latin typeface="Cambria Math" panose="02040503050406030204" pitchFamily="18" charset="0"/>
-                                </a:rPr>
-                              </m:ctrlPr>
-                            </m:sSupPr>
-                            <m:e>
-                              <m:r>
-                                <a:rPr lang="en-CA" sz="1600" b="0" i="1" smtClean="0">
-                                  <a:latin typeface="Cambria Math" panose="02040503050406030204" pitchFamily="18" charset="0"/>
-                                </a:rPr>
-                                <m:t>𝑟</m:t>
-                              </m:r>
-                            </m:e>
-                            <m:sup>
-                              <m:r>
-                                <a:rPr lang="en-CA" sz="1600" b="0" i="1" smtClean="0">
-                                  <a:latin typeface="Cambria Math" panose="02040503050406030204" pitchFamily="18" charset="0"/>
-                                </a:rPr>
-                                <m:t>2</m:t>
-                              </m:r>
-                            </m:sup>
-                          </m:sSup>
-                        </m:den>
-                      </m:f>
-                      <m:r>
-                        <a:rPr lang="en-CA" sz="1600" b="0" i="1" smtClean="0">
-                          <a:latin typeface="Cambria Math" panose="02040503050406030204" pitchFamily="18" charset="0"/>
-                        </a:rPr>
-                        <m:t>=</m:t>
-                      </m:r>
-                      <m:r>
-                        <a:rPr lang="en-CA" sz="1600" b="0" i="1" smtClean="0">
-                          <a:latin typeface="Cambria Math" panose="02040503050406030204" pitchFamily="18" charset="0"/>
-                        </a:rPr>
-                        <m:t>𝑡</m:t>
-                      </m:r>
-                      <m:d>
-                        <m:dPr>
-                          <m:ctrlPr>
-                            <a:rPr lang="en-CA" sz="1600" b="0" i="1" smtClean="0">
-                              <a:latin typeface="Cambria Math" panose="02040503050406030204" pitchFamily="18" charset="0"/>
-                            </a:rPr>
-                          </m:ctrlPr>
-                        </m:dPr>
-                        <m:e>
-                          <m:r>
-                            <a:rPr lang="en-CA" sz="1600" b="0" i="1" smtClean="0">
-                              <a:latin typeface="Cambria Math" panose="02040503050406030204" pitchFamily="18" charset="0"/>
-                            </a:rPr>
-                            <m:t>2</m:t>
-                          </m:r>
-                          <m:r>
-                            <a:rPr lang="en-CA" sz="1600" b="0" i="1" smtClean="0">
-                              <a:latin typeface="Cambria Math" panose="02040503050406030204" pitchFamily="18" charset="0"/>
-                            </a:rPr>
-                            <m:t>𝑅</m:t>
-                          </m:r>
-                          <m:r>
-                            <a:rPr lang="en-CA" sz="1600" b="0" i="1" smtClean="0">
-                              <a:latin typeface="Cambria Math" panose="02040503050406030204" pitchFamily="18" charset="0"/>
-                            </a:rPr>
-                            <m:t>−6</m:t>
-                          </m:r>
-                          <m:r>
-                            <a:rPr lang="en-CA" sz="1600" b="0" i="1" smtClean="0">
-                              <a:latin typeface="Cambria Math" panose="02040503050406030204" pitchFamily="18" charset="0"/>
-                            </a:rPr>
-                            <m:t>𝑟</m:t>
-                          </m:r>
-                        </m:e>
-                      </m:d>
-                      <m:func>
-                        <m:funcPr>
-                          <m:ctrlPr>
-                            <a:rPr lang="en-CA" sz="1600" b="0" i="1" smtClean="0">
-                              <a:latin typeface="Cambria Math" panose="02040503050406030204" pitchFamily="18" charset="0"/>
-                            </a:rPr>
-                          </m:ctrlPr>
-                        </m:funcPr>
-                        <m:fName>
-                          <m:r>
-                            <m:rPr>
-                              <m:sty m:val="p"/>
-                            </m:rPr>
-                            <a:rPr lang="en-CA" sz="1600" b="0" i="0" smtClean="0">
-                              <a:latin typeface="Cambria Math" panose="02040503050406030204" pitchFamily="18" charset="0"/>
-                            </a:rPr>
-                            <m:t>exp</m:t>
-                          </m:r>
-                        </m:fName>
-                        <m:e>
-                          <m:d>
-                            <m:dPr>
-                              <m:ctrlPr>
-                                <a:rPr lang="en-CA" sz="1600" b="0" i="1" smtClean="0">
-                                  <a:latin typeface="Cambria Math" panose="02040503050406030204" pitchFamily="18" charset="0"/>
-                                </a:rPr>
-                              </m:ctrlPr>
-                            </m:dPr>
-                            <m:e>
-                              <m:r>
-                                <a:rPr lang="en-CA" sz="1600" b="0" i="1" smtClean="0">
-                                  <a:latin typeface="Cambria Math" panose="02040503050406030204" pitchFamily="18" charset="0"/>
-                                </a:rPr>
-                                <m:t>−</m:t>
-                              </m:r>
-                              <m:sSub>
-                                <m:sSubPr>
-                                  <m:ctrlPr>
-                                    <a:rPr lang="en-CA" sz="1600" b="0" i="1" smtClean="0">
-                                      <a:latin typeface="Cambria Math" panose="02040503050406030204" pitchFamily="18" charset="0"/>
-                                    </a:rPr>
-                                  </m:ctrlPr>
-                                </m:sSubPr>
-                                <m:e>
-                                  <m:r>
-                                    <a:rPr lang="en-CA" sz="1600" b="0" i="1" smtClean="0">
-                                      <a:latin typeface="Cambria Math" panose="02040503050406030204" pitchFamily="18" charset="0"/>
-                                    </a:rPr>
-                                    <m:t>𝐷</m:t>
-                                  </m:r>
-                                </m:e>
-                                <m:sub>
-                                  <m:r>
-                                    <a:rPr lang="en-CA" sz="1600" b="0" i="1" smtClean="0">
-                                      <a:latin typeface="Cambria Math" panose="02040503050406030204" pitchFamily="18" charset="0"/>
-                                    </a:rPr>
-                                    <m:t>𝑒𝑓𝑓</m:t>
-                                  </m:r>
-                                </m:sub>
-                              </m:sSub>
-                              <m:r>
-                                <a:rPr lang="en-CA" sz="1600" b="0" i="1" smtClean="0">
-                                  <a:latin typeface="Cambria Math" panose="02040503050406030204" pitchFamily="18" charset="0"/>
-                                </a:rPr>
-                                <m:t>.</m:t>
-                              </m:r>
-                              <m:r>
-                                <a:rPr lang="en-CA" sz="1600" b="0" i="1" smtClean="0">
-                                  <a:latin typeface="Cambria Math" panose="02040503050406030204" pitchFamily="18" charset="0"/>
-                                </a:rPr>
-                                <m:t>𝑡</m:t>
-                              </m:r>
-                            </m:e>
-                          </m:d>
-                        </m:e>
-                      </m:func>
-                    </m:oMath>
-                  </m:oMathPara>
+                  <m:oMath xmlns:m="http://schemas.openxmlformats.org/officeDocument/2006/math">
+                    <m:f>
+                      <m:fPr>
+                        <m:ctrlPr>
+                          <a:rPr lang="en-CA" sz="1600" b="0" i="1" smtClean="0">
+                            <a:latin typeface="Cambria Math" panose="02040503050406030204" pitchFamily="18" charset="0"/>
+                          </a:rPr>
+                        </m:ctrlPr>
+                      </m:fPr>
+                      <m:num>
+                        <m:sSup>
+                          <m:sSupPr>
+                            <m:ctrlPr>
+                              <a:rPr lang="en-CA" sz="1600" b="0" i="1" smtClean="0">
+                                <a:latin typeface="Cambria Math" panose="02040503050406030204" pitchFamily="18" charset="0"/>
+                              </a:rPr>
+                            </m:ctrlPr>
+                          </m:sSupPr>
+                          <m:e>
+                            <m:r>
+                              <a:rPr lang="en-CA" sz="1600" b="0" i="1" smtClean="0">
+                                <a:latin typeface="Cambria Math" panose="02040503050406030204" pitchFamily="18" charset="0"/>
+                              </a:rPr>
+                              <m:t>𝜕</m:t>
+                            </m:r>
+                          </m:e>
+                          <m:sup>
+                            <m:r>
+                              <a:rPr lang="en-CA" sz="1600" b="0" i="1" smtClean="0">
+                                <a:latin typeface="Cambria Math" panose="02040503050406030204" pitchFamily="18" charset="0"/>
+                              </a:rPr>
+                              <m:t>2</m:t>
+                            </m:r>
+                          </m:sup>
+                        </m:sSup>
+                        <m:acc>
+                          <m:accPr>
+                            <m:chr m:val="̂"/>
+                            <m:ctrlPr>
+                              <a:rPr lang="en-CA" sz="1600" i="1">
+                                <a:latin typeface="Cambria Math" panose="02040503050406030204" pitchFamily="18" charset="0"/>
+                              </a:rPr>
+                            </m:ctrlPr>
+                          </m:accPr>
+                          <m:e>
+                            <m:r>
+                              <a:rPr lang="en-CA" sz="1600" i="1">
+                                <a:latin typeface="Cambria Math" panose="02040503050406030204" pitchFamily="18" charset="0"/>
+                              </a:rPr>
+                              <m:t>𝐶</m:t>
+                            </m:r>
+                          </m:e>
+                        </m:acc>
+                      </m:num>
+                      <m:den>
+                        <m:r>
+                          <a:rPr lang="en-CA" sz="1600" b="0" i="1" smtClean="0">
+                            <a:latin typeface="Cambria Math" panose="02040503050406030204" pitchFamily="18" charset="0"/>
+                          </a:rPr>
+                          <m:t>𝜕</m:t>
+                        </m:r>
+                        <m:sSup>
+                          <m:sSupPr>
+                            <m:ctrlPr>
+                              <a:rPr lang="en-CA" sz="1600" b="0" i="1" smtClean="0">
+                                <a:latin typeface="Cambria Math" panose="02040503050406030204" pitchFamily="18" charset="0"/>
+                              </a:rPr>
+                            </m:ctrlPr>
+                          </m:sSupPr>
+                          <m:e>
+                            <m:r>
+                              <a:rPr lang="en-CA" sz="1600" b="0" i="1" smtClean="0">
+                                <a:latin typeface="Cambria Math" panose="02040503050406030204" pitchFamily="18" charset="0"/>
+                              </a:rPr>
+                              <m:t>𝑟</m:t>
+                            </m:r>
+                          </m:e>
+                          <m:sup>
+                            <m:r>
+                              <a:rPr lang="en-CA" sz="1600" b="0" i="1" smtClean="0">
+                                <a:latin typeface="Cambria Math" panose="02040503050406030204" pitchFamily="18" charset="0"/>
+                              </a:rPr>
+                              <m:t>2</m:t>
+                            </m:r>
+                          </m:sup>
+                        </m:sSup>
+                      </m:den>
+                    </m:f>
+                    <m:r>
+                      <a:rPr lang="en-CA" sz="1600" b="0" i="1" smtClean="0">
+                        <a:latin typeface="Cambria Math" panose="02040503050406030204" pitchFamily="18" charset="0"/>
+                      </a:rPr>
+                      <m:t>=</m:t>
+                    </m:r>
+                    <m:r>
+                      <a:rPr lang="en-CA" sz="1600" b="0" i="1" smtClean="0">
+                        <a:latin typeface="Cambria Math" panose="02040503050406030204" pitchFamily="18" charset="0"/>
+                      </a:rPr>
+                      <m:t>𝑡</m:t>
+                    </m:r>
+                    <m:d>
+                      <m:dPr>
+                        <m:ctrlPr>
+                          <a:rPr lang="en-CA" sz="1600" b="0" i="1" smtClean="0">
+                            <a:latin typeface="Cambria Math" panose="02040503050406030204" pitchFamily="18" charset="0"/>
+                          </a:rPr>
+                        </m:ctrlPr>
+                      </m:dPr>
+                      <m:e>
+                        <m:r>
+                          <a:rPr lang="en-CA" sz="1600" b="0" i="1" smtClean="0">
+                            <a:latin typeface="Cambria Math" panose="02040503050406030204" pitchFamily="18" charset="0"/>
+                          </a:rPr>
+                          <m:t>2</m:t>
+                        </m:r>
+                        <m:r>
+                          <a:rPr lang="en-CA" sz="1600" b="0" i="1" smtClean="0">
+                            <a:latin typeface="Cambria Math" panose="02040503050406030204" pitchFamily="18" charset="0"/>
+                          </a:rPr>
+                          <m:t>𝑅</m:t>
+                        </m:r>
+                        <m:r>
+                          <a:rPr lang="en-CA" sz="1600" b="0" i="1" smtClean="0">
+                            <a:latin typeface="Cambria Math" panose="02040503050406030204" pitchFamily="18" charset="0"/>
+                          </a:rPr>
+                          <m:t>−6</m:t>
+                        </m:r>
+                        <m:r>
+                          <a:rPr lang="en-CA" sz="1600" b="0" i="1" smtClean="0">
+                            <a:latin typeface="Cambria Math" panose="02040503050406030204" pitchFamily="18" charset="0"/>
+                          </a:rPr>
+                          <m:t>𝑟</m:t>
+                        </m:r>
+                      </m:e>
+                    </m:d>
+                    <m:func>
+                      <m:funcPr>
+                        <m:ctrlPr>
+                          <a:rPr lang="en-CA" sz="1600" b="0" i="1" smtClean="0">
+                            <a:latin typeface="Cambria Math" panose="02040503050406030204" pitchFamily="18" charset="0"/>
+                          </a:rPr>
+                        </m:ctrlPr>
+                      </m:funcPr>
+                      <m:fName>
+                        <m:r>
+                          <m:rPr>
+                            <m:sty m:val="p"/>
+                          </m:rPr>
+                          <a:rPr lang="en-CA" sz="1600" b="0" i="0" smtClean="0">
+                            <a:latin typeface="Cambria Math" panose="02040503050406030204" pitchFamily="18" charset="0"/>
+                          </a:rPr>
+                          <m:t>exp</m:t>
+                        </m:r>
+                      </m:fName>
+                      <m:e>
+                        <m:d>
+                          <m:dPr>
+                            <m:ctrlPr>
+                              <a:rPr lang="en-CA" sz="1600" b="0" i="1" smtClean="0">
+                                <a:latin typeface="Cambria Math" panose="02040503050406030204" pitchFamily="18" charset="0"/>
+                              </a:rPr>
+                            </m:ctrlPr>
+                          </m:dPr>
+                          <m:e>
+                            <m:r>
+                              <a:rPr lang="en-CA" sz="1600" b="0" i="1" smtClean="0">
+                                <a:latin typeface="Cambria Math" panose="02040503050406030204" pitchFamily="18" charset="0"/>
+                              </a:rPr>
+                              <m:t>−</m:t>
+                            </m:r>
+                            <m:sSub>
+                              <m:sSubPr>
+                                <m:ctrlPr>
+                                  <a:rPr lang="en-CA" sz="1600" b="0" i="1" smtClean="0">
+                                    <a:latin typeface="Cambria Math" panose="02040503050406030204" pitchFamily="18" charset="0"/>
+                                  </a:rPr>
+                                </m:ctrlPr>
+                              </m:sSubPr>
+                              <m:e>
+                                <m:r>
+                                  <a:rPr lang="en-CA" sz="1600" b="0" i="1" smtClean="0">
+                                    <a:latin typeface="Cambria Math" panose="02040503050406030204" pitchFamily="18" charset="0"/>
+                                  </a:rPr>
+                                  <m:t>𝐷</m:t>
+                                </m:r>
+                              </m:e>
+                              <m:sub>
+                                <m:r>
+                                  <a:rPr lang="en-CA" sz="1600" b="0" i="1" smtClean="0">
+                                    <a:latin typeface="Cambria Math" panose="02040503050406030204" pitchFamily="18" charset="0"/>
+                                  </a:rPr>
+                                  <m:t>𝑒𝑓𝑓</m:t>
+                                </m:r>
+                              </m:sub>
+                            </m:sSub>
+                            <m:r>
+                              <a:rPr lang="en-CA" sz="1600" b="0" i="1" smtClean="0">
+                                <a:latin typeface="Cambria Math" panose="02040503050406030204" pitchFamily="18" charset="0"/>
+                              </a:rPr>
+                              <m:t>.</m:t>
+                            </m:r>
+                            <m:r>
+                              <a:rPr lang="en-CA" sz="1600" b="0" i="1" smtClean="0">
+                                <a:latin typeface="Cambria Math" panose="02040503050406030204" pitchFamily="18" charset="0"/>
+                              </a:rPr>
+                              <m:t>𝑡</m:t>
+                            </m:r>
+                          </m:e>
+                        </m:d>
+                      </m:e>
+                    </m:func>
+                  </m:oMath>
                 </a14:m>
                 <a:endParaRPr lang="en-CA" sz="1600" b="0" dirty="0"/>
               </a:p>
@@ -13755,7 +16040,23 @@
                 </a14:m>
                 <a:r>
                   <a:rPr lang="en-CA" sz="1600" dirty="0"/>
-                  <a:t>:</a:t>
+                  <a:t>pour </a:t>
+                </a:r>
+                <a:r>
+                  <a:rPr lang="en-CA" sz="1600" dirty="0" err="1"/>
+                  <a:t>obtenir</a:t>
+                </a:r>
+                <a:r>
+                  <a:rPr lang="en-CA" sz="1600" dirty="0"/>
+                  <a:t> le </a:t>
+                </a:r>
+                <a:r>
+                  <a:rPr lang="en-CA" sz="1600" dirty="0" err="1"/>
+                  <a:t>terme</a:t>
+                </a:r>
+                <a:r>
+                  <a:rPr lang="en-CA" sz="1600" dirty="0"/>
+                  <a:t> source:</a:t>
                 </a:r>
               </a:p>
               <a:p>
@@ -14515,13 +16816,7 @@
                         <a:rPr lang="en-CA" sz="1500" b="0" i="1" smtClean="0">
                           <a:latin typeface="Cambria Math" panose="02040503050406030204" pitchFamily="18" charset="0"/>
                         </a:rPr>
-                        <m:t>  </m:t>
-                      </m:r>
-                      <m:r>
-                        <a:rPr lang="en-CA" sz="1500" b="0" i="1" smtClean="0">
-                          <a:latin typeface="Cambria Math" panose="02040503050406030204" pitchFamily="18" charset="0"/>
-                        </a:rPr>
-                        <m:t>(1)</m:t>
+                        <m:t>  (1)</m:t>
                       </m:r>
                     </m:oMath>
                   </m:oMathPara>
@@ -14566,7 +16861,7 @@
               <a:blipFill>
                 <a:blip r:embed="rId2"/>
                 <a:stretch>
-                  <a:fillRect l="-258" t="-831" r="-207"/>
+                  <a:fillRect l="-258" t="-831" r="-207" b="-356"/>
                 </a:stretch>
               </a:blipFill>
             </p:spPr>
@@ -14708,8 +17003,12 @@
                   <a:buNone/>
                 </a:pPr>
                 <a:r>
+                  <a:rPr lang="en-CA" sz="1400" dirty="0" err="1"/>
+                  <a:t>D’après</a:t>
+                </a:r>
+                <a:r>
                   <a:rPr lang="en-CA" sz="1400" dirty="0"/>
-                  <a:t>D’apres le devoir 1 question F, on </a:t>
+                  <a:t> le devoir 1 question F, on </a:t>
                 </a:r>
                 <a:r>
                   <a:rPr lang="en-CA" sz="1400" dirty="0" err="1"/>
@@ -14741,7 +17040,15 @@
                 </a:r>
                 <a:r>
                   <a:rPr lang="en-CA" sz="1400" dirty="0"/>
-                  <a:t> avec S constant et des schema </a:t>
+                  <a:t> avec S constant et des </a:t>
+                </a:r>
+                <a:r>
+                  <a:rPr lang="en-CA" sz="1400" dirty="0" err="1"/>
+                  <a:t>schémas</a:t>
+                </a:r>
+                <a:r>
+                  <a:rPr lang="en-CA" sz="1400" dirty="0"/>
+                  <a:t> </a:t>
                 </a:r>
                 <a:r>
                   <a:rPr lang="en-CA" sz="1400" dirty="0" err="1"/>
@@ -19738,7 +22045,7 @@
               <a:blipFill>
                 <a:blip r:embed="rId2"/>
                 <a:stretch>
-                  <a:fillRect l="-174" t="-542" r="-174"/>
+                  <a:fillRect l="-174" t="-542"/>
                 </a:stretch>
               </a:blipFill>
             </p:spPr>

</xml_diff>